<commit_message>
[master] updated lesson 12
</commit_message>
<xml_diff>
--- a/theory_12-regulation_on_data_protection/theory_12-regulation_on_data_protection.pptx
+++ b/theory_12-regulation_on_data_protection/theory_12-regulation_on_data_protection.pptx
@@ -5,7 +5,7 @@
     <p:sldMasterId id="2147483648" r:id="rId1"/>
   </p:sldMasterIdLst>
   <p:notesMasterIdLst>
-    <p:notesMasterId r:id="rId36"/>
+    <p:notesMasterId r:id="rId34"/>
   </p:notesMasterIdLst>
   <p:sldIdLst>
     <p:sldId id="256" r:id="rId2"/>
@@ -15,33 +15,31 @@
     <p:sldId id="348" r:id="rId6"/>
     <p:sldId id="358" r:id="rId7"/>
     <p:sldId id="354" r:id="rId8"/>
-    <p:sldId id="380" r:id="rId9"/>
-    <p:sldId id="343" r:id="rId10"/>
-    <p:sldId id="344" r:id="rId11"/>
-    <p:sldId id="352" r:id="rId12"/>
-    <p:sldId id="353" r:id="rId13"/>
-    <p:sldId id="359" r:id="rId14"/>
-    <p:sldId id="384" r:id="rId15"/>
-    <p:sldId id="349" r:id="rId16"/>
-    <p:sldId id="356" r:id="rId17"/>
-    <p:sldId id="357" r:id="rId18"/>
-    <p:sldId id="376" r:id="rId19"/>
-    <p:sldId id="379" r:id="rId20"/>
-    <p:sldId id="355" r:id="rId21"/>
-    <p:sldId id="345" r:id="rId22"/>
-    <p:sldId id="373" r:id="rId23"/>
-    <p:sldId id="374" r:id="rId24"/>
-    <p:sldId id="369" r:id="rId25"/>
-    <p:sldId id="381" r:id="rId26"/>
-    <p:sldId id="382" r:id="rId27"/>
-    <p:sldId id="370" r:id="rId28"/>
-    <p:sldId id="383" r:id="rId29"/>
-    <p:sldId id="350" r:id="rId30"/>
-    <p:sldId id="371" r:id="rId31"/>
-    <p:sldId id="372" r:id="rId32"/>
-    <p:sldId id="377" r:id="rId33"/>
-    <p:sldId id="378" r:id="rId34"/>
-    <p:sldId id="375" r:id="rId35"/>
+    <p:sldId id="343" r:id="rId9"/>
+    <p:sldId id="344" r:id="rId10"/>
+    <p:sldId id="352" r:id="rId11"/>
+    <p:sldId id="353" r:id="rId12"/>
+    <p:sldId id="359" r:id="rId13"/>
+    <p:sldId id="384" r:id="rId14"/>
+    <p:sldId id="349" r:id="rId15"/>
+    <p:sldId id="356" r:id="rId16"/>
+    <p:sldId id="357" r:id="rId17"/>
+    <p:sldId id="376" r:id="rId18"/>
+    <p:sldId id="379" r:id="rId19"/>
+    <p:sldId id="355" r:id="rId20"/>
+    <p:sldId id="345" r:id="rId21"/>
+    <p:sldId id="373" r:id="rId22"/>
+    <p:sldId id="374" r:id="rId23"/>
+    <p:sldId id="369" r:id="rId24"/>
+    <p:sldId id="381" r:id="rId25"/>
+    <p:sldId id="382" r:id="rId26"/>
+    <p:sldId id="370" r:id="rId27"/>
+    <p:sldId id="383" r:id="rId28"/>
+    <p:sldId id="350" r:id="rId29"/>
+    <p:sldId id="371" r:id="rId30"/>
+    <p:sldId id="372" r:id="rId31"/>
+    <p:sldId id="377" r:id="rId32"/>
+    <p:sldId id="375" r:id="rId33"/>
   </p:sldIdLst>
   <p:sldSz cx="12192000" cy="6858000"/>
   <p:notesSz cx="6858000" cy="9144000"/>
@@ -230,7 +228,7 @@
           <a:p>
             <a:fld id="{251090E0-FB0C-49E9-9864-9F53EABEA96F}" type="datetimeFigureOut">
               <a:rPr lang="en-GB" smtClean="0"/>
-              <a:t>01/02/2024</a:t>
+              <a:t>04/05/2024</a:t>
             </a:fld>
             <a:endParaRPr lang="en-GB"/>
           </a:p>
@@ -2460,230 +2458,6 @@
         <p:cNvPr id="1" name="">
           <a:extLst>
             <a:ext uri="{FF2B5EF4-FFF2-40B4-BE49-F238E27FC236}">
-              <a16:creationId xmlns:a16="http://schemas.microsoft.com/office/drawing/2014/main" id="{CF81F3E4-5D1D-3366-5B74-AE53694E599E}"/>
-            </a:ext>
-          </a:extLst>
-        </p:cNvPr>
-        <p:cNvGrpSpPr/>
-        <p:nvPr/>
-      </p:nvGrpSpPr>
-      <p:grpSpPr>
-        <a:xfrm>
-          <a:off x="0" y="0"/>
-          <a:ext cx="0" cy="0"/>
-          <a:chOff x="0" y="0"/>
-          <a:chExt cx="0" cy="0"/>
-        </a:xfrm>
-      </p:grpSpPr>
-      <p:sp>
-        <p:nvSpPr>
-          <p:cNvPr id="2" name="Titolo 1">
-            <a:extLst>
-              <a:ext uri="{FF2B5EF4-FFF2-40B4-BE49-F238E27FC236}">
-                <a16:creationId xmlns:a16="http://schemas.microsoft.com/office/drawing/2014/main" id="{232AECC6-0523-7CB6-1EBB-89752EEB31B2}"/>
-              </a:ext>
-            </a:extLst>
-          </p:cNvPr>
-          <p:cNvSpPr>
-            <a:spLocks noGrp="1"/>
-          </p:cNvSpPr>
-          <p:nvPr>
-            <p:ph type="title"/>
-          </p:nvPr>
-        </p:nvSpPr>
-        <p:spPr/>
-        <p:txBody>
-          <a:bodyPr/>
-          <a:lstStyle/>
-          <a:p>
-            <a:r>
-              <a:rPr lang="en-GB" dirty="0"/>
-              <a:t>Restrictions to the application of GDPR</a:t>
-            </a:r>
-          </a:p>
-        </p:txBody>
-      </p:sp>
-      <p:sp>
-        <p:nvSpPr>
-          <p:cNvPr id="3" name="Segnaposto contenuto 2">
-            <a:extLst>
-              <a:ext uri="{FF2B5EF4-FFF2-40B4-BE49-F238E27FC236}">
-                <a16:creationId xmlns:a16="http://schemas.microsoft.com/office/drawing/2014/main" id="{FE9606D9-3FC9-A4E6-0838-5C13A7A96060}"/>
-              </a:ext>
-            </a:extLst>
-          </p:cNvPr>
-          <p:cNvSpPr>
-            <a:spLocks noGrp="1"/>
-          </p:cNvSpPr>
-          <p:nvPr>
-            <p:ph idx="1"/>
-          </p:nvPr>
-        </p:nvSpPr>
-        <p:spPr/>
-        <p:txBody>
-          <a:bodyPr>
-            <a:normAutofit lnSpcReduction="10000"/>
-          </a:bodyPr>
-          <a:lstStyle/>
-          <a:p>
-            <a:pPr>
-              <a:spcAft>
-                <a:spcPts val="1200"/>
-              </a:spcAft>
-            </a:pPr>
-            <a:r>
-              <a:rPr lang="en-GB" dirty="0"/>
-              <a:t>In the EU, privacy and data protection are </a:t>
-            </a:r>
-            <a:r>
-              <a:rPr lang="en-GB" b="1" dirty="0"/>
-              <a:t>not absolute rights </a:t>
-            </a:r>
-            <a:r>
-              <a:rPr lang="en-GB" dirty="0"/>
-              <a:t>and can be limited under certain conditions according to the EU Charter of Fundamental Rights.</a:t>
-            </a:r>
-          </a:p>
-          <a:p>
-            <a:pPr>
-              <a:spcAft>
-                <a:spcPts val="1200"/>
-              </a:spcAft>
-            </a:pPr>
-            <a:endParaRPr lang="en-GB" dirty="0"/>
-          </a:p>
-          <a:p>
-            <a:pPr>
-              <a:spcAft>
-                <a:spcPts val="1200"/>
-              </a:spcAft>
-            </a:pPr>
-            <a:r>
-              <a:rPr lang="en-GB" dirty="0"/>
-              <a:t>Need to balance the rights to privacy against other EU values, human rights (e.g., right to freedom of expression), public and private interests (e.g., right to freedom of press), and national security. </a:t>
-            </a:r>
-          </a:p>
-          <a:p>
-            <a:pPr lvl="1">
-              <a:spcAft>
-                <a:spcPts val="1200"/>
-              </a:spcAft>
-            </a:pPr>
-            <a:r>
-              <a:rPr lang="en-GB" sz="2400" dirty="0"/>
-              <a:t>GDPR not applicable if data are used for the purposes of prevention, investigation, detection or prosecution of criminal offences. </a:t>
-            </a:r>
-          </a:p>
-          <a:p>
-            <a:pPr lvl="1">
-              <a:spcAft>
-                <a:spcPts val="1200"/>
-              </a:spcAft>
-            </a:pPr>
-            <a:endParaRPr lang="en-GB" sz="2400" dirty="0"/>
-          </a:p>
-          <a:p>
-            <a:pPr>
-              <a:spcAft>
-                <a:spcPts val="1200"/>
-              </a:spcAft>
-            </a:pPr>
-            <a:r>
-              <a:rPr lang="en-GB" dirty="0"/>
-              <a:t>DPAs ensure the balance between privacy and other interests.</a:t>
-            </a:r>
-          </a:p>
-          <a:p>
-            <a:endParaRPr lang="en-GB" dirty="0"/>
-          </a:p>
-        </p:txBody>
-      </p:sp>
-      <p:sp>
-        <p:nvSpPr>
-          <p:cNvPr id="4" name="Segnaposto numero diapositiva 3">
-            <a:extLst>
-              <a:ext uri="{FF2B5EF4-FFF2-40B4-BE49-F238E27FC236}">
-                <a16:creationId xmlns:a16="http://schemas.microsoft.com/office/drawing/2014/main" id="{D22327FA-5D01-7C65-08DC-85A710E22F7E}"/>
-              </a:ext>
-            </a:extLst>
-          </p:cNvPr>
-          <p:cNvSpPr>
-            <a:spLocks noGrp="1"/>
-          </p:cNvSpPr>
-          <p:nvPr>
-            <p:ph type="sldNum" sz="quarter" idx="12"/>
-          </p:nvPr>
-        </p:nvSpPr>
-        <p:spPr/>
-        <p:txBody>
-          <a:bodyPr/>
-          <a:lstStyle/>
-          <a:p>
-            <a:fld id="{31DE2C5B-556E-47B8-A792-024C2FCA4ACC}" type="slidenum">
-              <a:rPr lang="en-GB" smtClean="0"/>
-              <a:t>10</a:t>
-            </a:fld>
-            <a:endParaRPr lang="en-GB"/>
-          </a:p>
-        </p:txBody>
-      </p:sp>
-      <p:pic>
-        <p:nvPicPr>
-          <p:cNvPr id="6" name="Picture 5" descr="A hand with a yellow sign&#10;&#10;Description automatically generated">
-            <a:extLst>
-              <a:ext uri="{FF2B5EF4-FFF2-40B4-BE49-F238E27FC236}">
-                <a16:creationId xmlns:a16="http://schemas.microsoft.com/office/drawing/2014/main" id="{2609E103-752E-EDA2-97ED-7FAA4E2782CC}"/>
-              </a:ext>
-            </a:extLst>
-          </p:cNvPr>
-          <p:cNvPicPr>
-            <a:picLocks noChangeAspect="1"/>
-          </p:cNvPicPr>
-          <p:nvPr/>
-        </p:nvPicPr>
-        <p:blipFill>
-          <a:blip r:embed="rId2">
-            <a:extLst>
-              <a:ext uri="{28A0092B-C50C-407E-A947-70E740481C1C}">
-                <a14:useLocalDpi xmlns:a14="http://schemas.microsoft.com/office/drawing/2010/main" val="0"/>
-              </a:ext>
-            </a:extLst>
-          </a:blip>
-          <a:stretch>
-            <a:fillRect/>
-          </a:stretch>
-        </p:blipFill>
-        <p:spPr>
-          <a:xfrm>
-            <a:off x="10233732" y="4578096"/>
-            <a:ext cx="1530096" cy="1530096"/>
-          </a:xfrm>
-          <a:prstGeom prst="rect">
-            <a:avLst/>
-          </a:prstGeom>
-        </p:spPr>
-      </p:pic>
-    </p:spTree>
-    <p:extLst>
-      <p:ext uri="{BB962C8B-B14F-4D97-AF65-F5344CB8AC3E}">
-        <p14:creationId xmlns:p14="http://schemas.microsoft.com/office/powerpoint/2010/main" val="4150651060"/>
-      </p:ext>
-    </p:extLst>
-  </p:cSld>
-  <p:clrMapOvr>
-    <a:masterClrMapping/>
-  </p:clrMapOvr>
-</p:sld>
-</file>
-
-<file path=ppt/slides/slide11.xml><?xml version="1.0" encoding="utf-8"?>
-<p:sld xmlns:a="http://schemas.openxmlformats.org/drawingml/2006/main" xmlns:r="http://schemas.openxmlformats.org/officeDocument/2006/relationships" xmlns:p="http://schemas.openxmlformats.org/presentationml/2006/main">
-  <p:cSld>
-    <p:spTree>
-      <p:nvGrpSpPr>
-        <p:cNvPr id="1" name="">
-          <a:extLst>
-            <a:ext uri="{FF2B5EF4-FFF2-40B4-BE49-F238E27FC236}">
               <a16:creationId xmlns:a16="http://schemas.microsoft.com/office/drawing/2014/main" id="{6452C386-AD2F-CA31-5073-073ADB30440F}"/>
             </a:ext>
           </a:extLst>
@@ -2868,7 +2642,7 @@
           <a:p>
             <a:fld id="{31DE2C5B-556E-47B8-A792-024C2FCA4ACC}" type="slidenum">
               <a:rPr lang="en-GB" smtClean="0"/>
-              <a:t>11</a:t>
+              <a:t>10</a:t>
             </a:fld>
             <a:endParaRPr lang="en-GB"/>
           </a:p>
@@ -3157,7 +2931,7 @@
 </p:sld>
 </file>
 
-<file path=ppt/slides/slide12.xml><?xml version="1.0" encoding="utf-8"?>
+<file path=ppt/slides/slide11.xml><?xml version="1.0" encoding="utf-8"?>
 <p:sld xmlns:a="http://schemas.openxmlformats.org/drawingml/2006/main" xmlns:r="http://schemas.openxmlformats.org/officeDocument/2006/relationships" xmlns:p="http://schemas.openxmlformats.org/presentationml/2006/main">
   <p:cSld>
     <p:spTree>
@@ -3336,7 +3110,7 @@
           <a:p>
             <a:fld id="{31DE2C5B-556E-47B8-A792-024C2FCA4ACC}" type="slidenum">
               <a:rPr lang="en-GB" smtClean="0"/>
-              <a:t>12</a:t>
+              <a:t>11</a:t>
             </a:fld>
             <a:endParaRPr lang="en-GB"/>
           </a:p>
@@ -3545,7 +3319,7 @@
 </p:sld>
 </file>
 
-<file path=ppt/slides/slide13.xml><?xml version="1.0" encoding="utf-8"?>
+<file path=ppt/slides/slide12.xml><?xml version="1.0" encoding="utf-8"?>
 <p:sld xmlns:a="http://schemas.openxmlformats.org/drawingml/2006/main" xmlns:r="http://schemas.openxmlformats.org/officeDocument/2006/relationships" xmlns:p="http://schemas.openxmlformats.org/presentationml/2006/main">
   <p:cSld>
     <p:spTree>
@@ -3720,7 +3494,7 @@
           <a:p>
             <a:fld id="{31DE2C5B-556E-47B8-A792-024C2FCA4ACC}" type="slidenum">
               <a:rPr lang="en-GB" smtClean="0"/>
-              <a:t>13</a:t>
+              <a:t>12</a:t>
             </a:fld>
             <a:endParaRPr lang="en-GB"/>
           </a:p>
@@ -4032,7 +3806,7 @@
 </p:sld>
 </file>
 
-<file path=ppt/slides/slide14.xml><?xml version="1.0" encoding="utf-8"?>
+<file path=ppt/slides/slide13.xml><?xml version="1.0" encoding="utf-8"?>
 <p:sld xmlns:a="http://schemas.openxmlformats.org/drawingml/2006/main" xmlns:r="http://schemas.openxmlformats.org/officeDocument/2006/relationships" xmlns:p="http://schemas.openxmlformats.org/presentationml/2006/main">
   <p:cSld>
     <p:spTree>
@@ -4257,7 +4031,7 @@
           <a:p>
             <a:fld id="{31DE2C5B-556E-47B8-A792-024C2FCA4ACC}" type="slidenum">
               <a:rPr lang="en-GB" smtClean="0"/>
-              <a:t>14</a:t>
+              <a:t>13</a:t>
             </a:fld>
             <a:endParaRPr lang="en-GB"/>
           </a:p>
@@ -4659,7 +4433,7 @@
 </p:sld>
 </file>
 
-<file path=ppt/slides/slide15.xml><?xml version="1.0" encoding="utf-8"?>
+<file path=ppt/slides/slide14.xml><?xml version="1.0" encoding="utf-8"?>
 <p:sld xmlns:a="http://schemas.openxmlformats.org/drawingml/2006/main" xmlns:r="http://schemas.openxmlformats.org/officeDocument/2006/relationships" xmlns:p="http://schemas.openxmlformats.org/presentationml/2006/main">
   <p:cSld>
     <p:spTree>
@@ -4820,7 +4594,7 @@
           <a:p>
             <a:fld id="{31DE2C5B-556E-47B8-A792-024C2FCA4ACC}" type="slidenum">
               <a:rPr lang="en-GB" smtClean="0"/>
-              <a:t>15</a:t>
+              <a:t>14</a:t>
             </a:fld>
             <a:endParaRPr lang="en-GB"/>
           </a:p>
@@ -5070,7 +4844,7 @@
 </p:sld>
 </file>
 
-<file path=ppt/slides/slide16.xml><?xml version="1.0" encoding="utf-8"?>
+<file path=ppt/slides/slide15.xml><?xml version="1.0" encoding="utf-8"?>
 <p:sld xmlns:a="http://schemas.openxmlformats.org/drawingml/2006/main" xmlns:r="http://schemas.openxmlformats.org/officeDocument/2006/relationships" xmlns:p="http://schemas.openxmlformats.org/presentationml/2006/main">
   <p:cSld>
     <p:spTree>
@@ -5271,7 +5045,7 @@
           <a:p>
             <a:fld id="{31DE2C5B-556E-47B8-A792-024C2FCA4ACC}" type="slidenum">
               <a:rPr lang="en-GB" smtClean="0"/>
-              <a:t>16</a:t>
+              <a:t>15</a:t>
             </a:fld>
             <a:endParaRPr lang="en-GB"/>
           </a:p>
@@ -5305,7 +5079,7 @@
         </p:blipFill>
         <p:spPr>
           <a:xfrm>
-            <a:off x="10320528" y="1361167"/>
+            <a:off x="10354419" y="3024795"/>
             <a:ext cx="1328928" cy="1328928"/>
           </a:xfrm>
           <a:prstGeom prst="rect">
@@ -5756,7 +5530,7 @@
 </p:sld>
 </file>
 
-<file path=ppt/slides/slide17.xml><?xml version="1.0" encoding="utf-8"?>
+<file path=ppt/slides/slide16.xml><?xml version="1.0" encoding="utf-8"?>
 <p:sld xmlns:a="http://schemas.openxmlformats.org/drawingml/2006/main" xmlns:r="http://schemas.openxmlformats.org/officeDocument/2006/relationships" xmlns:p="http://schemas.openxmlformats.org/presentationml/2006/main">
   <p:cSld>
     <p:spTree>
@@ -5953,7 +5727,7 @@
           <a:p>
             <a:fld id="{31DE2C5B-556E-47B8-A792-024C2FCA4ACC}" type="slidenum">
               <a:rPr lang="en-GB" smtClean="0"/>
-              <a:t>17</a:t>
+              <a:t>16</a:t>
             </a:fld>
             <a:endParaRPr lang="en-GB"/>
           </a:p>
@@ -5987,7 +5761,7 @@
         </p:blipFill>
         <p:spPr>
           <a:xfrm>
-            <a:off x="10320528" y="1361167"/>
+            <a:off x="10278219" y="2764536"/>
             <a:ext cx="1328928" cy="1328928"/>
           </a:xfrm>
           <a:prstGeom prst="rect">
@@ -6309,7 +6083,7 @@
 </p:sld>
 </file>
 
-<file path=ppt/slides/slide18.xml><?xml version="1.0" encoding="utf-8"?>
+<file path=ppt/slides/slide17.xml><?xml version="1.0" encoding="utf-8"?>
 <p:sld xmlns:a="http://schemas.openxmlformats.org/drawingml/2006/main" xmlns:r="http://schemas.openxmlformats.org/officeDocument/2006/relationships" xmlns:p="http://schemas.openxmlformats.org/presentationml/2006/main">
   <p:cSld>
     <p:spTree>
@@ -6462,7 +6236,7 @@
           <a:p>
             <a:fld id="{31DE2C5B-556E-47B8-A792-024C2FCA4ACC}" type="slidenum">
               <a:rPr lang="en-GB" smtClean="0"/>
-              <a:t>18</a:t>
+              <a:t>17</a:t>
             </a:fld>
             <a:endParaRPr lang="en-GB"/>
           </a:p>
@@ -6517,7 +6291,7 @@
 </p:sld>
 </file>
 
-<file path=ppt/slides/slide19.xml><?xml version="1.0" encoding="utf-8"?>
+<file path=ppt/slides/slide18.xml><?xml version="1.0" encoding="utf-8"?>
 <p:sld xmlns:a="http://schemas.openxmlformats.org/drawingml/2006/main" xmlns:r="http://schemas.openxmlformats.org/officeDocument/2006/relationships" xmlns:p="http://schemas.openxmlformats.org/presentationml/2006/main">
   <p:cSld>
     <p:spTree>
@@ -6710,7 +6484,7 @@
           <a:p>
             <a:fld id="{31DE2C5B-556E-47B8-A792-024C2FCA4ACC}" type="slidenum">
               <a:rPr lang="en-GB" smtClean="0"/>
-              <a:t>19</a:t>
+              <a:t>18</a:t>
             </a:fld>
             <a:endParaRPr lang="en-GB"/>
           </a:p>
@@ -6765,7 +6539,7 @@
 </p:sld>
 </file>
 
-<file path=ppt/slides/slide2.xml><?xml version="1.0" encoding="utf-8"?>
+<file path=ppt/slides/slide19.xml><?xml version="1.0" encoding="utf-8"?>
 <p:sld xmlns:a="http://schemas.openxmlformats.org/drawingml/2006/main" xmlns:r="http://schemas.openxmlformats.org/officeDocument/2006/relationships" xmlns:p="http://schemas.openxmlformats.org/presentationml/2006/main">
   <p:cSld>
     <p:spTree>
@@ -6798,199 +6572,6 @@
           <a:lstStyle/>
           <a:p>
             <a:r>
-              <a:rPr lang="it-IT" dirty="0"/>
-              <a:t>Privacy</a:t>
-            </a:r>
-            <a:endParaRPr lang="en-GB" dirty="0"/>
-          </a:p>
-        </p:txBody>
-      </p:sp>
-      <p:sp>
-        <p:nvSpPr>
-          <p:cNvPr id="3" name="Segnaposto contenuto 2"/>
-          <p:cNvSpPr>
-            <a:spLocks noGrp="1"/>
-          </p:cNvSpPr>
-          <p:nvPr>
-            <p:ph idx="1"/>
-          </p:nvPr>
-        </p:nvSpPr>
-        <p:spPr/>
-        <p:txBody>
-          <a:bodyPr/>
-          <a:lstStyle/>
-          <a:p>
-            <a:r>
-              <a:rPr lang="it-IT" b="1" dirty="0"/>
-              <a:t>Privacy</a:t>
-            </a:r>
-            <a:r>
-              <a:rPr lang="it-IT" dirty="0"/>
-              <a:t>: </a:t>
-            </a:r>
-            <a:r>
-              <a:rPr lang="en-GB" dirty="0"/>
-              <a:t>the right to a private life, to be autonomous, </a:t>
-            </a:r>
-            <a:r>
-              <a:rPr lang="en-GB" u="sng" dirty="0"/>
-              <a:t>in control of information about yourself</a:t>
-            </a:r>
-            <a:r>
-              <a:rPr lang="en-GB" dirty="0"/>
-              <a:t>, to be let alone.</a:t>
-            </a:r>
-          </a:p>
-          <a:p>
-            <a:endParaRPr lang="en-GB" dirty="0"/>
-          </a:p>
-          <a:p>
-            <a:r>
-              <a:rPr lang="en-GB" dirty="0"/>
-              <a:t>Almost every country in the world recognises privacy in some way. </a:t>
-            </a:r>
-          </a:p>
-          <a:p>
-            <a:endParaRPr lang="en-GB" dirty="0"/>
-          </a:p>
-          <a:p>
-            <a:r>
-              <a:rPr lang="en-GB" dirty="0"/>
-              <a:t>Privacy recognised as a universal human right. </a:t>
-            </a:r>
-          </a:p>
-          <a:p>
-            <a:pPr lvl="1"/>
-            <a:r>
-              <a:rPr lang="en-GB" dirty="0"/>
-              <a:t>Universal Declaration of Human Rights (Article 12)</a:t>
-            </a:r>
-          </a:p>
-          <a:p>
-            <a:pPr lvl="1"/>
-            <a:r>
-              <a:rPr lang="en-GB" dirty="0"/>
-              <a:t>European Convention of Human Rights (Article 8)</a:t>
-            </a:r>
-          </a:p>
-          <a:p>
-            <a:pPr lvl="1"/>
-            <a:r>
-              <a:rPr lang="en-GB" dirty="0"/>
-              <a:t>European Charter of Fundamental Rights (Article 7).</a:t>
-            </a:r>
-          </a:p>
-          <a:p>
-            <a:pPr lvl="1"/>
-            <a:endParaRPr lang="en-GB" dirty="0"/>
-          </a:p>
-        </p:txBody>
-      </p:sp>
-      <p:sp>
-        <p:nvSpPr>
-          <p:cNvPr id="4" name="Segnaposto numero diapositiva 3"/>
-          <p:cNvSpPr>
-            <a:spLocks noGrp="1"/>
-          </p:cNvSpPr>
-          <p:nvPr>
-            <p:ph type="sldNum" sz="quarter" idx="12"/>
-          </p:nvPr>
-        </p:nvSpPr>
-        <p:spPr/>
-        <p:txBody>
-          <a:bodyPr/>
-          <a:lstStyle/>
-          <a:p>
-            <a:fld id="{31DE2C5B-556E-47B8-A792-024C2FCA4ACC}" type="slidenum">
-              <a:rPr lang="en-GB" smtClean="0"/>
-              <a:t>2</a:t>
-            </a:fld>
-            <a:endParaRPr lang="en-GB"/>
-          </a:p>
-        </p:txBody>
-      </p:sp>
-      <p:pic>
-        <p:nvPicPr>
-          <p:cNvPr id="10" name="Picture 9" descr="A yellow shield and padlock with a green shield and a green shield&#10;&#10;Description automatically generated">
-            <a:extLst>
-              <a:ext uri="{FF2B5EF4-FFF2-40B4-BE49-F238E27FC236}">
-                <a16:creationId xmlns:a16="http://schemas.microsoft.com/office/drawing/2014/main" id="{075D4C33-C427-C051-4FC9-90675ECE2532}"/>
-              </a:ext>
-            </a:extLst>
-          </p:cNvPr>
-          <p:cNvPicPr>
-            <a:picLocks noChangeAspect="1"/>
-          </p:cNvPicPr>
-          <p:nvPr/>
-        </p:nvPicPr>
-        <p:blipFill>
-          <a:blip r:embed="rId2">
-            <a:extLst>
-              <a:ext uri="{28A0092B-C50C-407E-A947-70E740481C1C}">
-                <a14:useLocalDpi xmlns:a14="http://schemas.microsoft.com/office/drawing/2010/main" val="0"/>
-              </a:ext>
-            </a:extLst>
-          </a:blip>
-          <a:stretch>
-            <a:fillRect/>
-          </a:stretch>
-        </p:blipFill>
-        <p:spPr>
-          <a:xfrm>
-            <a:off x="9237505" y="3429000"/>
-            <a:ext cx="2526323" cy="2526323"/>
-          </a:xfrm>
-          <a:prstGeom prst="rect">
-            <a:avLst/>
-          </a:prstGeom>
-        </p:spPr>
-      </p:pic>
-    </p:spTree>
-    <p:extLst>
-      <p:ext uri="{BB962C8B-B14F-4D97-AF65-F5344CB8AC3E}">
-        <p14:creationId xmlns:p14="http://schemas.microsoft.com/office/powerpoint/2010/main" val="696513067"/>
-      </p:ext>
-    </p:extLst>
-  </p:cSld>
-  <p:clrMapOvr>
-    <a:masterClrMapping/>
-  </p:clrMapOvr>
-</p:sld>
-</file>
-
-<file path=ppt/slides/slide20.xml><?xml version="1.0" encoding="utf-8"?>
-<p:sld xmlns:a="http://schemas.openxmlformats.org/drawingml/2006/main" xmlns:r="http://schemas.openxmlformats.org/officeDocument/2006/relationships" xmlns:p="http://schemas.openxmlformats.org/presentationml/2006/main">
-  <p:cSld>
-    <p:spTree>
-      <p:nvGrpSpPr>
-        <p:cNvPr id="1" name=""/>
-        <p:cNvGrpSpPr/>
-        <p:nvPr/>
-      </p:nvGrpSpPr>
-      <p:grpSpPr>
-        <a:xfrm>
-          <a:off x="0" y="0"/>
-          <a:ext cx="0" cy="0"/>
-          <a:chOff x="0" y="0"/>
-          <a:chExt cx="0" cy="0"/>
-        </a:xfrm>
-      </p:grpSpPr>
-      <p:sp>
-        <p:nvSpPr>
-          <p:cNvPr id="2" name="Titolo 1"/>
-          <p:cNvSpPr>
-            <a:spLocks noGrp="1"/>
-          </p:cNvSpPr>
-          <p:nvPr>
-            <p:ph type="title"/>
-          </p:nvPr>
-        </p:nvSpPr>
-        <p:spPr/>
-        <p:txBody>
-          <a:bodyPr/>
-          <a:lstStyle/>
-          <a:p>
-            <a:r>
               <a:rPr lang="en-GB" dirty="0"/>
               <a:t>Lawful basis for data processing under GDPR</a:t>
             </a:r>
@@ -7157,7 +6738,7 @@
           <a:p>
             <a:fld id="{31DE2C5B-556E-47B8-A792-024C2FCA4ACC}" type="slidenum">
               <a:rPr lang="en-GB" smtClean="0"/>
-              <a:t>20</a:t>
+              <a:t>19</a:t>
             </a:fld>
             <a:endParaRPr lang="en-GB"/>
           </a:p>
@@ -7585,7 +7166,7 @@
 </p:sld>
 </file>
 
-<file path=ppt/slides/slide21.xml><?xml version="1.0" encoding="utf-8"?>
+<file path=ppt/slides/slide2.xml><?xml version="1.0" encoding="utf-8"?>
 <p:sld xmlns:a="http://schemas.openxmlformats.org/drawingml/2006/main" xmlns:r="http://schemas.openxmlformats.org/officeDocument/2006/relationships" xmlns:p="http://schemas.openxmlformats.org/presentationml/2006/main">
   <p:cSld>
     <p:spTree>
@@ -7618,6 +7199,199 @@
           <a:lstStyle/>
           <a:p>
             <a:r>
+              <a:rPr lang="it-IT" dirty="0"/>
+              <a:t>Privacy</a:t>
+            </a:r>
+            <a:endParaRPr lang="en-GB" dirty="0"/>
+          </a:p>
+        </p:txBody>
+      </p:sp>
+      <p:sp>
+        <p:nvSpPr>
+          <p:cNvPr id="3" name="Segnaposto contenuto 2"/>
+          <p:cNvSpPr>
+            <a:spLocks noGrp="1"/>
+          </p:cNvSpPr>
+          <p:nvPr>
+            <p:ph idx="1"/>
+          </p:nvPr>
+        </p:nvSpPr>
+        <p:spPr/>
+        <p:txBody>
+          <a:bodyPr/>
+          <a:lstStyle/>
+          <a:p>
+            <a:r>
+              <a:rPr lang="it-IT" b="1" dirty="0"/>
+              <a:t>Privacy</a:t>
+            </a:r>
+            <a:r>
+              <a:rPr lang="it-IT" dirty="0"/>
+              <a:t>: </a:t>
+            </a:r>
+            <a:r>
+              <a:rPr lang="en-GB" dirty="0"/>
+              <a:t>the right to a private life, to be autonomous, </a:t>
+            </a:r>
+            <a:r>
+              <a:rPr lang="en-GB" u="sng" dirty="0"/>
+              <a:t>in control of information about yourself</a:t>
+            </a:r>
+            <a:r>
+              <a:rPr lang="en-GB" dirty="0"/>
+              <a:t>, to be let alone.</a:t>
+            </a:r>
+          </a:p>
+          <a:p>
+            <a:endParaRPr lang="en-GB" dirty="0"/>
+          </a:p>
+          <a:p>
+            <a:r>
+              <a:rPr lang="en-GB" dirty="0"/>
+              <a:t>Almost every country in the world recognises privacy in some way. </a:t>
+            </a:r>
+          </a:p>
+          <a:p>
+            <a:endParaRPr lang="en-GB" dirty="0"/>
+          </a:p>
+          <a:p>
+            <a:r>
+              <a:rPr lang="en-GB" dirty="0"/>
+              <a:t>Privacy recognised as a universal human right. </a:t>
+            </a:r>
+          </a:p>
+          <a:p>
+            <a:pPr lvl="1"/>
+            <a:r>
+              <a:rPr lang="en-GB" dirty="0"/>
+              <a:t>Universal Declaration of Human Rights (Article 12)</a:t>
+            </a:r>
+          </a:p>
+          <a:p>
+            <a:pPr lvl="1"/>
+            <a:r>
+              <a:rPr lang="en-GB" dirty="0"/>
+              <a:t>European Convention of Human Rights (Article 8)</a:t>
+            </a:r>
+          </a:p>
+          <a:p>
+            <a:pPr lvl="1"/>
+            <a:r>
+              <a:rPr lang="en-GB" dirty="0"/>
+              <a:t>European Charter of Fundamental Rights (Article 7).</a:t>
+            </a:r>
+          </a:p>
+          <a:p>
+            <a:pPr lvl="1"/>
+            <a:endParaRPr lang="en-GB" dirty="0"/>
+          </a:p>
+        </p:txBody>
+      </p:sp>
+      <p:sp>
+        <p:nvSpPr>
+          <p:cNvPr id="4" name="Segnaposto numero diapositiva 3"/>
+          <p:cNvSpPr>
+            <a:spLocks noGrp="1"/>
+          </p:cNvSpPr>
+          <p:nvPr>
+            <p:ph type="sldNum" sz="quarter" idx="12"/>
+          </p:nvPr>
+        </p:nvSpPr>
+        <p:spPr/>
+        <p:txBody>
+          <a:bodyPr/>
+          <a:lstStyle/>
+          <a:p>
+            <a:fld id="{31DE2C5B-556E-47B8-A792-024C2FCA4ACC}" type="slidenum">
+              <a:rPr lang="en-GB" smtClean="0"/>
+              <a:t>2</a:t>
+            </a:fld>
+            <a:endParaRPr lang="en-GB"/>
+          </a:p>
+        </p:txBody>
+      </p:sp>
+      <p:pic>
+        <p:nvPicPr>
+          <p:cNvPr id="10" name="Picture 9" descr="A yellow shield and padlock with a green shield and a green shield&#10;&#10;Description automatically generated">
+            <a:extLst>
+              <a:ext uri="{FF2B5EF4-FFF2-40B4-BE49-F238E27FC236}">
+                <a16:creationId xmlns:a16="http://schemas.microsoft.com/office/drawing/2014/main" id="{075D4C33-C427-C051-4FC9-90675ECE2532}"/>
+              </a:ext>
+            </a:extLst>
+          </p:cNvPr>
+          <p:cNvPicPr>
+            <a:picLocks noChangeAspect="1"/>
+          </p:cNvPicPr>
+          <p:nvPr/>
+        </p:nvPicPr>
+        <p:blipFill>
+          <a:blip r:embed="rId2">
+            <a:extLst>
+              <a:ext uri="{28A0092B-C50C-407E-A947-70E740481C1C}">
+                <a14:useLocalDpi xmlns:a14="http://schemas.microsoft.com/office/drawing/2010/main" val="0"/>
+              </a:ext>
+            </a:extLst>
+          </a:blip>
+          <a:stretch>
+            <a:fillRect/>
+          </a:stretch>
+        </p:blipFill>
+        <p:spPr>
+          <a:xfrm>
+            <a:off x="9237505" y="3429000"/>
+            <a:ext cx="2526323" cy="2526323"/>
+          </a:xfrm>
+          <a:prstGeom prst="rect">
+            <a:avLst/>
+          </a:prstGeom>
+        </p:spPr>
+      </p:pic>
+    </p:spTree>
+    <p:extLst>
+      <p:ext uri="{BB962C8B-B14F-4D97-AF65-F5344CB8AC3E}">
+        <p14:creationId xmlns:p14="http://schemas.microsoft.com/office/powerpoint/2010/main" val="696513067"/>
+      </p:ext>
+    </p:extLst>
+  </p:cSld>
+  <p:clrMapOvr>
+    <a:masterClrMapping/>
+  </p:clrMapOvr>
+</p:sld>
+</file>
+
+<file path=ppt/slides/slide20.xml><?xml version="1.0" encoding="utf-8"?>
+<p:sld xmlns:a="http://schemas.openxmlformats.org/drawingml/2006/main" xmlns:r="http://schemas.openxmlformats.org/officeDocument/2006/relationships" xmlns:p="http://schemas.openxmlformats.org/presentationml/2006/main">
+  <p:cSld>
+    <p:spTree>
+      <p:nvGrpSpPr>
+        <p:cNvPr id="1" name=""/>
+        <p:cNvGrpSpPr/>
+        <p:nvPr/>
+      </p:nvGrpSpPr>
+      <p:grpSpPr>
+        <a:xfrm>
+          <a:off x="0" y="0"/>
+          <a:ext cx="0" cy="0"/>
+          <a:chOff x="0" y="0"/>
+          <a:chExt cx="0" cy="0"/>
+        </a:xfrm>
+      </p:grpSpPr>
+      <p:sp>
+        <p:nvSpPr>
+          <p:cNvPr id="2" name="Titolo 1"/>
+          <p:cNvSpPr>
+            <a:spLocks noGrp="1"/>
+          </p:cNvSpPr>
+          <p:nvPr>
+            <p:ph type="title"/>
+          </p:nvPr>
+        </p:nvSpPr>
+        <p:spPr/>
+        <p:txBody>
+          <a:bodyPr/>
+          <a:lstStyle/>
+          <a:p>
+            <a:r>
               <a:rPr lang="it-IT" dirty="0" err="1"/>
               <a:t>Consent</a:t>
             </a:r>
@@ -7778,7 +7552,7 @@
           <a:p>
             <a:fld id="{31DE2C5B-556E-47B8-A792-024C2FCA4ACC}" type="slidenum">
               <a:rPr lang="en-GB" smtClean="0"/>
-              <a:t>21</a:t>
+              <a:t>20</a:t>
             </a:fld>
             <a:endParaRPr lang="en-GB"/>
           </a:p>
@@ -7833,7 +7607,7 @@
 </p:sld>
 </file>
 
-<file path=ppt/slides/slide22.xml><?xml version="1.0" encoding="utf-8"?>
+<file path=ppt/slides/slide21.xml><?xml version="1.0" encoding="utf-8"?>
 <p:sld xmlns:a="http://schemas.openxmlformats.org/drawingml/2006/main" xmlns:r="http://schemas.openxmlformats.org/officeDocument/2006/relationships" xmlns:p="http://schemas.openxmlformats.org/presentationml/2006/main">
   <p:cSld>
     <p:spTree>
@@ -8092,7 +7866,7 @@
           <a:p>
             <a:fld id="{31DE2C5B-556E-47B8-A792-024C2FCA4ACC}" type="slidenum">
               <a:rPr lang="en-GB" smtClean="0"/>
-              <a:t>22</a:t>
+              <a:t>21</a:t>
             </a:fld>
             <a:endParaRPr lang="en-GB"/>
           </a:p>
@@ -8520,7 +8294,7 @@
 </p:sld>
 </file>
 
-<file path=ppt/slides/slide23.xml><?xml version="1.0" encoding="utf-8"?>
+<file path=ppt/slides/slide22.xml><?xml version="1.0" encoding="utf-8"?>
 <p:sld xmlns:a="http://schemas.openxmlformats.org/drawingml/2006/main" xmlns:r="http://schemas.openxmlformats.org/officeDocument/2006/relationships" xmlns:p="http://schemas.openxmlformats.org/presentationml/2006/main">
   <p:cSld>
     <p:spTree>
@@ -8839,7 +8613,7 @@
           <a:p>
             <a:fld id="{31DE2C5B-556E-47B8-A792-024C2FCA4ACC}" type="slidenum">
               <a:rPr lang="en-GB" smtClean="0"/>
-              <a:t>23</a:t>
+              <a:t>22</a:t>
             </a:fld>
             <a:endParaRPr lang="en-GB" dirty="0"/>
           </a:p>
@@ -8873,7 +8647,7 @@
         </p:blipFill>
         <p:spPr>
           <a:xfrm>
-            <a:off x="10203543" y="1361167"/>
+            <a:off x="9977511" y="1792681"/>
             <a:ext cx="1298702" cy="1298702"/>
           </a:xfrm>
           <a:prstGeom prst="rect">
@@ -9293,7 +9067,7 @@
 </p:sld>
 </file>
 
-<file path=ppt/slides/slide24.xml><?xml version="1.0" encoding="utf-8"?>
+<file path=ppt/slides/slide23.xml><?xml version="1.0" encoding="utf-8"?>
 <p:sld xmlns:a="http://schemas.openxmlformats.org/drawingml/2006/main" xmlns:r="http://schemas.openxmlformats.org/officeDocument/2006/relationships" xmlns:p="http://schemas.openxmlformats.org/presentationml/2006/main">
   <p:cSld>
     <p:spTree>
@@ -9453,7 +9227,7 @@
           <a:p>
             <a:fld id="{31DE2C5B-556E-47B8-A792-024C2FCA4ACC}" type="slidenum">
               <a:rPr lang="en-GB" smtClean="0"/>
-              <a:t>24</a:t>
+              <a:t>23</a:t>
             </a:fld>
             <a:endParaRPr lang="en-GB"/>
           </a:p>
@@ -10071,7 +9845,7 @@
 </p:sld>
 </file>
 
-<file path=ppt/slides/slide25.xml><?xml version="1.0" encoding="utf-8"?>
+<file path=ppt/slides/slide24.xml><?xml version="1.0" encoding="utf-8"?>
 <p:sld xmlns:a="http://schemas.openxmlformats.org/drawingml/2006/main" xmlns:r="http://schemas.openxmlformats.org/officeDocument/2006/relationships" xmlns:p="http://schemas.openxmlformats.org/presentationml/2006/main">
   <p:cSld>
     <p:spTree>
@@ -10156,7 +9930,7 @@
           <a:p>
             <a:fld id="{31DE2C5B-556E-47B8-A792-024C2FCA4ACC}" type="slidenum">
               <a:rPr lang="en-GB" smtClean="0"/>
-              <a:t>25</a:t>
+              <a:t>24</a:t>
             </a:fld>
             <a:endParaRPr lang="en-GB"/>
           </a:p>
@@ -10245,7 +10019,7 @@
 </p:sld>
 </file>
 
-<file path=ppt/slides/slide26.xml><?xml version="1.0" encoding="utf-8"?>
+<file path=ppt/slides/slide25.xml><?xml version="1.0" encoding="utf-8"?>
 <p:sld xmlns:a="http://schemas.openxmlformats.org/drawingml/2006/main" xmlns:r="http://schemas.openxmlformats.org/officeDocument/2006/relationships" xmlns:p="http://schemas.openxmlformats.org/presentationml/2006/main">
   <p:cSld>
     <p:spTree>
@@ -10338,7 +10112,7 @@
           <a:p>
             <a:fld id="{31DE2C5B-556E-47B8-A792-024C2FCA4ACC}" type="slidenum">
               <a:rPr lang="en-GB" smtClean="0"/>
-              <a:t>26</a:t>
+              <a:t>25</a:t>
             </a:fld>
             <a:endParaRPr lang="en-GB"/>
           </a:p>
@@ -10427,7 +10201,7 @@
 </p:sld>
 </file>
 
-<file path=ppt/slides/slide27.xml><?xml version="1.0" encoding="utf-8"?>
+<file path=ppt/slides/slide26.xml><?xml version="1.0" encoding="utf-8"?>
 <p:sld xmlns:a="http://schemas.openxmlformats.org/drawingml/2006/main" xmlns:r="http://schemas.openxmlformats.org/officeDocument/2006/relationships" xmlns:p="http://schemas.openxmlformats.org/presentationml/2006/main">
   <p:cSld>
     <p:spTree>
@@ -10521,10 +10295,7 @@
                 <a:spcPts val="600"/>
               </a:spcAft>
             </a:pPr>
-            <a:r>
-              <a:rPr lang="en-GB" sz="2200" dirty="0"/>
-              <a:t> </a:t>
-            </a:r>
+            <a:endParaRPr lang="en-GB" sz="2200" dirty="0"/>
           </a:p>
           <a:p>
             <a:pPr>
@@ -10670,7 +10441,7 @@
           <a:p>
             <a:fld id="{31DE2C5B-556E-47B8-A792-024C2FCA4ACC}" type="slidenum">
               <a:rPr lang="en-GB" smtClean="0"/>
-              <a:t>27</a:t>
+              <a:t>26</a:t>
             </a:fld>
             <a:endParaRPr lang="en-GB"/>
           </a:p>
@@ -11070,7 +10841,7 @@
 </p:sld>
 </file>
 
-<file path=ppt/slides/slide28.xml><?xml version="1.0" encoding="utf-8"?>
+<file path=ppt/slides/slide27.xml><?xml version="1.0" encoding="utf-8"?>
 <p:sld xmlns:a="http://schemas.openxmlformats.org/drawingml/2006/main" xmlns:r="http://schemas.openxmlformats.org/officeDocument/2006/relationships" xmlns:p="http://schemas.openxmlformats.org/presentationml/2006/main">
   <p:cSld>
     <p:spTree>
@@ -11157,7 +10928,7 @@
           <a:p>
             <a:fld id="{31DE2C5B-556E-47B8-A792-024C2FCA4ACC}" type="slidenum">
               <a:rPr lang="en-GB" smtClean="0"/>
-              <a:t>28</a:t>
+              <a:t>27</a:t>
             </a:fld>
             <a:endParaRPr lang="en-GB"/>
           </a:p>
@@ -11206,7 +10977,7 @@
 </p:sld>
 </file>
 
-<file path=ppt/slides/slide29.xml><?xml version="1.0" encoding="utf-8"?>
+<file path=ppt/slides/slide28.xml><?xml version="1.0" encoding="utf-8"?>
 <p:sld xmlns:a="http://schemas.openxmlformats.org/drawingml/2006/main" xmlns:r="http://schemas.openxmlformats.org/officeDocument/2006/relationships" xmlns:p="http://schemas.openxmlformats.org/presentationml/2006/main">
   <p:cSld>
     <p:spTree>
@@ -11363,7 +11134,7 @@
           <a:p>
             <a:fld id="{31DE2C5B-556E-47B8-A792-024C2FCA4ACC}" type="slidenum">
               <a:rPr lang="en-GB" smtClean="0"/>
-              <a:t>29</a:t>
+              <a:t>28</a:t>
             </a:fld>
             <a:endParaRPr lang="en-GB"/>
           </a:p>
@@ -11461,429 +11232,7 @@
 </p:sld>
 </file>
 
-<file path=ppt/slides/slide3.xml><?xml version="1.0" encoding="utf-8"?>
-<p:sld xmlns:a="http://schemas.openxmlformats.org/drawingml/2006/main" xmlns:r="http://schemas.openxmlformats.org/officeDocument/2006/relationships" xmlns:p="http://schemas.openxmlformats.org/presentationml/2006/main">
-  <p:cSld>
-    <p:spTree>
-      <p:nvGrpSpPr>
-        <p:cNvPr id="1" name=""/>
-        <p:cNvGrpSpPr/>
-        <p:nvPr/>
-      </p:nvGrpSpPr>
-      <p:grpSpPr>
-        <a:xfrm>
-          <a:off x="0" y="0"/>
-          <a:ext cx="0" cy="0"/>
-          <a:chOff x="0" y="0"/>
-          <a:chExt cx="0" cy="0"/>
-        </a:xfrm>
-      </p:grpSpPr>
-      <p:sp>
-        <p:nvSpPr>
-          <p:cNvPr id="2" name="Titolo 1"/>
-          <p:cNvSpPr>
-            <a:spLocks noGrp="1"/>
-          </p:cNvSpPr>
-          <p:nvPr>
-            <p:ph type="title"/>
-          </p:nvPr>
-        </p:nvSpPr>
-        <p:spPr/>
-        <p:txBody>
-          <a:bodyPr/>
-          <a:lstStyle/>
-          <a:p>
-            <a:r>
-              <a:rPr lang="it-IT" dirty="0"/>
-              <a:t>Data </a:t>
-            </a:r>
-            <a:r>
-              <a:rPr lang="it-IT" dirty="0" err="1"/>
-              <a:t>protection</a:t>
-            </a:r>
-            <a:endParaRPr lang="en-GB" dirty="0"/>
-          </a:p>
-        </p:txBody>
-      </p:sp>
-      <p:sp>
-        <p:nvSpPr>
-          <p:cNvPr id="3" name="Segnaposto contenuto 2"/>
-          <p:cNvSpPr>
-            <a:spLocks noGrp="1"/>
-          </p:cNvSpPr>
-          <p:nvPr>
-            <p:ph idx="1"/>
-          </p:nvPr>
-        </p:nvSpPr>
-        <p:spPr>
-          <a:xfrm>
-            <a:off x="428172" y="1361167"/>
-            <a:ext cx="11368314" cy="5169029"/>
-          </a:xfrm>
-        </p:spPr>
-        <p:txBody>
-          <a:bodyPr>
-            <a:normAutofit lnSpcReduction="10000"/>
-          </a:bodyPr>
-          <a:lstStyle/>
-          <a:p>
-            <a:r>
-              <a:rPr lang="it-IT" dirty="0"/>
-              <a:t>The </a:t>
-            </a:r>
-            <a:r>
-              <a:rPr lang="en-GB" dirty="0"/>
-              <a:t>European Charter of Fundamental Rights (Article 8) contains an explicit right to the </a:t>
-            </a:r>
-            <a:r>
-              <a:rPr lang="en-GB" b="1" dirty="0"/>
-              <a:t>protection of personal data</a:t>
-            </a:r>
-            <a:r>
-              <a:rPr lang="en-GB" dirty="0"/>
-              <a:t>. </a:t>
-            </a:r>
-          </a:p>
-          <a:p>
-            <a:endParaRPr lang="en-GB" b="1" dirty="0"/>
-          </a:p>
-          <a:p>
-            <a:r>
-              <a:rPr lang="en-GB" b="1" dirty="0"/>
-              <a:t>Data protection </a:t>
-            </a:r>
-            <a:r>
-              <a:rPr lang="en-GB" b="1" dirty="0">
-                <a:sym typeface="Wingdings" panose="05000000000000000000" pitchFamily="2" charset="2"/>
-              </a:rPr>
-              <a:t> </a:t>
-            </a:r>
-            <a:r>
-              <a:rPr lang="en-GB" dirty="0"/>
-              <a:t>ensure the fair processing (collection, use, storage) of </a:t>
-            </a:r>
-            <a:r>
-              <a:rPr lang="en-GB" u="sng" dirty="0"/>
-              <a:t>personal data </a:t>
-            </a:r>
-            <a:r>
-              <a:rPr lang="en-GB" dirty="0"/>
-              <a:t>by public and private sectors.</a:t>
-            </a:r>
-          </a:p>
-          <a:p>
-            <a:endParaRPr lang="en-GB" b="1" dirty="0"/>
-          </a:p>
-          <a:p>
-            <a:r>
-              <a:rPr lang="en-GB" b="1" dirty="0"/>
-              <a:t>Personal data: </a:t>
-            </a:r>
-            <a:r>
-              <a:rPr lang="en-GB" dirty="0"/>
-              <a:t>any information related to an identified or identifiable natural (living) person</a:t>
-            </a:r>
-          </a:p>
-          <a:p>
-            <a:pPr lvl="1"/>
-            <a:r>
-              <a:rPr lang="en-GB" dirty="0"/>
-              <a:t>Identifiable natural person: one who can be identified, directly or indirectly, by an identifier such as a name, an identification number, location data, etc.</a:t>
-            </a:r>
-          </a:p>
-          <a:p>
-            <a:pPr lvl="1"/>
-            <a:endParaRPr lang="en-GB" dirty="0"/>
-          </a:p>
-          <a:p>
-            <a:r>
-              <a:rPr lang="en-US" dirty="0"/>
-              <a:t>Examples</a:t>
-            </a:r>
-            <a:r>
-              <a:rPr lang="it-IT" dirty="0"/>
-              <a:t> of personal data: </a:t>
-            </a:r>
-            <a:endParaRPr lang="en-GB" dirty="0"/>
-          </a:p>
-          <a:p>
-            <a:pPr lvl="1"/>
-            <a:r>
-              <a:rPr lang="en-GB" dirty="0"/>
-              <a:t>Names, dates of birth, photographs, email addresses and telephone numbers</a:t>
-            </a:r>
-          </a:p>
-          <a:p>
-            <a:pPr lvl="1"/>
-            <a:r>
-              <a:rPr lang="en-GB" dirty="0"/>
-              <a:t>IP addresses and communication content related to or provided by end-users of communications services</a:t>
-            </a:r>
-          </a:p>
-          <a:p>
-            <a:pPr lvl="1"/>
-            <a:endParaRPr lang="en-GB" dirty="0"/>
-          </a:p>
-        </p:txBody>
-      </p:sp>
-      <p:sp>
-        <p:nvSpPr>
-          <p:cNvPr id="4" name="Segnaposto numero diapositiva 3"/>
-          <p:cNvSpPr>
-            <a:spLocks noGrp="1"/>
-          </p:cNvSpPr>
-          <p:nvPr>
-            <p:ph type="sldNum" sz="quarter" idx="12"/>
-          </p:nvPr>
-        </p:nvSpPr>
-        <p:spPr/>
-        <p:txBody>
-          <a:bodyPr/>
-          <a:lstStyle/>
-          <a:p>
-            <a:fld id="{31DE2C5B-556E-47B8-A792-024C2FCA4ACC}" type="slidenum">
-              <a:rPr lang="en-GB" smtClean="0"/>
-              <a:t>3</a:t>
-            </a:fld>
-            <a:endParaRPr lang="en-GB"/>
-          </a:p>
-        </p:txBody>
-      </p:sp>
-    </p:spTree>
-    <p:extLst>
-      <p:ext uri="{BB962C8B-B14F-4D97-AF65-F5344CB8AC3E}">
-        <p14:creationId xmlns:p14="http://schemas.microsoft.com/office/powerpoint/2010/main" val="3378264413"/>
-      </p:ext>
-    </p:extLst>
-  </p:cSld>
-  <p:clrMapOvr>
-    <a:masterClrMapping/>
-  </p:clrMapOvr>
-  <p:timing>
-    <p:tnLst>
-      <p:par>
-        <p:cTn id="1" dur="indefinite" restart="never" nodeType="tmRoot">
-          <p:childTnLst>
-            <p:seq concurrent="1" nextAc="seek">
-              <p:cTn id="2" dur="indefinite" nodeType="mainSeq">
-                <p:childTnLst>
-                  <p:par>
-                    <p:cTn id="3" fill="hold">
-                      <p:stCondLst>
-                        <p:cond delay="indefinite"/>
-                      </p:stCondLst>
-                      <p:childTnLst>
-                        <p:par>
-                          <p:cTn id="4" fill="hold">
-                            <p:stCondLst>
-                              <p:cond delay="0"/>
-                            </p:stCondLst>
-                            <p:childTnLst>
-                              <p:par>
-                                <p:cTn id="5" presetID="1" presetClass="entr" presetSubtype="0" fill="hold" nodeType="clickEffect">
-                                  <p:stCondLst>
-                                    <p:cond delay="0"/>
-                                  </p:stCondLst>
-                                  <p:childTnLst>
-                                    <p:set>
-                                      <p:cBhvr>
-                                        <p:cTn id="6" dur="1" fill="hold">
-                                          <p:stCondLst>
-                                            <p:cond delay="0"/>
-                                          </p:stCondLst>
-                                        </p:cTn>
-                                        <p:tgtEl>
-                                          <p:spTgt spid="3">
-                                            <p:txEl>
-                                              <p:pRg st="4" end="4"/>
-                                            </p:txEl>
-                                          </p:spTgt>
-                                        </p:tgtEl>
-                                        <p:attrNameLst>
-                                          <p:attrName>style.visibility</p:attrName>
-                                        </p:attrNameLst>
-                                      </p:cBhvr>
-                                      <p:to>
-                                        <p:strVal val="visible"/>
-                                      </p:to>
-                                    </p:set>
-                                  </p:childTnLst>
-                                </p:cTn>
-                              </p:par>
-                              <p:par>
-                                <p:cTn id="7" presetID="1" presetClass="entr" presetSubtype="0" fill="hold" nodeType="withEffect">
-                                  <p:stCondLst>
-                                    <p:cond delay="0"/>
-                                  </p:stCondLst>
-                                  <p:childTnLst>
-                                    <p:set>
-                                      <p:cBhvr>
-                                        <p:cTn id="8" dur="1" fill="hold">
-                                          <p:stCondLst>
-                                            <p:cond delay="0"/>
-                                          </p:stCondLst>
-                                        </p:cTn>
-                                        <p:tgtEl>
-                                          <p:spTgt spid="3">
-                                            <p:txEl>
-                                              <p:pRg st="5" end="5"/>
-                                            </p:txEl>
-                                          </p:spTgt>
-                                        </p:tgtEl>
-                                        <p:attrNameLst>
-                                          <p:attrName>style.visibility</p:attrName>
-                                        </p:attrNameLst>
-                                      </p:cBhvr>
-                                      <p:to>
-                                        <p:strVal val="visible"/>
-                                      </p:to>
-                                    </p:set>
-                                  </p:childTnLst>
-                                </p:cTn>
-                              </p:par>
-                            </p:childTnLst>
-                          </p:cTn>
-                        </p:par>
-                      </p:childTnLst>
-                    </p:cTn>
-                  </p:par>
-                  <p:par>
-                    <p:cTn id="9" fill="hold">
-                      <p:stCondLst>
-                        <p:cond delay="indefinite"/>
-                      </p:stCondLst>
-                      <p:childTnLst>
-                        <p:par>
-                          <p:cTn id="10" fill="hold">
-                            <p:stCondLst>
-                              <p:cond delay="0"/>
-                            </p:stCondLst>
-                            <p:childTnLst>
-                              <p:par>
-                                <p:cTn id="11" presetID="1" presetClass="entr" presetSubtype="0" fill="hold" nodeType="clickEffect">
-                                  <p:stCondLst>
-                                    <p:cond delay="0"/>
-                                  </p:stCondLst>
-                                  <p:childTnLst>
-                                    <p:set>
-                                      <p:cBhvr>
-                                        <p:cTn id="12" dur="1" fill="hold">
-                                          <p:stCondLst>
-                                            <p:cond delay="0"/>
-                                          </p:stCondLst>
-                                        </p:cTn>
-                                        <p:tgtEl>
-                                          <p:spTgt spid="3">
-                                            <p:txEl>
-                                              <p:pRg st="7" end="7"/>
-                                            </p:txEl>
-                                          </p:spTgt>
-                                        </p:tgtEl>
-                                        <p:attrNameLst>
-                                          <p:attrName>style.visibility</p:attrName>
-                                        </p:attrNameLst>
-                                      </p:cBhvr>
-                                      <p:to>
-                                        <p:strVal val="visible"/>
-                                      </p:to>
-                                    </p:set>
-                                  </p:childTnLst>
-                                </p:cTn>
-                              </p:par>
-                              <p:par>
-                                <p:cTn id="13" presetID="1" presetClass="entr" presetSubtype="0" fill="hold" nodeType="withEffect">
-                                  <p:stCondLst>
-                                    <p:cond delay="0"/>
-                                  </p:stCondLst>
-                                  <p:childTnLst>
-                                    <p:set>
-                                      <p:cBhvr>
-                                        <p:cTn id="14" dur="1" fill="hold">
-                                          <p:stCondLst>
-                                            <p:cond delay="0"/>
-                                          </p:stCondLst>
-                                        </p:cTn>
-                                        <p:tgtEl>
-                                          <p:spTgt spid="3">
-                                            <p:txEl>
-                                              <p:pRg st="8" end="8"/>
-                                            </p:txEl>
-                                          </p:spTgt>
-                                        </p:tgtEl>
-                                        <p:attrNameLst>
-                                          <p:attrName>style.visibility</p:attrName>
-                                        </p:attrNameLst>
-                                      </p:cBhvr>
-                                      <p:to>
-                                        <p:strVal val="visible"/>
-                                      </p:to>
-                                    </p:set>
-                                  </p:childTnLst>
-                                </p:cTn>
-                              </p:par>
-                              <p:par>
-                                <p:cTn id="15" presetID="1" presetClass="entr" presetSubtype="0" fill="hold" nodeType="withEffect">
-                                  <p:stCondLst>
-                                    <p:cond delay="0"/>
-                                  </p:stCondLst>
-                                  <p:childTnLst>
-                                    <p:set>
-                                      <p:cBhvr>
-                                        <p:cTn id="16" dur="1" fill="hold">
-                                          <p:stCondLst>
-                                            <p:cond delay="0"/>
-                                          </p:stCondLst>
-                                        </p:cTn>
-                                        <p:tgtEl>
-                                          <p:spTgt spid="3">
-                                            <p:txEl>
-                                              <p:pRg st="9" end="9"/>
-                                            </p:txEl>
-                                          </p:spTgt>
-                                        </p:tgtEl>
-                                        <p:attrNameLst>
-                                          <p:attrName>style.visibility</p:attrName>
-                                        </p:attrNameLst>
-                                      </p:cBhvr>
-                                      <p:to>
-                                        <p:strVal val="visible"/>
-                                      </p:to>
-                                    </p:set>
-                                  </p:childTnLst>
-                                </p:cTn>
-                              </p:par>
-                            </p:childTnLst>
-                          </p:cTn>
-                        </p:par>
-                      </p:childTnLst>
-                    </p:cTn>
-                  </p:par>
-                </p:childTnLst>
-              </p:cTn>
-              <p:prevCondLst>
-                <p:cond evt="onPrev" delay="0">
-                  <p:tgtEl>
-                    <p:sldTgt/>
-                  </p:tgtEl>
-                </p:cond>
-              </p:prevCondLst>
-              <p:nextCondLst>
-                <p:cond evt="onNext" delay="0">
-                  <p:tgtEl>
-                    <p:sldTgt/>
-                  </p:tgtEl>
-                </p:cond>
-              </p:nextCondLst>
-            </p:seq>
-          </p:childTnLst>
-        </p:cTn>
-      </p:par>
-    </p:tnLst>
-  </p:timing>
-</p:sld>
-</file>
-
-<file path=ppt/slides/slide30.xml><?xml version="1.0" encoding="utf-8"?>
+<file path=ppt/slides/slide29.xml><?xml version="1.0" encoding="utf-8"?>
 <p:sld xmlns:a="http://schemas.openxmlformats.org/drawingml/2006/main" xmlns:r="http://schemas.openxmlformats.org/officeDocument/2006/relationships" xmlns:p="http://schemas.openxmlformats.org/presentationml/2006/main">
   <p:cSld>
     <p:spTree>
@@ -11979,7 +11328,7 @@
             </a:r>
             <a:r>
               <a:rPr lang="en-GB" dirty="0"/>
-              <a:t> in which special personal data can be processed: </a:t>
+              <a:t> in which special personal data can be processed exist:</a:t>
             </a:r>
           </a:p>
           <a:p>
@@ -12104,7 +11453,7 @@
           <a:p>
             <a:fld id="{31DE2C5B-556E-47B8-A792-024C2FCA4ACC}" type="slidenum">
               <a:rPr lang="en-GB" smtClean="0"/>
-              <a:t>30</a:t>
+              <a:t>29</a:t>
             </a:fld>
             <a:endParaRPr lang="en-GB"/>
           </a:p>
@@ -12447,7 +11796,429 @@
 </p:sld>
 </file>
 
-<file path=ppt/slides/slide31.xml><?xml version="1.0" encoding="utf-8"?>
+<file path=ppt/slides/slide3.xml><?xml version="1.0" encoding="utf-8"?>
+<p:sld xmlns:a="http://schemas.openxmlformats.org/drawingml/2006/main" xmlns:r="http://schemas.openxmlformats.org/officeDocument/2006/relationships" xmlns:p="http://schemas.openxmlformats.org/presentationml/2006/main">
+  <p:cSld>
+    <p:spTree>
+      <p:nvGrpSpPr>
+        <p:cNvPr id="1" name=""/>
+        <p:cNvGrpSpPr/>
+        <p:nvPr/>
+      </p:nvGrpSpPr>
+      <p:grpSpPr>
+        <a:xfrm>
+          <a:off x="0" y="0"/>
+          <a:ext cx="0" cy="0"/>
+          <a:chOff x="0" y="0"/>
+          <a:chExt cx="0" cy="0"/>
+        </a:xfrm>
+      </p:grpSpPr>
+      <p:sp>
+        <p:nvSpPr>
+          <p:cNvPr id="2" name="Titolo 1"/>
+          <p:cNvSpPr>
+            <a:spLocks noGrp="1"/>
+          </p:cNvSpPr>
+          <p:nvPr>
+            <p:ph type="title"/>
+          </p:nvPr>
+        </p:nvSpPr>
+        <p:spPr/>
+        <p:txBody>
+          <a:bodyPr/>
+          <a:lstStyle/>
+          <a:p>
+            <a:r>
+              <a:rPr lang="it-IT" dirty="0"/>
+              <a:t>Data </a:t>
+            </a:r>
+            <a:r>
+              <a:rPr lang="it-IT" dirty="0" err="1"/>
+              <a:t>protection</a:t>
+            </a:r>
+            <a:endParaRPr lang="en-GB" dirty="0"/>
+          </a:p>
+        </p:txBody>
+      </p:sp>
+      <p:sp>
+        <p:nvSpPr>
+          <p:cNvPr id="3" name="Segnaposto contenuto 2"/>
+          <p:cNvSpPr>
+            <a:spLocks noGrp="1"/>
+          </p:cNvSpPr>
+          <p:nvPr>
+            <p:ph idx="1"/>
+          </p:nvPr>
+        </p:nvSpPr>
+        <p:spPr>
+          <a:xfrm>
+            <a:off x="428172" y="1361167"/>
+            <a:ext cx="11368314" cy="5169029"/>
+          </a:xfrm>
+        </p:spPr>
+        <p:txBody>
+          <a:bodyPr>
+            <a:normAutofit lnSpcReduction="10000"/>
+          </a:bodyPr>
+          <a:lstStyle/>
+          <a:p>
+            <a:r>
+              <a:rPr lang="it-IT" dirty="0"/>
+              <a:t>The </a:t>
+            </a:r>
+            <a:r>
+              <a:rPr lang="en-GB" dirty="0"/>
+              <a:t>European Charter of Fundamental Rights (Article 8) contains an explicit right to the </a:t>
+            </a:r>
+            <a:r>
+              <a:rPr lang="en-GB" b="1" dirty="0"/>
+              <a:t>protection of personal data</a:t>
+            </a:r>
+            <a:r>
+              <a:rPr lang="en-GB" dirty="0"/>
+              <a:t>. </a:t>
+            </a:r>
+          </a:p>
+          <a:p>
+            <a:endParaRPr lang="en-GB" b="1" dirty="0"/>
+          </a:p>
+          <a:p>
+            <a:r>
+              <a:rPr lang="en-GB" b="1" dirty="0"/>
+              <a:t>Data protection </a:t>
+            </a:r>
+            <a:r>
+              <a:rPr lang="en-GB" b="1" dirty="0">
+                <a:sym typeface="Wingdings" panose="05000000000000000000" pitchFamily="2" charset="2"/>
+              </a:rPr>
+              <a:t> </a:t>
+            </a:r>
+            <a:r>
+              <a:rPr lang="en-GB" dirty="0"/>
+              <a:t>ensure the fair processing (collection, use, storage) of </a:t>
+            </a:r>
+            <a:r>
+              <a:rPr lang="en-GB" u="sng" dirty="0"/>
+              <a:t>personal data </a:t>
+            </a:r>
+            <a:r>
+              <a:rPr lang="en-GB" dirty="0"/>
+              <a:t>by public and private sectors.</a:t>
+            </a:r>
+          </a:p>
+          <a:p>
+            <a:endParaRPr lang="en-GB" b="1" dirty="0"/>
+          </a:p>
+          <a:p>
+            <a:r>
+              <a:rPr lang="en-GB" b="1" dirty="0"/>
+              <a:t>Personal data: </a:t>
+            </a:r>
+            <a:r>
+              <a:rPr lang="en-GB" dirty="0"/>
+              <a:t>any information related to an identified or identifiable natural (living) person</a:t>
+            </a:r>
+          </a:p>
+          <a:p>
+            <a:pPr lvl="1"/>
+            <a:r>
+              <a:rPr lang="en-GB" dirty="0"/>
+              <a:t>Identifiable natural person: one who can be identified, directly or indirectly, by an identifier such as a name, an identification number, location data, etc.</a:t>
+            </a:r>
+          </a:p>
+          <a:p>
+            <a:pPr lvl="1"/>
+            <a:endParaRPr lang="en-GB" dirty="0"/>
+          </a:p>
+          <a:p>
+            <a:r>
+              <a:rPr lang="en-US" dirty="0"/>
+              <a:t>Examples</a:t>
+            </a:r>
+            <a:r>
+              <a:rPr lang="it-IT" dirty="0"/>
+              <a:t> of personal data: </a:t>
+            </a:r>
+            <a:endParaRPr lang="en-GB" dirty="0"/>
+          </a:p>
+          <a:p>
+            <a:pPr lvl="1"/>
+            <a:r>
+              <a:rPr lang="en-GB" dirty="0"/>
+              <a:t>Names, dates of birth, photographs, email addresses and telephone numbers</a:t>
+            </a:r>
+          </a:p>
+          <a:p>
+            <a:pPr lvl="1"/>
+            <a:r>
+              <a:rPr lang="en-GB" dirty="0"/>
+              <a:t>IP addresses and communication content related to or provided by end-users of communications services</a:t>
+            </a:r>
+          </a:p>
+          <a:p>
+            <a:pPr lvl="1"/>
+            <a:endParaRPr lang="en-GB" dirty="0"/>
+          </a:p>
+        </p:txBody>
+      </p:sp>
+      <p:sp>
+        <p:nvSpPr>
+          <p:cNvPr id="4" name="Segnaposto numero diapositiva 3"/>
+          <p:cNvSpPr>
+            <a:spLocks noGrp="1"/>
+          </p:cNvSpPr>
+          <p:nvPr>
+            <p:ph type="sldNum" sz="quarter" idx="12"/>
+          </p:nvPr>
+        </p:nvSpPr>
+        <p:spPr/>
+        <p:txBody>
+          <a:bodyPr/>
+          <a:lstStyle/>
+          <a:p>
+            <a:fld id="{31DE2C5B-556E-47B8-A792-024C2FCA4ACC}" type="slidenum">
+              <a:rPr lang="en-GB" smtClean="0"/>
+              <a:t>3</a:t>
+            </a:fld>
+            <a:endParaRPr lang="en-GB"/>
+          </a:p>
+        </p:txBody>
+      </p:sp>
+    </p:spTree>
+    <p:extLst>
+      <p:ext uri="{BB962C8B-B14F-4D97-AF65-F5344CB8AC3E}">
+        <p14:creationId xmlns:p14="http://schemas.microsoft.com/office/powerpoint/2010/main" val="3378264413"/>
+      </p:ext>
+    </p:extLst>
+  </p:cSld>
+  <p:clrMapOvr>
+    <a:masterClrMapping/>
+  </p:clrMapOvr>
+  <p:timing>
+    <p:tnLst>
+      <p:par>
+        <p:cTn id="1" dur="indefinite" restart="never" nodeType="tmRoot">
+          <p:childTnLst>
+            <p:seq concurrent="1" nextAc="seek">
+              <p:cTn id="2" dur="indefinite" nodeType="mainSeq">
+                <p:childTnLst>
+                  <p:par>
+                    <p:cTn id="3" fill="hold">
+                      <p:stCondLst>
+                        <p:cond delay="indefinite"/>
+                      </p:stCondLst>
+                      <p:childTnLst>
+                        <p:par>
+                          <p:cTn id="4" fill="hold">
+                            <p:stCondLst>
+                              <p:cond delay="0"/>
+                            </p:stCondLst>
+                            <p:childTnLst>
+                              <p:par>
+                                <p:cTn id="5" presetID="1" presetClass="entr" presetSubtype="0" fill="hold" nodeType="clickEffect">
+                                  <p:stCondLst>
+                                    <p:cond delay="0"/>
+                                  </p:stCondLst>
+                                  <p:childTnLst>
+                                    <p:set>
+                                      <p:cBhvr>
+                                        <p:cTn id="6" dur="1" fill="hold">
+                                          <p:stCondLst>
+                                            <p:cond delay="0"/>
+                                          </p:stCondLst>
+                                        </p:cTn>
+                                        <p:tgtEl>
+                                          <p:spTgt spid="3">
+                                            <p:txEl>
+                                              <p:pRg st="4" end="4"/>
+                                            </p:txEl>
+                                          </p:spTgt>
+                                        </p:tgtEl>
+                                        <p:attrNameLst>
+                                          <p:attrName>style.visibility</p:attrName>
+                                        </p:attrNameLst>
+                                      </p:cBhvr>
+                                      <p:to>
+                                        <p:strVal val="visible"/>
+                                      </p:to>
+                                    </p:set>
+                                  </p:childTnLst>
+                                </p:cTn>
+                              </p:par>
+                              <p:par>
+                                <p:cTn id="7" presetID="1" presetClass="entr" presetSubtype="0" fill="hold" nodeType="withEffect">
+                                  <p:stCondLst>
+                                    <p:cond delay="0"/>
+                                  </p:stCondLst>
+                                  <p:childTnLst>
+                                    <p:set>
+                                      <p:cBhvr>
+                                        <p:cTn id="8" dur="1" fill="hold">
+                                          <p:stCondLst>
+                                            <p:cond delay="0"/>
+                                          </p:stCondLst>
+                                        </p:cTn>
+                                        <p:tgtEl>
+                                          <p:spTgt spid="3">
+                                            <p:txEl>
+                                              <p:pRg st="5" end="5"/>
+                                            </p:txEl>
+                                          </p:spTgt>
+                                        </p:tgtEl>
+                                        <p:attrNameLst>
+                                          <p:attrName>style.visibility</p:attrName>
+                                        </p:attrNameLst>
+                                      </p:cBhvr>
+                                      <p:to>
+                                        <p:strVal val="visible"/>
+                                      </p:to>
+                                    </p:set>
+                                  </p:childTnLst>
+                                </p:cTn>
+                              </p:par>
+                            </p:childTnLst>
+                          </p:cTn>
+                        </p:par>
+                      </p:childTnLst>
+                    </p:cTn>
+                  </p:par>
+                  <p:par>
+                    <p:cTn id="9" fill="hold">
+                      <p:stCondLst>
+                        <p:cond delay="indefinite"/>
+                      </p:stCondLst>
+                      <p:childTnLst>
+                        <p:par>
+                          <p:cTn id="10" fill="hold">
+                            <p:stCondLst>
+                              <p:cond delay="0"/>
+                            </p:stCondLst>
+                            <p:childTnLst>
+                              <p:par>
+                                <p:cTn id="11" presetID="1" presetClass="entr" presetSubtype="0" fill="hold" nodeType="clickEffect">
+                                  <p:stCondLst>
+                                    <p:cond delay="0"/>
+                                  </p:stCondLst>
+                                  <p:childTnLst>
+                                    <p:set>
+                                      <p:cBhvr>
+                                        <p:cTn id="12" dur="1" fill="hold">
+                                          <p:stCondLst>
+                                            <p:cond delay="0"/>
+                                          </p:stCondLst>
+                                        </p:cTn>
+                                        <p:tgtEl>
+                                          <p:spTgt spid="3">
+                                            <p:txEl>
+                                              <p:pRg st="7" end="7"/>
+                                            </p:txEl>
+                                          </p:spTgt>
+                                        </p:tgtEl>
+                                        <p:attrNameLst>
+                                          <p:attrName>style.visibility</p:attrName>
+                                        </p:attrNameLst>
+                                      </p:cBhvr>
+                                      <p:to>
+                                        <p:strVal val="visible"/>
+                                      </p:to>
+                                    </p:set>
+                                  </p:childTnLst>
+                                </p:cTn>
+                              </p:par>
+                              <p:par>
+                                <p:cTn id="13" presetID="1" presetClass="entr" presetSubtype="0" fill="hold" nodeType="withEffect">
+                                  <p:stCondLst>
+                                    <p:cond delay="0"/>
+                                  </p:stCondLst>
+                                  <p:childTnLst>
+                                    <p:set>
+                                      <p:cBhvr>
+                                        <p:cTn id="14" dur="1" fill="hold">
+                                          <p:stCondLst>
+                                            <p:cond delay="0"/>
+                                          </p:stCondLst>
+                                        </p:cTn>
+                                        <p:tgtEl>
+                                          <p:spTgt spid="3">
+                                            <p:txEl>
+                                              <p:pRg st="8" end="8"/>
+                                            </p:txEl>
+                                          </p:spTgt>
+                                        </p:tgtEl>
+                                        <p:attrNameLst>
+                                          <p:attrName>style.visibility</p:attrName>
+                                        </p:attrNameLst>
+                                      </p:cBhvr>
+                                      <p:to>
+                                        <p:strVal val="visible"/>
+                                      </p:to>
+                                    </p:set>
+                                  </p:childTnLst>
+                                </p:cTn>
+                              </p:par>
+                              <p:par>
+                                <p:cTn id="15" presetID="1" presetClass="entr" presetSubtype="0" fill="hold" nodeType="withEffect">
+                                  <p:stCondLst>
+                                    <p:cond delay="0"/>
+                                  </p:stCondLst>
+                                  <p:childTnLst>
+                                    <p:set>
+                                      <p:cBhvr>
+                                        <p:cTn id="16" dur="1" fill="hold">
+                                          <p:stCondLst>
+                                            <p:cond delay="0"/>
+                                          </p:stCondLst>
+                                        </p:cTn>
+                                        <p:tgtEl>
+                                          <p:spTgt spid="3">
+                                            <p:txEl>
+                                              <p:pRg st="9" end="9"/>
+                                            </p:txEl>
+                                          </p:spTgt>
+                                        </p:tgtEl>
+                                        <p:attrNameLst>
+                                          <p:attrName>style.visibility</p:attrName>
+                                        </p:attrNameLst>
+                                      </p:cBhvr>
+                                      <p:to>
+                                        <p:strVal val="visible"/>
+                                      </p:to>
+                                    </p:set>
+                                  </p:childTnLst>
+                                </p:cTn>
+                              </p:par>
+                            </p:childTnLst>
+                          </p:cTn>
+                        </p:par>
+                      </p:childTnLst>
+                    </p:cTn>
+                  </p:par>
+                </p:childTnLst>
+              </p:cTn>
+              <p:prevCondLst>
+                <p:cond evt="onPrev" delay="0">
+                  <p:tgtEl>
+                    <p:sldTgt/>
+                  </p:tgtEl>
+                </p:cond>
+              </p:prevCondLst>
+              <p:nextCondLst>
+                <p:cond evt="onNext" delay="0">
+                  <p:tgtEl>
+                    <p:sldTgt/>
+                  </p:tgtEl>
+                </p:cond>
+              </p:nextCondLst>
+            </p:seq>
+          </p:childTnLst>
+        </p:cTn>
+      </p:par>
+    </p:tnLst>
+  </p:timing>
+</p:sld>
+</file>
+
+<file path=ppt/slides/slide30.xml><?xml version="1.0" encoding="utf-8"?>
 <p:sld xmlns:a="http://schemas.openxmlformats.org/drawingml/2006/main" xmlns:r="http://schemas.openxmlformats.org/officeDocument/2006/relationships" xmlns:p="http://schemas.openxmlformats.org/presentationml/2006/main">
   <p:cSld>
     <p:spTree>
@@ -12652,7 +12423,7 @@
           <a:p>
             <a:fld id="{31DE2C5B-556E-47B8-A792-024C2FCA4ACC}" type="slidenum">
               <a:rPr lang="en-GB" smtClean="0"/>
-              <a:t>31</a:t>
+              <a:t>30</a:t>
             </a:fld>
             <a:endParaRPr lang="en-GB"/>
           </a:p>
@@ -12946,7 +12717,7 @@
 </p:sld>
 </file>
 
-<file path=ppt/slides/slide32.xml><?xml version="1.0" encoding="utf-8"?>
+<file path=ppt/slides/slide31.xml><?xml version="1.0" encoding="utf-8"?>
 <p:sld xmlns:a="http://schemas.openxmlformats.org/drawingml/2006/main" xmlns:r="http://schemas.openxmlformats.org/officeDocument/2006/relationships" xmlns:p="http://schemas.openxmlformats.org/presentationml/2006/main">
   <p:cSld>
     <p:spTree>
@@ -13009,8 +12780,8 @@
         </p:nvSpPr>
         <p:spPr>
           <a:xfrm>
-            <a:off x="428172" y="1361167"/>
-            <a:ext cx="9904548" cy="5193637"/>
+            <a:off x="428172" y="1993187"/>
+            <a:ext cx="9904548" cy="4561617"/>
           </a:xfrm>
         </p:spPr>
         <p:txBody>
@@ -13019,32 +12790,49 @@
           </a:bodyPr>
           <a:lstStyle/>
           <a:p>
+            <a:pPr>
+              <a:spcAft>
+                <a:spcPts val="600"/>
+              </a:spcAft>
+            </a:pPr>
+            <a:r>
+              <a:rPr lang="en-GB" dirty="0"/>
+              <a:t>Each </a:t>
+            </a:r>
+            <a:r>
+              <a:rPr lang="en-GB" b="1" dirty="0"/>
+              <a:t>controller</a:t>
+            </a:r>
+            <a:r>
+              <a:rPr lang="en-GB" dirty="0"/>
+              <a:t> shall maintain a </a:t>
+            </a:r>
+            <a:r>
+              <a:rPr lang="en-GB" b="1" dirty="0"/>
+              <a:t>record of processing activities</a:t>
+            </a:r>
+            <a:r>
+              <a:rPr lang="en-GB" dirty="0"/>
+              <a:t> under its responsibility (including name of the controller; purpose of processing; security measures adopted;…)</a:t>
+            </a:r>
+          </a:p>
+          <a:p>
             <a:pPr marL="0" indent="0">
               <a:spcAft>
                 <a:spcPts val="600"/>
               </a:spcAft>
               <a:buNone/>
             </a:pPr>
-            <a:r>
-              <a:rPr lang="en-GB" dirty="0"/>
-              <a:t>Each </a:t>
-            </a:r>
-            <a:r>
-              <a:rPr lang="en-GB" b="1" dirty="0"/>
-              <a:t>controller</a:t>
-            </a:r>
-            <a:r>
-              <a:rPr lang="en-GB" dirty="0"/>
-              <a:t> shall maintain a </a:t>
-            </a:r>
-            <a:r>
-              <a:rPr lang="en-GB" b="1" dirty="0"/>
-              <a:t>record of processing activities</a:t>
-            </a:r>
-            <a:r>
-              <a:rPr lang="en-GB" dirty="0"/>
-              <a:t> under its responsibility. The record shall contain these information: </a:t>
-            </a:r>
+            <a:endParaRPr lang="en-GB" dirty="0"/>
+          </a:p>
+          <a:p>
+            <a:pPr marL="0" indent="0">
+              <a:spcAft>
+                <a:spcPts val="600"/>
+              </a:spcAft>
+              <a:buNone/>
+            </a:pPr>
+            <a:endParaRPr lang="en-GB" dirty="0"/>
           </a:p>
           <a:p>
             <a:pPr>
@@ -13054,80 +12842,24 @@
             </a:pPr>
             <a:r>
               <a:rPr lang="en-GB" dirty="0"/>
-              <a:t>name and contact details of the controller;</a:t>
-            </a:r>
-          </a:p>
-          <a:p>
-            <a:pPr>
-              <a:spcAft>
-                <a:spcPts val="600"/>
-              </a:spcAft>
-            </a:pPr>
-            <a:r>
-              <a:rPr lang="en-GB" dirty="0"/>
-              <a:t>purpose of processing;</a:t>
-            </a:r>
-          </a:p>
-          <a:p>
-            <a:pPr>
-              <a:spcAft>
-                <a:spcPts val="600"/>
-              </a:spcAft>
-            </a:pPr>
-            <a:r>
-              <a:rPr lang="en-GB" dirty="0"/>
-              <a:t>the categories of data subjects and the categories of personal data;</a:t>
-            </a:r>
-          </a:p>
-          <a:p>
-            <a:pPr>
-              <a:spcAft>
-                <a:spcPts val="600"/>
-              </a:spcAft>
-            </a:pPr>
-            <a:r>
-              <a:rPr lang="en-GB" dirty="0"/>
-              <a:t>the categories of recipients to whom the personal data are disclosed;</a:t>
-            </a:r>
-          </a:p>
-          <a:p>
-            <a:pPr>
-              <a:spcAft>
-                <a:spcPts val="600"/>
-              </a:spcAft>
-            </a:pPr>
-            <a:r>
-              <a:rPr lang="en-GB" dirty="0"/>
-              <a:t>where applicable, transfers of personal data to a third country;</a:t>
-            </a:r>
-          </a:p>
-          <a:p>
-            <a:pPr>
-              <a:spcAft>
-                <a:spcPts val="600"/>
-              </a:spcAft>
-            </a:pPr>
-            <a:r>
-              <a:rPr lang="en-GB" dirty="0"/>
-              <a:t>where possible, time limits for erasure of the different categories of data;</a:t>
-            </a:r>
-          </a:p>
-          <a:p>
-            <a:pPr>
-              <a:spcAft>
-                <a:spcPts val="600"/>
-              </a:spcAft>
-            </a:pPr>
-            <a:r>
-              <a:rPr lang="en-GB" dirty="0"/>
-              <a:t>where possible, a description of the security measures adopted.</a:t>
-            </a:r>
-          </a:p>
-          <a:p>
-            <a:endParaRPr lang="en-GB" dirty="0"/>
-          </a:p>
-          <a:p>
-            <a:endParaRPr lang="it-IT" dirty="0"/>
+              <a:t>Each </a:t>
+            </a:r>
+            <a:r>
+              <a:rPr lang="en-GB" b="1" dirty="0"/>
+              <a:t>processor</a:t>
+            </a:r>
+            <a:r>
+              <a:rPr lang="en-GB" dirty="0"/>
+              <a:t> shall maintain a </a:t>
+            </a:r>
+            <a:r>
+              <a:rPr lang="en-GB" b="1" dirty="0"/>
+              <a:t>record of processing activities </a:t>
+            </a:r>
+            <a:r>
+              <a:rPr lang="en-GB" dirty="0"/>
+              <a:t>carried out on behalf of the controller (including name the processor and of the controller; purpose of processing; security measures adopted;…)</a:t>
+            </a:r>
           </a:p>
         </p:txBody>
       </p:sp>
@@ -13154,7 +12886,7 @@
           <a:p>
             <a:fld id="{31DE2C5B-556E-47B8-A792-024C2FCA4ACC}" type="slidenum">
               <a:rPr lang="en-GB" smtClean="0"/>
-              <a:t>32</a:t>
+              <a:t>31</a:t>
             </a:fld>
             <a:endParaRPr lang="en-GB"/>
           </a:p>
@@ -13209,234 +12941,7 @@
 </p:sld>
 </file>
 
-<file path=ppt/slides/slide33.xml><?xml version="1.0" encoding="utf-8"?>
-<p:sld xmlns:a="http://schemas.openxmlformats.org/drawingml/2006/main" xmlns:r="http://schemas.openxmlformats.org/officeDocument/2006/relationships" xmlns:p="http://schemas.openxmlformats.org/presentationml/2006/main">
-  <p:cSld>
-    <p:spTree>
-      <p:nvGrpSpPr>
-        <p:cNvPr id="1" name=""/>
-        <p:cNvGrpSpPr/>
-        <p:nvPr/>
-      </p:nvGrpSpPr>
-      <p:grpSpPr>
-        <a:xfrm>
-          <a:off x="0" y="0"/>
-          <a:ext cx="0" cy="0"/>
-          <a:chOff x="0" y="0"/>
-          <a:chExt cx="0" cy="0"/>
-        </a:xfrm>
-      </p:grpSpPr>
-      <p:sp>
-        <p:nvSpPr>
-          <p:cNvPr id="2" name="Titolo 1">
-            <a:extLst>
-              <a:ext uri="{FF2B5EF4-FFF2-40B4-BE49-F238E27FC236}">
-                <a16:creationId xmlns:a16="http://schemas.microsoft.com/office/drawing/2014/main" id="{E2DC1BEB-C047-1145-BA3D-D514D7429A76}"/>
-              </a:ext>
-            </a:extLst>
-          </p:cNvPr>
-          <p:cNvSpPr>
-            <a:spLocks noGrp="1"/>
-          </p:cNvSpPr>
-          <p:nvPr>
-            <p:ph type="title"/>
-          </p:nvPr>
-        </p:nvSpPr>
-        <p:spPr/>
-        <p:txBody>
-          <a:bodyPr/>
-          <a:lstStyle/>
-          <a:p>
-            <a:r>
-              <a:rPr lang="it-IT" dirty="0"/>
-              <a:t>Records of processing activities</a:t>
-            </a:r>
-          </a:p>
-        </p:txBody>
-      </p:sp>
-      <p:sp>
-        <p:nvSpPr>
-          <p:cNvPr id="3" name="Segnaposto contenuto 2">
-            <a:extLst>
-              <a:ext uri="{FF2B5EF4-FFF2-40B4-BE49-F238E27FC236}">
-                <a16:creationId xmlns:a16="http://schemas.microsoft.com/office/drawing/2014/main" id="{2BA5DF24-B644-6145-9199-09F2C268776A}"/>
-              </a:ext>
-            </a:extLst>
-          </p:cNvPr>
-          <p:cNvSpPr>
-            <a:spLocks noGrp="1"/>
-          </p:cNvSpPr>
-          <p:nvPr>
-            <p:ph idx="1"/>
-          </p:nvPr>
-        </p:nvSpPr>
-        <p:spPr>
-          <a:xfrm>
-            <a:off x="428172" y="1361167"/>
-            <a:ext cx="9965508" cy="4858203"/>
-          </a:xfrm>
-        </p:spPr>
-        <p:txBody>
-          <a:bodyPr>
-            <a:normAutofit/>
-          </a:bodyPr>
-          <a:lstStyle/>
-          <a:p>
-            <a:pPr marL="0" indent="0">
-              <a:spcAft>
-                <a:spcPts val="600"/>
-              </a:spcAft>
-              <a:buNone/>
-            </a:pPr>
-            <a:r>
-              <a:rPr lang="en-GB" dirty="0"/>
-              <a:t>Each </a:t>
-            </a:r>
-            <a:r>
-              <a:rPr lang="en-GB" b="1" dirty="0"/>
-              <a:t>processor</a:t>
-            </a:r>
-            <a:r>
-              <a:rPr lang="en-GB" dirty="0"/>
-              <a:t> shall maintain a </a:t>
-            </a:r>
-            <a:r>
-              <a:rPr lang="en-GB" b="1" dirty="0"/>
-              <a:t>record of processing activities </a:t>
-            </a:r>
-            <a:r>
-              <a:rPr lang="en-GB" dirty="0"/>
-              <a:t>carried out on behalf of the controller. The record shall contain these information:</a:t>
-            </a:r>
-          </a:p>
-          <a:p>
-            <a:pPr>
-              <a:spcAft>
-                <a:spcPts val="600"/>
-              </a:spcAft>
-            </a:pPr>
-            <a:r>
-              <a:rPr lang="en-GB" dirty="0"/>
-              <a:t>name and contact details of the processor and of the controller;</a:t>
-            </a:r>
-          </a:p>
-          <a:p>
-            <a:pPr>
-              <a:spcAft>
-                <a:spcPts val="600"/>
-              </a:spcAft>
-            </a:pPr>
-            <a:r>
-              <a:rPr lang="en-GB" dirty="0"/>
-              <a:t>the categories of processing carried out;</a:t>
-            </a:r>
-          </a:p>
-          <a:p>
-            <a:pPr>
-              <a:spcAft>
-                <a:spcPts val="600"/>
-              </a:spcAft>
-            </a:pPr>
-            <a:r>
-              <a:rPr lang="en-GB" dirty="0"/>
-              <a:t>where applicable, transfers of personal data to a third country;</a:t>
-            </a:r>
-          </a:p>
-          <a:p>
-            <a:pPr>
-              <a:spcAft>
-                <a:spcPts val="600"/>
-              </a:spcAft>
-            </a:pPr>
-            <a:r>
-              <a:rPr lang="en-GB" dirty="0"/>
-              <a:t>where possible, a general description of the security measures adopted.</a:t>
-            </a:r>
-          </a:p>
-          <a:p>
-            <a:endParaRPr lang="it-IT" dirty="0"/>
-          </a:p>
-        </p:txBody>
-      </p:sp>
-      <p:sp>
-        <p:nvSpPr>
-          <p:cNvPr id="4" name="Segnaposto numero diapositiva 3">
-            <a:extLst>
-              <a:ext uri="{FF2B5EF4-FFF2-40B4-BE49-F238E27FC236}">
-                <a16:creationId xmlns:a16="http://schemas.microsoft.com/office/drawing/2014/main" id="{81F497AC-EDDC-1D4E-A5BE-57357CEB85DC}"/>
-              </a:ext>
-            </a:extLst>
-          </p:cNvPr>
-          <p:cNvSpPr>
-            <a:spLocks noGrp="1"/>
-          </p:cNvSpPr>
-          <p:nvPr>
-            <p:ph type="sldNum" sz="quarter" idx="12"/>
-          </p:nvPr>
-        </p:nvSpPr>
-        <p:spPr/>
-        <p:txBody>
-          <a:bodyPr/>
-          <a:lstStyle/>
-          <a:p>
-            <a:fld id="{31DE2C5B-556E-47B8-A792-024C2FCA4ACC}" type="slidenum">
-              <a:rPr lang="en-GB" smtClean="0"/>
-              <a:t>33</a:t>
-            </a:fld>
-            <a:endParaRPr lang="en-GB"/>
-          </a:p>
-        </p:txBody>
-      </p:sp>
-      <p:pic>
-        <p:nvPicPr>
-          <p:cNvPr id="6" name="Picture 5" descr="A colorful pie chart in a gear&#10;&#10;Description automatically generated">
-            <a:extLst>
-              <a:ext uri="{FF2B5EF4-FFF2-40B4-BE49-F238E27FC236}">
-                <a16:creationId xmlns:a16="http://schemas.microsoft.com/office/drawing/2014/main" id="{A2881B76-BD4C-1BB0-754F-B77B14EF7D9E}"/>
-              </a:ext>
-            </a:extLst>
-          </p:cNvPr>
-          <p:cNvPicPr>
-            <a:picLocks noChangeAspect="1"/>
-          </p:cNvPicPr>
-          <p:nvPr/>
-        </p:nvPicPr>
-        <p:blipFill>
-          <a:blip r:embed="rId2">
-            <a:extLst>
-              <a:ext uri="{28A0092B-C50C-407E-A947-70E740481C1C}">
-                <a14:useLocalDpi xmlns:a14="http://schemas.microsoft.com/office/drawing/2010/main" val="0"/>
-              </a:ext>
-            </a:extLst>
-          </a:blip>
-          <a:stretch>
-            <a:fillRect/>
-          </a:stretch>
-        </p:blipFill>
-        <p:spPr>
-          <a:xfrm>
-            <a:off x="10485120" y="4840224"/>
-            <a:ext cx="1179576" cy="1179576"/>
-          </a:xfrm>
-          <a:prstGeom prst="rect">
-            <a:avLst/>
-          </a:prstGeom>
-        </p:spPr>
-      </p:pic>
-    </p:spTree>
-    <p:extLst>
-      <p:ext uri="{BB962C8B-B14F-4D97-AF65-F5344CB8AC3E}">
-        <p14:creationId xmlns:p14="http://schemas.microsoft.com/office/powerpoint/2010/main" val="1291145803"/>
-      </p:ext>
-    </p:extLst>
-  </p:cSld>
-  <p:clrMapOvr>
-    <a:masterClrMapping/>
-  </p:clrMapOvr>
-</p:sld>
-</file>
-
-<file path=ppt/slides/slide34.xml><?xml version="1.0" encoding="utf-8"?>
+<file path=ppt/slides/slide32.xml><?xml version="1.0" encoding="utf-8"?>
 <p:sld xmlns:a="http://schemas.openxmlformats.org/drawingml/2006/main" xmlns:r="http://schemas.openxmlformats.org/officeDocument/2006/relationships" xmlns:p="http://schemas.openxmlformats.org/presentationml/2006/main">
   <p:cSld>
     <p:spTree>
@@ -13556,7 +13061,7 @@
           <a:p>
             <a:fld id="{31DE2C5B-556E-47B8-A792-024C2FCA4ACC}" type="slidenum">
               <a:rPr lang="en-GB" smtClean="0"/>
-              <a:t>34</a:t>
+              <a:t>32</a:t>
             </a:fld>
             <a:endParaRPr lang="en-GB"/>
           </a:p>
@@ -13632,7 +13137,7 @@
         </p:spPr>
         <p:txBody>
           <a:bodyPr>
-            <a:normAutofit fontScale="92500" lnSpcReduction="20000"/>
+            <a:normAutofit/>
           </a:bodyPr>
           <a:lstStyle/>
           <a:p>
@@ -13659,15 +13164,9 @@
             </a:r>
           </a:p>
           <a:p>
-            <a:endParaRPr lang="en-GB" dirty="0"/>
-          </a:p>
-          <a:p>
-            <a:r>
-              <a:rPr lang="en-GB" dirty="0"/>
-              <a:t>Many global laws are strongly influenced by the EU rules, which are considered the gold standard in data protection law.</a:t>
-            </a:r>
-          </a:p>
-          <a:p>
+            <a:pPr marL="0" indent="0">
+              <a:buNone/>
+            </a:pPr>
             <a:endParaRPr lang="en-GB" dirty="0"/>
           </a:p>
           <a:p>
@@ -13830,7 +13329,7 @@
                                         <p:tgtEl>
                                           <p:spTgt spid="3">
                                             <p:txEl>
-                                              <p:pRg st="5" end="5"/>
+                                              <p:pRg st="3" end="3"/>
                                             </p:txEl>
                                           </p:spTgt>
                                         </p:tgtEl>
@@ -13861,7 +13360,7 @@
                                         <p:tgtEl>
                                           <p:spTgt spid="3">
                                             <p:txEl>
-                                              <p:pRg st="6" end="6"/>
+                                              <p:pRg st="4" end="4"/>
                                             </p:txEl>
                                           </p:spTgt>
                                         </p:tgtEl>
@@ -13910,7 +13409,7 @@
                                         <p:tgtEl>
                                           <p:spTgt spid="3">
                                             <p:txEl>
-                                              <p:pRg st="8" end="8"/>
+                                              <p:pRg st="6" end="6"/>
                                             </p:txEl>
                                           </p:spTgt>
                                         </p:tgtEl>
@@ -14377,19 +13876,15 @@
           <a:p>
             <a:r>
               <a:rPr lang="it-IT" dirty="0"/>
-              <a:t>Data </a:t>
+              <a:t>The ”</a:t>
             </a:r>
             <a:r>
               <a:rPr lang="it-IT" dirty="0" err="1"/>
-              <a:t>subject</a:t>
+              <a:t>actors</a:t>
             </a:r>
             <a:r>
               <a:rPr lang="it-IT" dirty="0"/>
-              <a:t>, controller, processor, and </a:t>
-            </a:r>
-            <a:r>
-              <a:rPr lang="it-IT" dirty="0" err="1"/>
-              <a:t>Recipient</a:t>
+              <a:t>”</a:t>
             </a:r>
             <a:endParaRPr lang="en-GB" dirty="0"/>
           </a:p>
@@ -14407,13 +13902,13 @@
         </p:nvSpPr>
         <p:spPr>
           <a:xfrm>
-            <a:off x="428172" y="1361167"/>
-            <a:ext cx="9782628" cy="4858203"/>
+            <a:off x="428172" y="1361168"/>
+            <a:ext cx="9928180" cy="5214294"/>
           </a:xfrm>
         </p:spPr>
         <p:txBody>
           <a:bodyPr>
-            <a:normAutofit fontScale="92500" lnSpcReduction="10000"/>
+            <a:normAutofit fontScale="85000" lnSpcReduction="10000"/>
           </a:bodyPr>
           <a:lstStyle/>
           <a:p>
@@ -14548,6 +14043,29 @@
               <a:rPr lang="en-GB" dirty="0"/>
               <a:t>: a natural or legal person, public authority, agency or another body, to which the personal data are disclosed.</a:t>
             </a:r>
+          </a:p>
+          <a:p>
+            <a:pPr>
+              <a:spcAft>
+                <a:spcPts val="600"/>
+              </a:spcAft>
+            </a:pPr>
+            <a:r>
+              <a:rPr lang="en-GB" b="1" dirty="0"/>
+              <a:t>Data protection officer (DPO): </a:t>
+            </a:r>
+            <a:r>
+              <a:rPr lang="en-GB" dirty="0"/>
+              <a:t>expert in data protection regulation and practices. Guarantees that the GDPR directives are followed and acts as a point of contact with the Data Protection Authorities. </a:t>
+            </a:r>
+          </a:p>
+          <a:p>
+            <a:pPr>
+              <a:spcAft>
+                <a:spcPts val="600"/>
+              </a:spcAft>
+            </a:pPr>
+            <a:endParaRPr lang="en-GB" dirty="0"/>
           </a:p>
         </p:txBody>
       </p:sp>
@@ -14602,7 +14120,7 @@
         </p:blipFill>
         <p:spPr>
           <a:xfrm>
-            <a:off x="10564368" y="1224187"/>
+            <a:off x="10523271" y="1532411"/>
             <a:ext cx="1371600" cy="1371600"/>
           </a:xfrm>
           <a:prstGeom prst="rect">
@@ -14899,627 +14417,20 @@
                       </p:childTnLst>
                     </p:cTn>
                   </p:par>
-                </p:childTnLst>
-              </p:cTn>
-              <p:prevCondLst>
-                <p:cond evt="onPrev" delay="0">
-                  <p:tgtEl>
-                    <p:sldTgt/>
-                  </p:tgtEl>
-                </p:cond>
-              </p:prevCondLst>
-              <p:nextCondLst>
-                <p:cond evt="onNext" delay="0">
-                  <p:tgtEl>
-                    <p:sldTgt/>
-                  </p:tgtEl>
-                </p:cond>
-              </p:nextCondLst>
-            </p:seq>
-          </p:childTnLst>
-        </p:cTn>
-      </p:par>
-    </p:tnLst>
-  </p:timing>
-</p:sld>
-</file>
-
-<file path=ppt/slides/slide8.xml><?xml version="1.0" encoding="utf-8"?>
-<p:sld xmlns:a="http://schemas.openxmlformats.org/drawingml/2006/main" xmlns:r="http://schemas.openxmlformats.org/officeDocument/2006/relationships" xmlns:p="http://schemas.openxmlformats.org/presentationml/2006/main">
-  <p:cSld>
-    <p:spTree>
-      <p:nvGrpSpPr>
-        <p:cNvPr id="1" name="">
-          <a:extLst>
-            <a:ext uri="{FF2B5EF4-FFF2-40B4-BE49-F238E27FC236}">
-              <a16:creationId xmlns:a16="http://schemas.microsoft.com/office/drawing/2014/main" id="{62ADFCE0-B074-D749-4446-F4FB6DD21CD9}"/>
-            </a:ext>
-          </a:extLst>
-        </p:cNvPr>
-        <p:cNvGrpSpPr/>
-        <p:nvPr/>
-      </p:nvGrpSpPr>
-      <p:grpSpPr>
-        <a:xfrm>
-          <a:off x="0" y="0"/>
-          <a:ext cx="0" cy="0"/>
-          <a:chOff x="0" y="0"/>
-          <a:chExt cx="0" cy="0"/>
-        </a:xfrm>
-      </p:grpSpPr>
-      <p:sp>
-        <p:nvSpPr>
-          <p:cNvPr id="2" name="Titolo 1">
-            <a:extLst>
-              <a:ext uri="{FF2B5EF4-FFF2-40B4-BE49-F238E27FC236}">
-                <a16:creationId xmlns:a16="http://schemas.microsoft.com/office/drawing/2014/main" id="{C9754ECA-0960-49CE-54ED-6A2C846CCFE4}"/>
-              </a:ext>
-            </a:extLst>
-          </p:cNvPr>
-          <p:cNvSpPr>
-            <a:spLocks noGrp="1"/>
-          </p:cNvSpPr>
-          <p:nvPr>
-            <p:ph type="title"/>
-          </p:nvPr>
-        </p:nvSpPr>
-        <p:spPr/>
-        <p:txBody>
-          <a:bodyPr/>
-          <a:lstStyle/>
-          <a:p>
-            <a:r>
-              <a:rPr lang="it-IT" dirty="0"/>
-              <a:t>Data </a:t>
-            </a:r>
-            <a:r>
-              <a:rPr lang="it-IT" dirty="0" err="1"/>
-              <a:t>protection</a:t>
-            </a:r>
-            <a:r>
-              <a:rPr lang="it-IT" dirty="0"/>
-              <a:t> </a:t>
-            </a:r>
-            <a:r>
-              <a:rPr lang="it-IT" dirty="0" err="1"/>
-              <a:t>officer</a:t>
-            </a:r>
-            <a:r>
-              <a:rPr lang="it-IT" dirty="0"/>
-              <a:t> (DPO)</a:t>
-            </a:r>
-          </a:p>
-        </p:txBody>
-      </p:sp>
-      <p:sp>
-        <p:nvSpPr>
-          <p:cNvPr id="3" name="Segnaposto contenuto 2">
-            <a:extLst>
-              <a:ext uri="{FF2B5EF4-FFF2-40B4-BE49-F238E27FC236}">
-                <a16:creationId xmlns:a16="http://schemas.microsoft.com/office/drawing/2014/main" id="{4DB1CEF3-839B-C6FF-14F7-9072561C10CD}"/>
-              </a:ext>
-            </a:extLst>
-          </p:cNvPr>
-          <p:cNvSpPr>
-            <a:spLocks noGrp="1"/>
-          </p:cNvSpPr>
-          <p:nvPr>
-            <p:ph idx="1"/>
-          </p:nvPr>
-        </p:nvSpPr>
-        <p:spPr>
-          <a:xfrm>
-            <a:off x="428172" y="1361167"/>
-            <a:ext cx="10136196" cy="5334907"/>
-          </a:xfrm>
-        </p:spPr>
-        <p:txBody>
-          <a:bodyPr>
-            <a:normAutofit fontScale="92500" lnSpcReduction="10000"/>
-          </a:bodyPr>
-          <a:lstStyle/>
-          <a:p>
-            <a:r>
-              <a:rPr lang="en-GB" b="1" dirty="0"/>
-              <a:t>Data protection officer (DPO): </a:t>
-            </a:r>
-            <a:r>
-              <a:rPr lang="en-GB" dirty="0"/>
-              <a:t>expert in data protection regulation and practices.</a:t>
-            </a:r>
-          </a:p>
-          <a:p>
-            <a:endParaRPr lang="en-GB" dirty="0"/>
-          </a:p>
-          <a:p>
-            <a:r>
-              <a:rPr lang="en-GB" dirty="0"/>
-              <a:t>The controller and the processor shall designate a DPO</a:t>
-            </a:r>
-            <a:r>
-              <a:rPr lang="en-GB" b="1" dirty="0"/>
-              <a:t> </a:t>
-            </a:r>
-            <a:r>
-              <a:rPr lang="en-GB" dirty="0"/>
-              <a:t>if: </a:t>
-            </a:r>
-          </a:p>
-          <a:p>
-            <a:pPr lvl="1"/>
-            <a:r>
-              <a:rPr lang="en-GB" sz="2200" dirty="0"/>
-              <a:t>the processing is carried out by a public authority or body; </a:t>
-            </a:r>
-          </a:p>
-          <a:p>
-            <a:pPr lvl="1"/>
-            <a:r>
-              <a:rPr lang="en-GB" sz="2200" dirty="0"/>
-              <a:t>regular and systematic monitoring of data subjects on a large scale;</a:t>
-            </a:r>
-          </a:p>
-          <a:p>
-            <a:pPr lvl="1"/>
-            <a:r>
-              <a:rPr lang="en-GB" sz="2200" dirty="0"/>
-              <a:t>processing on a large scale of the special categories of data.</a:t>
-            </a:r>
-          </a:p>
-          <a:p>
-            <a:pPr lvl="1"/>
-            <a:endParaRPr lang="en-GB" sz="2200" dirty="0"/>
-          </a:p>
-          <a:p>
-            <a:r>
-              <a:rPr lang="en-GB" dirty="0"/>
-              <a:t>Tasks of the DPO: </a:t>
-            </a:r>
-          </a:p>
-          <a:p>
-            <a:pPr lvl="1"/>
-            <a:r>
-              <a:rPr lang="en-GB" sz="2200" dirty="0"/>
-              <a:t>to inform and advise the controller or the processor of their obligations according to the GDPR</a:t>
-            </a:r>
-          </a:p>
-          <a:p>
-            <a:pPr lvl="1"/>
-            <a:r>
-              <a:rPr lang="en-GB" sz="2200" dirty="0"/>
-              <a:t>to monitor the compliance with GDPR</a:t>
-            </a:r>
-          </a:p>
-          <a:p>
-            <a:pPr lvl="1"/>
-            <a:r>
-              <a:rPr lang="en-GB" sz="2200" dirty="0"/>
-              <a:t>to provide advice as regards the data protection </a:t>
-            </a:r>
-          </a:p>
-          <a:p>
-            <a:pPr lvl="1"/>
-            <a:r>
-              <a:rPr lang="en-GB" sz="2200" dirty="0"/>
-              <a:t>to cooperate with data protection authorities</a:t>
-            </a:r>
-          </a:p>
-          <a:p>
-            <a:pPr lvl="1"/>
-            <a:r>
-              <a:rPr lang="en-GB" sz="2200" dirty="0"/>
-              <a:t>to act a contact point between the controller, the processor and the data protection authorities.  </a:t>
-            </a:r>
-          </a:p>
-          <a:p>
-            <a:pPr lvl="1"/>
-            <a:endParaRPr lang="it-IT" sz="2400" dirty="0"/>
-          </a:p>
-          <a:p>
-            <a:endParaRPr lang="en-GB" sz="2800" dirty="0"/>
-          </a:p>
-          <a:p>
-            <a:endParaRPr lang="it-IT" dirty="0"/>
-          </a:p>
-          <a:p>
-            <a:endParaRPr lang="it-IT" dirty="0"/>
-          </a:p>
-        </p:txBody>
-      </p:sp>
-      <p:sp>
-        <p:nvSpPr>
-          <p:cNvPr id="4" name="Segnaposto numero diapositiva 3">
-            <a:extLst>
-              <a:ext uri="{FF2B5EF4-FFF2-40B4-BE49-F238E27FC236}">
-                <a16:creationId xmlns:a16="http://schemas.microsoft.com/office/drawing/2014/main" id="{E4BDBB91-0B4F-5423-7541-2530D6591E5F}"/>
-              </a:ext>
-            </a:extLst>
-          </p:cNvPr>
-          <p:cNvSpPr>
-            <a:spLocks noGrp="1"/>
-          </p:cNvSpPr>
-          <p:nvPr>
-            <p:ph type="sldNum" sz="quarter" idx="12"/>
-          </p:nvPr>
-        </p:nvSpPr>
-        <p:spPr/>
-        <p:txBody>
-          <a:bodyPr/>
-          <a:lstStyle/>
-          <a:p>
-            <a:fld id="{31DE2C5B-556E-47B8-A792-024C2FCA4ACC}" type="slidenum">
-              <a:rPr lang="en-GB" smtClean="0"/>
-              <a:t>8</a:t>
-            </a:fld>
-            <a:endParaRPr lang="en-GB"/>
-          </a:p>
-        </p:txBody>
-      </p:sp>
-      <p:pic>
-        <p:nvPicPr>
-          <p:cNvPr id="5" name="Picture 4" descr="A person in a suit and tie&#10;&#10;Description automatically generated">
-            <a:extLst>
-              <a:ext uri="{FF2B5EF4-FFF2-40B4-BE49-F238E27FC236}">
-                <a16:creationId xmlns:a16="http://schemas.microsoft.com/office/drawing/2014/main" id="{835914D6-AF8A-F780-8492-8828B49D122F}"/>
-              </a:ext>
-            </a:extLst>
-          </p:cNvPr>
-          <p:cNvPicPr>
-            <a:picLocks noChangeAspect="1"/>
-          </p:cNvPicPr>
-          <p:nvPr/>
-        </p:nvPicPr>
-        <p:blipFill>
-          <a:blip r:embed="rId2">
-            <a:extLst>
-              <a:ext uri="{28A0092B-C50C-407E-A947-70E740481C1C}">
-                <a14:useLocalDpi xmlns:a14="http://schemas.microsoft.com/office/drawing/2010/main" val="0"/>
-              </a:ext>
-            </a:extLst>
-          </a:blip>
-          <a:stretch>
-            <a:fillRect/>
-          </a:stretch>
-        </p:blipFill>
-        <p:spPr>
-          <a:xfrm>
-            <a:off x="10564368" y="1224187"/>
-            <a:ext cx="1371600" cy="1371600"/>
-          </a:xfrm>
-          <a:prstGeom prst="rect">
-            <a:avLst/>
-          </a:prstGeom>
-        </p:spPr>
-      </p:pic>
-    </p:spTree>
-    <p:extLst>
-      <p:ext uri="{BB962C8B-B14F-4D97-AF65-F5344CB8AC3E}">
-        <p14:creationId xmlns:p14="http://schemas.microsoft.com/office/powerpoint/2010/main" val="3926836825"/>
-      </p:ext>
-    </p:extLst>
-  </p:cSld>
-  <p:clrMapOvr>
-    <a:masterClrMapping/>
-  </p:clrMapOvr>
-  <p:timing>
-    <p:tnLst>
-      <p:par>
-        <p:cTn id="1" dur="indefinite" restart="never" nodeType="tmRoot">
-          <p:childTnLst>
-            <p:seq concurrent="1" nextAc="seek">
-              <p:cTn id="2" dur="indefinite" nodeType="mainSeq">
-                <p:childTnLst>
                   <p:par>
-                    <p:cTn id="3" fill="hold">
+                    <p:cTn id="23" fill="hold">
                       <p:stCondLst>
                         <p:cond delay="indefinite"/>
                       </p:stCondLst>
                       <p:childTnLst>
                         <p:par>
-                          <p:cTn id="4" fill="hold">
+                          <p:cTn id="24" fill="hold">
                             <p:stCondLst>
                               <p:cond delay="0"/>
                             </p:stCondLst>
                             <p:childTnLst>
                               <p:par>
-                                <p:cTn id="5" presetID="1" presetClass="entr" presetSubtype="0" fill="hold" nodeType="clickEffect">
-                                  <p:stCondLst>
-                                    <p:cond delay="0"/>
-                                  </p:stCondLst>
-                                  <p:childTnLst>
-                                    <p:set>
-                                      <p:cBhvr>
-                                        <p:cTn id="6" dur="1" fill="hold">
-                                          <p:stCondLst>
-                                            <p:cond delay="0"/>
-                                          </p:stCondLst>
-                                        </p:cTn>
-                                        <p:tgtEl>
-                                          <p:spTgt spid="3">
-                                            <p:txEl>
-                                              <p:pRg st="2" end="2"/>
-                                            </p:txEl>
-                                          </p:spTgt>
-                                        </p:tgtEl>
-                                        <p:attrNameLst>
-                                          <p:attrName>style.visibility</p:attrName>
-                                        </p:attrNameLst>
-                                      </p:cBhvr>
-                                      <p:to>
-                                        <p:strVal val="visible"/>
-                                      </p:to>
-                                    </p:set>
-                                  </p:childTnLst>
-                                </p:cTn>
-                              </p:par>
-                              <p:par>
-                                <p:cTn id="7" presetID="1" presetClass="entr" presetSubtype="0" fill="hold" nodeType="withEffect">
-                                  <p:stCondLst>
-                                    <p:cond delay="0"/>
-                                  </p:stCondLst>
-                                  <p:childTnLst>
-                                    <p:set>
-                                      <p:cBhvr>
-                                        <p:cTn id="8" dur="1" fill="hold">
-                                          <p:stCondLst>
-                                            <p:cond delay="0"/>
-                                          </p:stCondLst>
-                                        </p:cTn>
-                                        <p:tgtEl>
-                                          <p:spTgt spid="3">
-                                            <p:txEl>
-                                              <p:pRg st="3" end="3"/>
-                                            </p:txEl>
-                                          </p:spTgt>
-                                        </p:tgtEl>
-                                        <p:attrNameLst>
-                                          <p:attrName>style.visibility</p:attrName>
-                                        </p:attrNameLst>
-                                      </p:cBhvr>
-                                      <p:to>
-                                        <p:strVal val="visible"/>
-                                      </p:to>
-                                    </p:set>
-                                  </p:childTnLst>
-                                </p:cTn>
-                              </p:par>
-                              <p:par>
-                                <p:cTn id="9" presetID="1" presetClass="entr" presetSubtype="0" fill="hold" nodeType="withEffect">
-                                  <p:stCondLst>
-                                    <p:cond delay="0"/>
-                                  </p:stCondLst>
-                                  <p:childTnLst>
-                                    <p:set>
-                                      <p:cBhvr>
-                                        <p:cTn id="10" dur="1" fill="hold">
-                                          <p:stCondLst>
-                                            <p:cond delay="0"/>
-                                          </p:stCondLst>
-                                        </p:cTn>
-                                        <p:tgtEl>
-                                          <p:spTgt spid="3">
-                                            <p:txEl>
-                                              <p:pRg st="4" end="4"/>
-                                            </p:txEl>
-                                          </p:spTgt>
-                                        </p:tgtEl>
-                                        <p:attrNameLst>
-                                          <p:attrName>style.visibility</p:attrName>
-                                        </p:attrNameLst>
-                                      </p:cBhvr>
-                                      <p:to>
-                                        <p:strVal val="visible"/>
-                                      </p:to>
-                                    </p:set>
-                                  </p:childTnLst>
-                                </p:cTn>
-                              </p:par>
-                              <p:par>
-                                <p:cTn id="11" presetID="1" presetClass="entr" presetSubtype="0" fill="hold" nodeType="withEffect">
-                                  <p:stCondLst>
-                                    <p:cond delay="0"/>
-                                  </p:stCondLst>
-                                  <p:childTnLst>
-                                    <p:set>
-                                      <p:cBhvr>
-                                        <p:cTn id="12" dur="1" fill="hold">
-                                          <p:stCondLst>
-                                            <p:cond delay="0"/>
-                                          </p:stCondLst>
-                                        </p:cTn>
-                                        <p:tgtEl>
-                                          <p:spTgt spid="3">
-                                            <p:txEl>
-                                              <p:pRg st="5" end="5"/>
-                                            </p:txEl>
-                                          </p:spTgt>
-                                        </p:tgtEl>
-                                        <p:attrNameLst>
-                                          <p:attrName>style.visibility</p:attrName>
-                                        </p:attrNameLst>
-                                      </p:cBhvr>
-                                      <p:to>
-                                        <p:strVal val="visible"/>
-                                      </p:to>
-                                    </p:set>
-                                  </p:childTnLst>
-                                </p:cTn>
-                              </p:par>
-                            </p:childTnLst>
-                          </p:cTn>
-                        </p:par>
-                      </p:childTnLst>
-                    </p:cTn>
-                  </p:par>
-                  <p:par>
-                    <p:cTn id="13" fill="hold">
-                      <p:stCondLst>
-                        <p:cond delay="indefinite"/>
-                      </p:stCondLst>
-                      <p:childTnLst>
-                        <p:par>
-                          <p:cTn id="14" fill="hold">
-                            <p:stCondLst>
-                              <p:cond delay="0"/>
-                            </p:stCondLst>
-                            <p:childTnLst>
-                              <p:par>
-                                <p:cTn id="15" presetID="1" presetClass="entr" presetSubtype="0" fill="hold" nodeType="clickEffect">
-                                  <p:stCondLst>
-                                    <p:cond delay="0"/>
-                                  </p:stCondLst>
-                                  <p:childTnLst>
-                                    <p:set>
-                                      <p:cBhvr>
-                                        <p:cTn id="16" dur="1" fill="hold">
-                                          <p:stCondLst>
-                                            <p:cond delay="0"/>
-                                          </p:stCondLst>
-                                        </p:cTn>
-                                        <p:tgtEl>
-                                          <p:spTgt spid="3">
-                                            <p:txEl>
-                                              <p:pRg st="7" end="7"/>
-                                            </p:txEl>
-                                          </p:spTgt>
-                                        </p:tgtEl>
-                                        <p:attrNameLst>
-                                          <p:attrName>style.visibility</p:attrName>
-                                        </p:attrNameLst>
-                                      </p:cBhvr>
-                                      <p:to>
-                                        <p:strVal val="visible"/>
-                                      </p:to>
-                                    </p:set>
-                                  </p:childTnLst>
-                                </p:cTn>
-                              </p:par>
-                              <p:par>
-                                <p:cTn id="17" presetID="1" presetClass="entr" presetSubtype="0" fill="hold" nodeType="withEffect">
-                                  <p:stCondLst>
-                                    <p:cond delay="0"/>
-                                  </p:stCondLst>
-                                  <p:childTnLst>
-                                    <p:set>
-                                      <p:cBhvr>
-                                        <p:cTn id="18" dur="1" fill="hold">
-                                          <p:stCondLst>
-                                            <p:cond delay="0"/>
-                                          </p:stCondLst>
-                                        </p:cTn>
-                                        <p:tgtEl>
-                                          <p:spTgt spid="3">
-                                            <p:txEl>
-                                              <p:pRg st="8" end="8"/>
-                                            </p:txEl>
-                                          </p:spTgt>
-                                        </p:tgtEl>
-                                        <p:attrNameLst>
-                                          <p:attrName>style.visibility</p:attrName>
-                                        </p:attrNameLst>
-                                      </p:cBhvr>
-                                      <p:to>
-                                        <p:strVal val="visible"/>
-                                      </p:to>
-                                    </p:set>
-                                  </p:childTnLst>
-                                </p:cTn>
-                              </p:par>
-                              <p:par>
-                                <p:cTn id="19" presetID="1" presetClass="entr" presetSubtype="0" fill="hold" nodeType="withEffect">
-                                  <p:stCondLst>
-                                    <p:cond delay="0"/>
-                                  </p:stCondLst>
-                                  <p:childTnLst>
-                                    <p:set>
-                                      <p:cBhvr>
-                                        <p:cTn id="20" dur="1" fill="hold">
-                                          <p:stCondLst>
-                                            <p:cond delay="0"/>
-                                          </p:stCondLst>
-                                        </p:cTn>
-                                        <p:tgtEl>
-                                          <p:spTgt spid="3">
-                                            <p:txEl>
-                                              <p:pRg st="9" end="9"/>
-                                            </p:txEl>
-                                          </p:spTgt>
-                                        </p:tgtEl>
-                                        <p:attrNameLst>
-                                          <p:attrName>style.visibility</p:attrName>
-                                        </p:attrNameLst>
-                                      </p:cBhvr>
-                                      <p:to>
-                                        <p:strVal val="visible"/>
-                                      </p:to>
-                                    </p:set>
-                                  </p:childTnLst>
-                                </p:cTn>
-                              </p:par>
-                              <p:par>
-                                <p:cTn id="21" presetID="1" presetClass="entr" presetSubtype="0" fill="hold" nodeType="withEffect">
-                                  <p:stCondLst>
-                                    <p:cond delay="0"/>
-                                  </p:stCondLst>
-                                  <p:childTnLst>
-                                    <p:set>
-                                      <p:cBhvr>
-                                        <p:cTn id="22" dur="1" fill="hold">
-                                          <p:stCondLst>
-                                            <p:cond delay="0"/>
-                                          </p:stCondLst>
-                                        </p:cTn>
-                                        <p:tgtEl>
-                                          <p:spTgt spid="3">
-                                            <p:txEl>
-                                              <p:pRg st="10" end="10"/>
-                                            </p:txEl>
-                                          </p:spTgt>
-                                        </p:tgtEl>
-                                        <p:attrNameLst>
-                                          <p:attrName>style.visibility</p:attrName>
-                                        </p:attrNameLst>
-                                      </p:cBhvr>
-                                      <p:to>
-                                        <p:strVal val="visible"/>
-                                      </p:to>
-                                    </p:set>
-                                  </p:childTnLst>
-                                </p:cTn>
-                              </p:par>
-                              <p:par>
-                                <p:cTn id="23" presetID="1" presetClass="entr" presetSubtype="0" fill="hold" nodeType="withEffect">
-                                  <p:stCondLst>
-                                    <p:cond delay="0"/>
-                                  </p:stCondLst>
-                                  <p:childTnLst>
-                                    <p:set>
-                                      <p:cBhvr>
-                                        <p:cTn id="24" dur="1" fill="hold">
-                                          <p:stCondLst>
-                                            <p:cond delay="0"/>
-                                          </p:stCondLst>
-                                        </p:cTn>
-                                        <p:tgtEl>
-                                          <p:spTgt spid="3">
-                                            <p:txEl>
-                                              <p:pRg st="11" end="11"/>
-                                            </p:txEl>
-                                          </p:spTgt>
-                                        </p:tgtEl>
-                                        <p:attrNameLst>
-                                          <p:attrName>style.visibility</p:attrName>
-                                        </p:attrNameLst>
-                                      </p:cBhvr>
-                                      <p:to>
-                                        <p:strVal val="visible"/>
-                                      </p:to>
-                                    </p:set>
-                                  </p:childTnLst>
-                                </p:cTn>
-                              </p:par>
-                              <p:par>
-                                <p:cTn id="25" presetID="1" presetClass="entr" presetSubtype="0" fill="hold" nodeType="withEffect">
+                                <p:cTn id="25" presetID="1" presetClass="entr" presetSubtype="0" fill="hold" nodeType="clickEffect">
                                   <p:stCondLst>
                                     <p:cond delay="0"/>
                                   </p:stCondLst>
@@ -15534,7 +14445,7 @@
                                         <p:tgtEl>
                                           <p:spTgt spid="3">
                                             <p:txEl>
-                                              <p:pRg st="12" end="12"/>
+                                              <p:pRg st="8" end="8"/>
                                             </p:txEl>
                                           </p:spTgt>
                                         </p:tgtEl>
@@ -15580,7 +14491,7 @@
 </p:sld>
 </file>
 
-<file path=ppt/slides/slide9.xml><?xml version="1.0" encoding="utf-8"?>
+<file path=ppt/slides/slide8.xml><?xml version="1.0" encoding="utf-8"?>
 <p:sld xmlns:a="http://schemas.openxmlformats.org/drawingml/2006/main" xmlns:r="http://schemas.openxmlformats.org/officeDocument/2006/relationships" xmlns:p="http://schemas.openxmlformats.org/presentationml/2006/main">
   <p:cSld>
     <p:spTree>
@@ -15659,7 +14570,7 @@
             </a:r>
             <a:r>
               <a:rPr lang="it-IT" dirty="0" err="1"/>
-              <a:t>protection</a:t>
+              <a:t>Protection</a:t>
             </a:r>
             <a:r>
               <a:rPr lang="it-IT" dirty="0"/>
@@ -15667,7 +14578,7 @@
             </a:r>
             <a:r>
               <a:rPr lang="it-IT" dirty="0" err="1"/>
-              <a:t>authorities</a:t>
+              <a:t>Authorities</a:t>
             </a:r>
             <a:endParaRPr lang="en-GB" dirty="0"/>
           </a:p>
@@ -15873,7 +14784,7 @@
           <a:p>
             <a:fld id="{31DE2C5B-556E-47B8-A792-024C2FCA4ACC}" type="slidenum">
               <a:rPr lang="en-GB" smtClean="0"/>
-              <a:t>9</a:t>
+              <a:t>8</a:t>
             </a:fld>
             <a:endParaRPr lang="en-GB"/>
           </a:p>
@@ -16017,6 +14928,230 @@
       </p:par>
     </p:tnLst>
   </p:timing>
+</p:sld>
+</file>
+
+<file path=ppt/slides/slide9.xml><?xml version="1.0" encoding="utf-8"?>
+<p:sld xmlns:a="http://schemas.openxmlformats.org/drawingml/2006/main" xmlns:r="http://schemas.openxmlformats.org/officeDocument/2006/relationships" xmlns:p="http://schemas.openxmlformats.org/presentationml/2006/main">
+  <p:cSld>
+    <p:spTree>
+      <p:nvGrpSpPr>
+        <p:cNvPr id="1" name="">
+          <a:extLst>
+            <a:ext uri="{FF2B5EF4-FFF2-40B4-BE49-F238E27FC236}">
+              <a16:creationId xmlns:a16="http://schemas.microsoft.com/office/drawing/2014/main" id="{CF81F3E4-5D1D-3366-5B74-AE53694E599E}"/>
+            </a:ext>
+          </a:extLst>
+        </p:cNvPr>
+        <p:cNvGrpSpPr/>
+        <p:nvPr/>
+      </p:nvGrpSpPr>
+      <p:grpSpPr>
+        <a:xfrm>
+          <a:off x="0" y="0"/>
+          <a:ext cx="0" cy="0"/>
+          <a:chOff x="0" y="0"/>
+          <a:chExt cx="0" cy="0"/>
+        </a:xfrm>
+      </p:grpSpPr>
+      <p:sp>
+        <p:nvSpPr>
+          <p:cNvPr id="2" name="Titolo 1">
+            <a:extLst>
+              <a:ext uri="{FF2B5EF4-FFF2-40B4-BE49-F238E27FC236}">
+                <a16:creationId xmlns:a16="http://schemas.microsoft.com/office/drawing/2014/main" id="{232AECC6-0523-7CB6-1EBB-89752EEB31B2}"/>
+              </a:ext>
+            </a:extLst>
+          </p:cNvPr>
+          <p:cNvSpPr>
+            <a:spLocks noGrp="1"/>
+          </p:cNvSpPr>
+          <p:nvPr>
+            <p:ph type="title"/>
+          </p:nvPr>
+        </p:nvSpPr>
+        <p:spPr/>
+        <p:txBody>
+          <a:bodyPr/>
+          <a:lstStyle/>
+          <a:p>
+            <a:r>
+              <a:rPr lang="en-GB" dirty="0"/>
+              <a:t>Restrictions to the application of GDPR</a:t>
+            </a:r>
+          </a:p>
+        </p:txBody>
+      </p:sp>
+      <p:sp>
+        <p:nvSpPr>
+          <p:cNvPr id="3" name="Segnaposto contenuto 2">
+            <a:extLst>
+              <a:ext uri="{FF2B5EF4-FFF2-40B4-BE49-F238E27FC236}">
+                <a16:creationId xmlns:a16="http://schemas.microsoft.com/office/drawing/2014/main" id="{FE9606D9-3FC9-A4E6-0838-5C13A7A96060}"/>
+              </a:ext>
+            </a:extLst>
+          </p:cNvPr>
+          <p:cNvSpPr>
+            <a:spLocks noGrp="1"/>
+          </p:cNvSpPr>
+          <p:nvPr>
+            <p:ph idx="1"/>
+          </p:nvPr>
+        </p:nvSpPr>
+        <p:spPr/>
+        <p:txBody>
+          <a:bodyPr>
+            <a:normAutofit lnSpcReduction="10000"/>
+          </a:bodyPr>
+          <a:lstStyle/>
+          <a:p>
+            <a:pPr>
+              <a:spcAft>
+                <a:spcPts val="1200"/>
+              </a:spcAft>
+            </a:pPr>
+            <a:r>
+              <a:rPr lang="en-GB" dirty="0"/>
+              <a:t>In the EU, privacy and data protection are </a:t>
+            </a:r>
+            <a:r>
+              <a:rPr lang="en-GB" b="1" dirty="0"/>
+              <a:t>not absolute rights </a:t>
+            </a:r>
+            <a:r>
+              <a:rPr lang="en-GB" dirty="0"/>
+              <a:t>and can be limited under certain conditions according to the EU Charter of Fundamental Rights.</a:t>
+            </a:r>
+          </a:p>
+          <a:p>
+            <a:pPr>
+              <a:spcAft>
+                <a:spcPts val="1200"/>
+              </a:spcAft>
+            </a:pPr>
+            <a:endParaRPr lang="en-GB" dirty="0"/>
+          </a:p>
+          <a:p>
+            <a:pPr>
+              <a:spcAft>
+                <a:spcPts val="1200"/>
+              </a:spcAft>
+            </a:pPr>
+            <a:r>
+              <a:rPr lang="en-GB" dirty="0"/>
+              <a:t>Need to balance the rights to privacy against other EU values, human rights (e.g., right to freedom of expression), public and private interests (e.g., right to freedom of press), and national security. </a:t>
+            </a:r>
+          </a:p>
+          <a:p>
+            <a:pPr lvl="1">
+              <a:spcAft>
+                <a:spcPts val="1200"/>
+              </a:spcAft>
+            </a:pPr>
+            <a:r>
+              <a:rPr lang="en-GB" sz="2400" dirty="0"/>
+              <a:t>GDPR not applicable if data are used for the purposes of prevention, investigation, detection or prosecution of criminal offences. </a:t>
+            </a:r>
+          </a:p>
+          <a:p>
+            <a:pPr lvl="1">
+              <a:spcAft>
+                <a:spcPts val="1200"/>
+              </a:spcAft>
+            </a:pPr>
+            <a:endParaRPr lang="en-GB" sz="2400" dirty="0"/>
+          </a:p>
+          <a:p>
+            <a:pPr>
+              <a:spcAft>
+                <a:spcPts val="1200"/>
+              </a:spcAft>
+            </a:pPr>
+            <a:r>
+              <a:rPr lang="en-GB" dirty="0"/>
+              <a:t>DPAs ensure the balance between privacy and other interests.</a:t>
+            </a:r>
+          </a:p>
+          <a:p>
+            <a:endParaRPr lang="en-GB" dirty="0"/>
+          </a:p>
+        </p:txBody>
+      </p:sp>
+      <p:sp>
+        <p:nvSpPr>
+          <p:cNvPr id="4" name="Segnaposto numero diapositiva 3">
+            <a:extLst>
+              <a:ext uri="{FF2B5EF4-FFF2-40B4-BE49-F238E27FC236}">
+                <a16:creationId xmlns:a16="http://schemas.microsoft.com/office/drawing/2014/main" id="{D22327FA-5D01-7C65-08DC-85A710E22F7E}"/>
+              </a:ext>
+            </a:extLst>
+          </p:cNvPr>
+          <p:cNvSpPr>
+            <a:spLocks noGrp="1"/>
+          </p:cNvSpPr>
+          <p:nvPr>
+            <p:ph type="sldNum" sz="quarter" idx="12"/>
+          </p:nvPr>
+        </p:nvSpPr>
+        <p:spPr/>
+        <p:txBody>
+          <a:bodyPr/>
+          <a:lstStyle/>
+          <a:p>
+            <a:fld id="{31DE2C5B-556E-47B8-A792-024C2FCA4ACC}" type="slidenum">
+              <a:rPr lang="en-GB" smtClean="0"/>
+              <a:t>9</a:t>
+            </a:fld>
+            <a:endParaRPr lang="en-GB"/>
+          </a:p>
+        </p:txBody>
+      </p:sp>
+      <p:pic>
+        <p:nvPicPr>
+          <p:cNvPr id="6" name="Picture 5" descr="A hand with a yellow sign&#10;&#10;Description automatically generated">
+            <a:extLst>
+              <a:ext uri="{FF2B5EF4-FFF2-40B4-BE49-F238E27FC236}">
+                <a16:creationId xmlns:a16="http://schemas.microsoft.com/office/drawing/2014/main" id="{2609E103-752E-EDA2-97ED-7FAA4E2782CC}"/>
+              </a:ext>
+            </a:extLst>
+          </p:cNvPr>
+          <p:cNvPicPr>
+            <a:picLocks noChangeAspect="1"/>
+          </p:cNvPicPr>
+          <p:nvPr/>
+        </p:nvPicPr>
+        <p:blipFill>
+          <a:blip r:embed="rId2">
+            <a:extLst>
+              <a:ext uri="{28A0092B-C50C-407E-A947-70E740481C1C}">
+                <a14:useLocalDpi xmlns:a14="http://schemas.microsoft.com/office/drawing/2010/main" val="0"/>
+              </a:ext>
+            </a:extLst>
+          </a:blip>
+          <a:stretch>
+            <a:fillRect/>
+          </a:stretch>
+        </p:blipFill>
+        <p:spPr>
+          <a:xfrm>
+            <a:off x="10233732" y="4578096"/>
+            <a:ext cx="1530096" cy="1530096"/>
+          </a:xfrm>
+          <a:prstGeom prst="rect">
+            <a:avLst/>
+          </a:prstGeom>
+        </p:spPr>
+      </p:pic>
+    </p:spTree>
+    <p:extLst>
+      <p:ext uri="{BB962C8B-B14F-4D97-AF65-F5344CB8AC3E}">
+        <p14:creationId xmlns:p14="http://schemas.microsoft.com/office/powerpoint/2010/main" val="4150651060"/>
+      </p:ext>
+    </p:extLst>
+  </p:cSld>
+  <p:clrMapOvr>
+    <a:masterClrMapping/>
+  </p:clrMapOvr>
 </p:sld>
 </file>
 

</xml_diff>

<commit_message>
[master] done lab 11
</commit_message>
<xml_diff>
--- a/theory_12-regulation_on_data_protection/theory_12-regulation_on_data_protection.pptx
+++ b/theory_12-regulation_on_data_protection/theory_12-regulation_on_data_protection.pptx
@@ -228,7 +228,7 @@
           <a:p>
             <a:fld id="{251090E0-FB0C-49E9-9864-9F53EABEA96F}" type="datetimeFigureOut">
               <a:rPr lang="en-GB" smtClean="0"/>
-              <a:t>04/05/2024</a:t>
+              <a:t>13/05/2024</a:t>
             </a:fld>
             <a:endParaRPr lang="en-GB"/>
           </a:p>
@@ -494,6 +494,3586 @@
     </a:lvl9pPr>
   </p:notesStyle>
 </p:notesMaster>
+</file>
+
+<file path=ppt/notesSlides/notesSlide1.xml><?xml version="1.0" encoding="utf-8"?>
+<p:notes xmlns:a="http://schemas.openxmlformats.org/drawingml/2006/main" xmlns:r="http://schemas.openxmlformats.org/officeDocument/2006/relationships" xmlns:p="http://schemas.openxmlformats.org/presentationml/2006/main">
+  <p:cSld>
+    <p:spTree>
+      <p:nvGrpSpPr>
+        <p:cNvPr id="1" name=""/>
+        <p:cNvGrpSpPr/>
+        <p:nvPr/>
+      </p:nvGrpSpPr>
+      <p:grpSpPr>
+        <a:xfrm>
+          <a:off x="0" y="0"/>
+          <a:ext cx="0" cy="0"/>
+          <a:chOff x="0" y="0"/>
+          <a:chExt cx="0" cy="0"/>
+        </a:xfrm>
+      </p:grpSpPr>
+      <p:sp>
+        <p:nvSpPr>
+          <p:cNvPr id="2" name="Slide Image Placeholder 1"/>
+          <p:cNvSpPr>
+            <a:spLocks noGrp="1" noRot="1" noChangeAspect="1"/>
+          </p:cNvSpPr>
+          <p:nvPr>
+            <p:ph type="sldImg"/>
+          </p:nvPr>
+        </p:nvSpPr>
+        <p:spPr/>
+      </p:sp>
+      <p:sp>
+        <p:nvSpPr>
+          <p:cNvPr id="3" name="Notes Placeholder 2"/>
+          <p:cNvSpPr>
+            <a:spLocks noGrp="1"/>
+          </p:cNvSpPr>
+          <p:nvPr>
+            <p:ph type="body" idx="1"/>
+          </p:nvPr>
+        </p:nvSpPr>
+        <p:spPr/>
+        <p:txBody>
+          <a:bodyPr/>
+          <a:lstStyle/>
+          <a:p>
+            <a:pPr algn="l">
+              <a:buFont typeface="+mj-lt"/>
+              <a:buAutoNum type="arabicPeriod"/>
+            </a:pPr>
+            <a:r>
+              <a:rPr lang="en-US" b="1" i="0" dirty="0">
+                <a:solidFill>
+                  <a:srgbClr val="0D0D0D"/>
+                </a:solidFill>
+                <a:effectLst/>
+                <a:highlight>
+                  <a:srgbClr val="FFFFFF"/>
+                </a:highlight>
+                <a:latin typeface="Söhne"/>
+              </a:rPr>
+              <a:t>Privacy by Design</a:t>
+            </a:r>
+            <a:r>
+              <a:rPr lang="en-US" b="0" i="0" dirty="0">
+                <a:solidFill>
+                  <a:srgbClr val="0D0D0D"/>
+                </a:solidFill>
+                <a:effectLst/>
+                <a:highlight>
+                  <a:srgbClr val="FFFFFF"/>
+                </a:highlight>
+                <a:latin typeface="Söhne"/>
+              </a:rPr>
+              <a:t>: Si </a:t>
+            </a:r>
+            <a:r>
+              <a:rPr lang="en-US" b="0" i="0" dirty="0" err="1">
+                <a:solidFill>
+                  <a:srgbClr val="0D0D0D"/>
+                </a:solidFill>
+                <a:effectLst/>
+                <a:highlight>
+                  <a:srgbClr val="FFFFFF"/>
+                </a:highlight>
+                <a:latin typeface="Söhne"/>
+              </a:rPr>
+              <a:t>tratta</a:t>
+            </a:r>
+            <a:r>
+              <a:rPr lang="en-US" b="0" i="0" dirty="0">
+                <a:solidFill>
+                  <a:srgbClr val="0D0D0D"/>
+                </a:solidFill>
+                <a:effectLst/>
+                <a:highlight>
+                  <a:srgbClr val="FFFFFF"/>
+                </a:highlight>
+                <a:latin typeface="Söhne"/>
+              </a:rPr>
+              <a:t> di un </a:t>
+            </a:r>
+            <a:r>
+              <a:rPr lang="en-US" b="0" i="0" dirty="0" err="1">
+                <a:solidFill>
+                  <a:srgbClr val="0D0D0D"/>
+                </a:solidFill>
+                <a:effectLst/>
+                <a:highlight>
+                  <a:srgbClr val="FFFFFF"/>
+                </a:highlight>
+                <a:latin typeface="Söhne"/>
+              </a:rPr>
+              <a:t>approccio</a:t>
+            </a:r>
+            <a:r>
+              <a:rPr lang="en-US" b="0" i="0" dirty="0">
+                <a:solidFill>
+                  <a:srgbClr val="0D0D0D"/>
+                </a:solidFill>
+                <a:effectLst/>
+                <a:highlight>
+                  <a:srgbClr val="FFFFFF"/>
+                </a:highlight>
+                <a:latin typeface="Söhne"/>
+              </a:rPr>
+              <a:t> </a:t>
+            </a:r>
+            <a:r>
+              <a:rPr lang="en-US" b="0" i="0" dirty="0" err="1">
+                <a:solidFill>
+                  <a:srgbClr val="0D0D0D"/>
+                </a:solidFill>
+                <a:effectLst/>
+                <a:highlight>
+                  <a:srgbClr val="FFFFFF"/>
+                </a:highlight>
+                <a:latin typeface="Söhne"/>
+              </a:rPr>
+              <a:t>proattivo</a:t>
+            </a:r>
+            <a:r>
+              <a:rPr lang="en-US" b="0" i="0" dirty="0">
+                <a:solidFill>
+                  <a:srgbClr val="0D0D0D"/>
+                </a:solidFill>
+                <a:effectLst/>
+                <a:highlight>
+                  <a:srgbClr val="FFFFFF"/>
+                </a:highlight>
+                <a:latin typeface="Söhne"/>
+              </a:rPr>
+              <a:t> </a:t>
+            </a:r>
+            <a:r>
+              <a:rPr lang="en-US" b="0" i="0" dirty="0" err="1">
+                <a:solidFill>
+                  <a:srgbClr val="0D0D0D"/>
+                </a:solidFill>
+                <a:effectLst/>
+                <a:highlight>
+                  <a:srgbClr val="FFFFFF"/>
+                </a:highlight>
+                <a:latin typeface="Söhne"/>
+              </a:rPr>
+              <a:t>alla</a:t>
+            </a:r>
+            <a:r>
+              <a:rPr lang="en-US" b="0" i="0" dirty="0">
+                <a:solidFill>
+                  <a:srgbClr val="0D0D0D"/>
+                </a:solidFill>
+                <a:effectLst/>
+                <a:highlight>
+                  <a:srgbClr val="FFFFFF"/>
+                </a:highlight>
+                <a:latin typeface="Söhne"/>
+              </a:rPr>
+              <a:t> </a:t>
+            </a:r>
+            <a:r>
+              <a:rPr lang="en-US" b="0" i="0" dirty="0" err="1">
+                <a:solidFill>
+                  <a:srgbClr val="0D0D0D"/>
+                </a:solidFill>
+                <a:effectLst/>
+                <a:highlight>
+                  <a:srgbClr val="FFFFFF"/>
+                </a:highlight>
+                <a:latin typeface="Söhne"/>
+              </a:rPr>
+              <a:t>protezione</a:t>
+            </a:r>
+            <a:r>
+              <a:rPr lang="en-US" b="0" i="0" dirty="0">
+                <a:solidFill>
+                  <a:srgbClr val="0D0D0D"/>
+                </a:solidFill>
+                <a:effectLst/>
+                <a:highlight>
+                  <a:srgbClr val="FFFFFF"/>
+                </a:highlight>
+                <a:latin typeface="Söhne"/>
+              </a:rPr>
+              <a:t> </a:t>
+            </a:r>
+            <a:r>
+              <a:rPr lang="en-US" b="0" i="0" dirty="0" err="1">
+                <a:solidFill>
+                  <a:srgbClr val="0D0D0D"/>
+                </a:solidFill>
+                <a:effectLst/>
+                <a:highlight>
+                  <a:srgbClr val="FFFFFF"/>
+                </a:highlight>
+                <a:latin typeface="Söhne"/>
+              </a:rPr>
+              <a:t>della</a:t>
+            </a:r>
+            <a:r>
+              <a:rPr lang="en-US" b="0" i="0" dirty="0">
+                <a:solidFill>
+                  <a:srgbClr val="0D0D0D"/>
+                </a:solidFill>
+                <a:effectLst/>
+                <a:highlight>
+                  <a:srgbClr val="FFFFFF"/>
+                </a:highlight>
+                <a:latin typeface="Söhne"/>
+              </a:rPr>
+              <a:t> privacy </a:t>
+            </a:r>
+            <a:r>
+              <a:rPr lang="en-US" b="0" i="0" dirty="0" err="1">
+                <a:solidFill>
+                  <a:srgbClr val="0D0D0D"/>
+                </a:solidFill>
+                <a:effectLst/>
+                <a:highlight>
+                  <a:srgbClr val="FFFFFF"/>
+                </a:highlight>
+                <a:latin typeface="Söhne"/>
+              </a:rPr>
+              <a:t>che</a:t>
+            </a:r>
+            <a:r>
+              <a:rPr lang="en-US" b="0" i="0" dirty="0">
+                <a:solidFill>
+                  <a:srgbClr val="0D0D0D"/>
+                </a:solidFill>
+                <a:effectLst/>
+                <a:highlight>
+                  <a:srgbClr val="FFFFFF"/>
+                </a:highlight>
+                <a:latin typeface="Söhne"/>
+              </a:rPr>
+              <a:t> </a:t>
+            </a:r>
+            <a:r>
+              <a:rPr lang="en-US" b="0" i="0" dirty="0" err="1">
+                <a:solidFill>
+                  <a:srgbClr val="0D0D0D"/>
+                </a:solidFill>
+                <a:effectLst/>
+                <a:highlight>
+                  <a:srgbClr val="FFFFFF"/>
+                </a:highlight>
+                <a:latin typeface="Söhne"/>
+              </a:rPr>
+              <a:t>si</a:t>
+            </a:r>
+            <a:r>
+              <a:rPr lang="en-US" b="0" i="0" dirty="0">
+                <a:solidFill>
+                  <a:srgbClr val="0D0D0D"/>
+                </a:solidFill>
+                <a:effectLst/>
+                <a:highlight>
+                  <a:srgbClr val="FFFFFF"/>
+                </a:highlight>
+                <a:latin typeface="Söhne"/>
+              </a:rPr>
+              <a:t> </a:t>
+            </a:r>
+            <a:r>
+              <a:rPr lang="en-US" b="0" i="0" dirty="0" err="1">
+                <a:solidFill>
+                  <a:srgbClr val="0D0D0D"/>
+                </a:solidFill>
+                <a:effectLst/>
+                <a:highlight>
+                  <a:srgbClr val="FFFFFF"/>
+                </a:highlight>
+                <a:latin typeface="Söhne"/>
+              </a:rPr>
+              <a:t>concentra</a:t>
+            </a:r>
+            <a:r>
+              <a:rPr lang="en-US" b="0" i="0" dirty="0">
+                <a:solidFill>
+                  <a:srgbClr val="0D0D0D"/>
+                </a:solidFill>
+                <a:effectLst/>
+                <a:highlight>
+                  <a:srgbClr val="FFFFFF"/>
+                </a:highlight>
+                <a:latin typeface="Söhne"/>
+              </a:rPr>
+              <a:t> </a:t>
+            </a:r>
+            <a:r>
+              <a:rPr lang="en-US" b="0" i="0" dirty="0" err="1">
+                <a:solidFill>
+                  <a:srgbClr val="0D0D0D"/>
+                </a:solidFill>
+                <a:effectLst/>
+                <a:highlight>
+                  <a:srgbClr val="FFFFFF"/>
+                </a:highlight>
+                <a:latin typeface="Söhne"/>
+              </a:rPr>
+              <a:t>sull'integrazione</a:t>
+            </a:r>
+            <a:r>
+              <a:rPr lang="en-US" b="0" i="0" dirty="0">
+                <a:solidFill>
+                  <a:srgbClr val="0D0D0D"/>
+                </a:solidFill>
+                <a:effectLst/>
+                <a:highlight>
+                  <a:srgbClr val="FFFFFF"/>
+                </a:highlight>
+                <a:latin typeface="Söhne"/>
+              </a:rPr>
+              <a:t> </a:t>
+            </a:r>
+            <a:r>
+              <a:rPr lang="en-US" b="0" i="0" dirty="0" err="1">
+                <a:solidFill>
+                  <a:srgbClr val="0D0D0D"/>
+                </a:solidFill>
+                <a:effectLst/>
+                <a:highlight>
+                  <a:srgbClr val="FFFFFF"/>
+                </a:highlight>
+                <a:latin typeface="Söhne"/>
+              </a:rPr>
+              <a:t>della</a:t>
+            </a:r>
+            <a:r>
+              <a:rPr lang="en-US" b="0" i="0" dirty="0">
+                <a:solidFill>
+                  <a:srgbClr val="0D0D0D"/>
+                </a:solidFill>
+                <a:effectLst/>
+                <a:highlight>
+                  <a:srgbClr val="FFFFFF"/>
+                </a:highlight>
+                <a:latin typeface="Söhne"/>
+              </a:rPr>
+              <a:t> privacy fin </a:t>
+            </a:r>
+            <a:r>
+              <a:rPr lang="en-US" b="0" i="0" dirty="0" err="1">
+                <a:solidFill>
+                  <a:srgbClr val="0D0D0D"/>
+                </a:solidFill>
+                <a:effectLst/>
+                <a:highlight>
+                  <a:srgbClr val="FFFFFF"/>
+                </a:highlight>
+                <a:latin typeface="Söhne"/>
+              </a:rPr>
+              <a:t>dalla</a:t>
+            </a:r>
+            <a:r>
+              <a:rPr lang="en-US" b="0" i="0" dirty="0">
+                <a:solidFill>
+                  <a:srgbClr val="0D0D0D"/>
+                </a:solidFill>
+                <a:effectLst/>
+                <a:highlight>
+                  <a:srgbClr val="FFFFFF"/>
+                </a:highlight>
+                <a:latin typeface="Söhne"/>
+              </a:rPr>
+              <a:t> </a:t>
+            </a:r>
+            <a:r>
+              <a:rPr lang="en-US" b="0" i="0" dirty="0" err="1">
+                <a:solidFill>
+                  <a:srgbClr val="0D0D0D"/>
+                </a:solidFill>
+                <a:effectLst/>
+                <a:highlight>
+                  <a:srgbClr val="FFFFFF"/>
+                </a:highlight>
+                <a:latin typeface="Söhne"/>
+              </a:rPr>
+              <a:t>fase</a:t>
+            </a:r>
+            <a:r>
+              <a:rPr lang="en-US" b="0" i="0" dirty="0">
+                <a:solidFill>
+                  <a:srgbClr val="0D0D0D"/>
+                </a:solidFill>
+                <a:effectLst/>
+                <a:highlight>
+                  <a:srgbClr val="FFFFFF"/>
+                </a:highlight>
+                <a:latin typeface="Söhne"/>
+              </a:rPr>
+              <a:t> di </a:t>
+            </a:r>
+            <a:r>
+              <a:rPr lang="en-US" b="0" i="0" dirty="0" err="1">
+                <a:solidFill>
+                  <a:srgbClr val="0D0D0D"/>
+                </a:solidFill>
+                <a:effectLst/>
+                <a:highlight>
+                  <a:srgbClr val="FFFFFF"/>
+                </a:highlight>
+                <a:latin typeface="Söhne"/>
+              </a:rPr>
+              <a:t>progettazione</a:t>
+            </a:r>
+            <a:r>
+              <a:rPr lang="en-US" b="0" i="0" dirty="0">
+                <a:solidFill>
+                  <a:srgbClr val="0D0D0D"/>
+                </a:solidFill>
+                <a:effectLst/>
+                <a:highlight>
+                  <a:srgbClr val="FFFFFF"/>
+                </a:highlight>
+                <a:latin typeface="Söhne"/>
+              </a:rPr>
+              <a:t> di </a:t>
+            </a:r>
+            <a:r>
+              <a:rPr lang="en-US" b="0" i="0" dirty="0" err="1">
+                <a:solidFill>
+                  <a:srgbClr val="0D0D0D"/>
+                </a:solidFill>
+                <a:effectLst/>
+                <a:highlight>
+                  <a:srgbClr val="FFFFFF"/>
+                </a:highlight>
+                <a:latin typeface="Söhne"/>
+              </a:rPr>
+              <a:t>sistemi</a:t>
+            </a:r>
+            <a:r>
+              <a:rPr lang="en-US" b="0" i="0" dirty="0">
+                <a:solidFill>
+                  <a:srgbClr val="0D0D0D"/>
+                </a:solidFill>
+                <a:effectLst/>
+                <a:highlight>
+                  <a:srgbClr val="FFFFFF"/>
+                </a:highlight>
+                <a:latin typeface="Söhne"/>
+              </a:rPr>
+              <a:t>, </a:t>
+            </a:r>
+            <a:r>
+              <a:rPr lang="en-US" b="0" i="0" dirty="0" err="1">
+                <a:solidFill>
+                  <a:srgbClr val="0D0D0D"/>
+                </a:solidFill>
+                <a:effectLst/>
+                <a:highlight>
+                  <a:srgbClr val="FFFFFF"/>
+                </a:highlight>
+                <a:latin typeface="Söhne"/>
+              </a:rPr>
+              <a:t>applicazioni</a:t>
+            </a:r>
+            <a:r>
+              <a:rPr lang="en-US" b="0" i="0" dirty="0">
+                <a:solidFill>
+                  <a:srgbClr val="0D0D0D"/>
+                </a:solidFill>
+                <a:effectLst/>
+                <a:highlight>
+                  <a:srgbClr val="FFFFFF"/>
+                </a:highlight>
+                <a:latin typeface="Söhne"/>
+              </a:rPr>
+              <a:t> o </a:t>
+            </a:r>
+            <a:r>
+              <a:rPr lang="en-US" b="0" i="0" dirty="0" err="1">
+                <a:solidFill>
+                  <a:srgbClr val="0D0D0D"/>
+                </a:solidFill>
+                <a:effectLst/>
+                <a:highlight>
+                  <a:srgbClr val="FFFFFF"/>
+                </a:highlight>
+                <a:latin typeface="Söhne"/>
+              </a:rPr>
+              <a:t>servizi</a:t>
+            </a:r>
+            <a:r>
+              <a:rPr lang="en-US" b="0" i="0" dirty="0">
+                <a:solidFill>
+                  <a:srgbClr val="0D0D0D"/>
+                </a:solidFill>
+                <a:effectLst/>
+                <a:highlight>
+                  <a:srgbClr val="FFFFFF"/>
+                </a:highlight>
+                <a:latin typeface="Söhne"/>
+              </a:rPr>
+              <a:t>. </a:t>
+            </a:r>
+            <a:r>
+              <a:rPr lang="en-US" b="0" i="0" dirty="0" err="1">
+                <a:solidFill>
+                  <a:srgbClr val="0D0D0D"/>
+                </a:solidFill>
+                <a:effectLst/>
+                <a:highlight>
+                  <a:srgbClr val="FFFFFF"/>
+                </a:highlight>
+                <a:latin typeface="Söhne"/>
+              </a:rPr>
+              <a:t>L'idea</a:t>
+            </a:r>
+            <a:r>
+              <a:rPr lang="en-US" b="0" i="0" dirty="0">
+                <a:solidFill>
+                  <a:srgbClr val="0D0D0D"/>
+                </a:solidFill>
+                <a:effectLst/>
+                <a:highlight>
+                  <a:srgbClr val="FFFFFF"/>
+                </a:highlight>
+                <a:latin typeface="Söhne"/>
+              </a:rPr>
+              <a:t> </a:t>
+            </a:r>
+            <a:r>
+              <a:rPr lang="en-US" b="0" i="0" dirty="0" err="1">
+                <a:solidFill>
+                  <a:srgbClr val="0D0D0D"/>
+                </a:solidFill>
+                <a:effectLst/>
+                <a:highlight>
+                  <a:srgbClr val="FFFFFF"/>
+                </a:highlight>
+                <a:latin typeface="Söhne"/>
+              </a:rPr>
+              <a:t>è</a:t>
+            </a:r>
+            <a:r>
+              <a:rPr lang="en-US" b="0" i="0" dirty="0">
+                <a:solidFill>
+                  <a:srgbClr val="0D0D0D"/>
+                </a:solidFill>
+                <a:effectLst/>
+                <a:highlight>
+                  <a:srgbClr val="FFFFFF"/>
+                </a:highlight>
+                <a:latin typeface="Söhne"/>
+              </a:rPr>
+              <a:t> di </a:t>
+            </a:r>
+            <a:r>
+              <a:rPr lang="en-US" b="0" i="0" dirty="0" err="1">
+                <a:solidFill>
+                  <a:srgbClr val="0D0D0D"/>
+                </a:solidFill>
+                <a:effectLst/>
+                <a:highlight>
+                  <a:srgbClr val="FFFFFF"/>
+                </a:highlight>
+                <a:latin typeface="Söhne"/>
+              </a:rPr>
+              <a:t>considerare</a:t>
+            </a:r>
+            <a:r>
+              <a:rPr lang="en-US" b="0" i="0" dirty="0">
+                <a:solidFill>
+                  <a:srgbClr val="0D0D0D"/>
+                </a:solidFill>
+                <a:effectLst/>
+                <a:highlight>
+                  <a:srgbClr val="FFFFFF"/>
+                </a:highlight>
+                <a:latin typeface="Söhne"/>
+              </a:rPr>
+              <a:t> la privacy come un </a:t>
+            </a:r>
+            <a:r>
+              <a:rPr lang="en-US" b="0" i="0" dirty="0" err="1">
+                <a:solidFill>
+                  <a:srgbClr val="0D0D0D"/>
+                </a:solidFill>
+                <a:effectLst/>
+                <a:highlight>
+                  <a:srgbClr val="FFFFFF"/>
+                </a:highlight>
+                <a:latin typeface="Söhne"/>
+              </a:rPr>
+              <a:t>fattore</a:t>
+            </a:r>
+            <a:r>
+              <a:rPr lang="en-US" b="0" i="0" dirty="0">
+                <a:solidFill>
+                  <a:srgbClr val="0D0D0D"/>
+                </a:solidFill>
+                <a:effectLst/>
+                <a:highlight>
+                  <a:srgbClr val="FFFFFF"/>
+                </a:highlight>
+                <a:latin typeface="Söhne"/>
+              </a:rPr>
+              <a:t> </a:t>
+            </a:r>
+            <a:r>
+              <a:rPr lang="en-US" b="0" i="0" dirty="0" err="1">
+                <a:solidFill>
+                  <a:srgbClr val="0D0D0D"/>
+                </a:solidFill>
+                <a:effectLst/>
+                <a:highlight>
+                  <a:srgbClr val="FFFFFF"/>
+                </a:highlight>
+                <a:latin typeface="Söhne"/>
+              </a:rPr>
+              <a:t>chiave</a:t>
+            </a:r>
+            <a:r>
+              <a:rPr lang="en-US" b="0" i="0" dirty="0">
+                <a:solidFill>
+                  <a:srgbClr val="0D0D0D"/>
+                </a:solidFill>
+                <a:effectLst/>
+                <a:highlight>
+                  <a:srgbClr val="FFFFFF"/>
+                </a:highlight>
+                <a:latin typeface="Söhne"/>
+              </a:rPr>
+              <a:t> sin </a:t>
+            </a:r>
+            <a:r>
+              <a:rPr lang="en-US" b="0" i="0" dirty="0" err="1">
+                <a:solidFill>
+                  <a:srgbClr val="0D0D0D"/>
+                </a:solidFill>
+                <a:effectLst/>
+                <a:highlight>
+                  <a:srgbClr val="FFFFFF"/>
+                </a:highlight>
+                <a:latin typeface="Söhne"/>
+              </a:rPr>
+              <a:t>dall'inizio</a:t>
+            </a:r>
+            <a:r>
+              <a:rPr lang="en-US" b="0" i="0" dirty="0">
+                <a:solidFill>
+                  <a:srgbClr val="0D0D0D"/>
+                </a:solidFill>
+                <a:effectLst/>
+                <a:highlight>
+                  <a:srgbClr val="FFFFFF"/>
+                </a:highlight>
+                <a:latin typeface="Söhne"/>
+              </a:rPr>
+              <a:t> del </a:t>
+            </a:r>
+            <a:r>
+              <a:rPr lang="en-US" b="0" i="0" dirty="0" err="1">
+                <a:solidFill>
+                  <a:srgbClr val="0D0D0D"/>
+                </a:solidFill>
+                <a:effectLst/>
+                <a:highlight>
+                  <a:srgbClr val="FFFFFF"/>
+                </a:highlight>
+                <a:latin typeface="Söhne"/>
+              </a:rPr>
+              <a:t>processo</a:t>
+            </a:r>
+            <a:r>
+              <a:rPr lang="en-US" b="0" i="0" dirty="0">
+                <a:solidFill>
+                  <a:srgbClr val="0D0D0D"/>
+                </a:solidFill>
+                <a:effectLst/>
+                <a:highlight>
+                  <a:srgbClr val="FFFFFF"/>
+                </a:highlight>
+                <a:latin typeface="Söhne"/>
+              </a:rPr>
+              <a:t> di </a:t>
+            </a:r>
+            <a:r>
+              <a:rPr lang="en-US" b="0" i="0" dirty="0" err="1">
+                <a:solidFill>
+                  <a:srgbClr val="0D0D0D"/>
+                </a:solidFill>
+                <a:effectLst/>
+                <a:highlight>
+                  <a:srgbClr val="FFFFFF"/>
+                </a:highlight>
+                <a:latin typeface="Söhne"/>
+              </a:rPr>
+              <a:t>sviluppo</a:t>
+            </a:r>
+            <a:r>
+              <a:rPr lang="en-US" b="0" i="0" dirty="0">
+                <a:solidFill>
+                  <a:srgbClr val="0D0D0D"/>
+                </a:solidFill>
+                <a:effectLst/>
+                <a:highlight>
+                  <a:srgbClr val="FFFFFF"/>
+                </a:highlight>
+                <a:latin typeface="Söhne"/>
+              </a:rPr>
+              <a:t> </a:t>
+            </a:r>
+            <a:r>
+              <a:rPr lang="en-US" b="0" i="0" dirty="0" err="1">
+                <a:solidFill>
+                  <a:srgbClr val="0D0D0D"/>
+                </a:solidFill>
+                <a:effectLst/>
+                <a:highlight>
+                  <a:srgbClr val="FFFFFF"/>
+                </a:highlight>
+                <a:latin typeface="Söhne"/>
+              </a:rPr>
+              <a:t>anziché</a:t>
+            </a:r>
+            <a:r>
+              <a:rPr lang="en-US" b="0" i="0" dirty="0">
+                <a:solidFill>
+                  <a:srgbClr val="0D0D0D"/>
+                </a:solidFill>
+                <a:effectLst/>
+                <a:highlight>
+                  <a:srgbClr val="FFFFFF"/>
+                </a:highlight>
+                <a:latin typeface="Söhne"/>
+              </a:rPr>
+              <a:t> come </a:t>
+            </a:r>
+            <a:r>
+              <a:rPr lang="en-US" b="0" i="0" dirty="0" err="1">
+                <a:solidFill>
+                  <a:srgbClr val="0D0D0D"/>
+                </a:solidFill>
+                <a:effectLst/>
+                <a:highlight>
+                  <a:srgbClr val="FFFFFF"/>
+                </a:highlight>
+                <a:latin typeface="Söhne"/>
+              </a:rPr>
+              <a:t>un'aggiunta</a:t>
+            </a:r>
+            <a:r>
+              <a:rPr lang="en-US" b="0" i="0" dirty="0">
+                <a:solidFill>
+                  <a:srgbClr val="0D0D0D"/>
+                </a:solidFill>
+                <a:effectLst/>
+                <a:highlight>
+                  <a:srgbClr val="FFFFFF"/>
+                </a:highlight>
+                <a:latin typeface="Söhne"/>
+              </a:rPr>
+              <a:t> </a:t>
+            </a:r>
+            <a:r>
+              <a:rPr lang="en-US" b="0" i="0" dirty="0" err="1">
+                <a:solidFill>
+                  <a:srgbClr val="0D0D0D"/>
+                </a:solidFill>
+                <a:effectLst/>
+                <a:highlight>
+                  <a:srgbClr val="FFFFFF"/>
+                </a:highlight>
+                <a:latin typeface="Söhne"/>
+              </a:rPr>
+              <a:t>successiva</a:t>
+            </a:r>
+            <a:r>
+              <a:rPr lang="en-US" b="0" i="0" dirty="0">
+                <a:solidFill>
+                  <a:srgbClr val="0D0D0D"/>
+                </a:solidFill>
+                <a:effectLst/>
+                <a:highlight>
+                  <a:srgbClr val="FFFFFF"/>
+                </a:highlight>
+                <a:latin typeface="Söhne"/>
+              </a:rPr>
+              <a:t> o </a:t>
+            </a:r>
+            <a:r>
+              <a:rPr lang="en-US" b="0" i="0" dirty="0" err="1">
+                <a:solidFill>
+                  <a:srgbClr val="0D0D0D"/>
+                </a:solidFill>
+                <a:effectLst/>
+                <a:highlight>
+                  <a:srgbClr val="FFFFFF"/>
+                </a:highlight>
+                <a:latin typeface="Söhne"/>
+              </a:rPr>
+              <a:t>un'opzione</a:t>
+            </a:r>
+            <a:r>
+              <a:rPr lang="en-US" b="0" i="0" dirty="0">
+                <a:solidFill>
+                  <a:srgbClr val="0D0D0D"/>
+                </a:solidFill>
+                <a:effectLst/>
+                <a:highlight>
+                  <a:srgbClr val="FFFFFF"/>
+                </a:highlight>
+                <a:latin typeface="Söhne"/>
+              </a:rPr>
+              <a:t> </a:t>
+            </a:r>
+            <a:r>
+              <a:rPr lang="en-US" b="0" i="0" dirty="0" err="1">
+                <a:solidFill>
+                  <a:srgbClr val="0D0D0D"/>
+                </a:solidFill>
+                <a:effectLst/>
+                <a:highlight>
+                  <a:srgbClr val="FFFFFF"/>
+                </a:highlight>
+                <a:latin typeface="Söhne"/>
+              </a:rPr>
+              <a:t>aggiuntiva</a:t>
+            </a:r>
+            <a:r>
+              <a:rPr lang="en-US" b="0" i="0" dirty="0">
+                <a:solidFill>
+                  <a:srgbClr val="0D0D0D"/>
+                </a:solidFill>
+                <a:effectLst/>
+                <a:highlight>
+                  <a:srgbClr val="FFFFFF"/>
+                </a:highlight>
+                <a:latin typeface="Söhne"/>
+              </a:rPr>
+              <a:t>. </a:t>
+            </a:r>
+            <a:r>
+              <a:rPr lang="en-US" b="0" i="0" dirty="0" err="1">
+                <a:solidFill>
+                  <a:srgbClr val="0D0D0D"/>
+                </a:solidFill>
+                <a:effectLst/>
+                <a:highlight>
+                  <a:srgbClr val="FFFFFF"/>
+                </a:highlight>
+                <a:latin typeface="Söhne"/>
+              </a:rPr>
+              <a:t>Ciò</a:t>
+            </a:r>
+            <a:r>
+              <a:rPr lang="en-US" b="0" i="0" dirty="0">
+                <a:solidFill>
+                  <a:srgbClr val="0D0D0D"/>
+                </a:solidFill>
+                <a:effectLst/>
+                <a:highlight>
+                  <a:srgbClr val="FFFFFF"/>
+                </a:highlight>
+                <a:latin typeface="Söhne"/>
+              </a:rPr>
+              <a:t> </a:t>
+            </a:r>
+            <a:r>
+              <a:rPr lang="en-US" b="0" i="0" dirty="0" err="1">
+                <a:solidFill>
+                  <a:srgbClr val="0D0D0D"/>
+                </a:solidFill>
+                <a:effectLst/>
+                <a:highlight>
+                  <a:srgbClr val="FFFFFF"/>
+                </a:highlight>
+                <a:latin typeface="Söhne"/>
+              </a:rPr>
+              <a:t>significa</a:t>
+            </a:r>
+            <a:r>
+              <a:rPr lang="en-US" b="0" i="0" dirty="0">
+                <a:solidFill>
+                  <a:srgbClr val="0D0D0D"/>
+                </a:solidFill>
+                <a:effectLst/>
+                <a:highlight>
+                  <a:srgbClr val="FFFFFF"/>
+                </a:highlight>
+                <a:latin typeface="Söhne"/>
+              </a:rPr>
+              <a:t> </a:t>
+            </a:r>
+            <a:r>
+              <a:rPr lang="en-US" b="0" i="0" dirty="0" err="1">
+                <a:solidFill>
+                  <a:srgbClr val="0D0D0D"/>
+                </a:solidFill>
+                <a:effectLst/>
+                <a:highlight>
+                  <a:srgbClr val="FFFFFF"/>
+                </a:highlight>
+                <a:latin typeface="Söhne"/>
+              </a:rPr>
+              <a:t>che</a:t>
+            </a:r>
+            <a:r>
+              <a:rPr lang="en-US" b="0" i="0" dirty="0">
+                <a:solidFill>
+                  <a:srgbClr val="0D0D0D"/>
+                </a:solidFill>
+                <a:effectLst/>
+                <a:highlight>
+                  <a:srgbClr val="FFFFFF"/>
+                </a:highlight>
+                <a:latin typeface="Söhne"/>
+              </a:rPr>
+              <a:t> </a:t>
+            </a:r>
+            <a:r>
+              <a:rPr lang="en-US" b="0" i="0" dirty="0" err="1">
+                <a:solidFill>
+                  <a:srgbClr val="0D0D0D"/>
+                </a:solidFill>
+                <a:effectLst/>
+                <a:highlight>
+                  <a:srgbClr val="FFFFFF"/>
+                </a:highlight>
+                <a:latin typeface="Söhne"/>
+              </a:rPr>
+              <a:t>vengono</a:t>
+            </a:r>
+            <a:r>
+              <a:rPr lang="en-US" b="0" i="0" dirty="0">
+                <a:solidFill>
+                  <a:srgbClr val="0D0D0D"/>
+                </a:solidFill>
+                <a:effectLst/>
+                <a:highlight>
+                  <a:srgbClr val="FFFFFF"/>
+                </a:highlight>
+                <a:latin typeface="Söhne"/>
+              </a:rPr>
+              <a:t> prese in </a:t>
+            </a:r>
+            <a:r>
+              <a:rPr lang="en-US" b="0" i="0" dirty="0" err="1">
+                <a:solidFill>
+                  <a:srgbClr val="0D0D0D"/>
+                </a:solidFill>
+                <a:effectLst/>
+                <a:highlight>
+                  <a:srgbClr val="FFFFFF"/>
+                </a:highlight>
+                <a:latin typeface="Söhne"/>
+              </a:rPr>
+              <a:t>considerazione</a:t>
+            </a:r>
+            <a:r>
+              <a:rPr lang="en-US" b="0" i="0" dirty="0">
+                <a:solidFill>
+                  <a:srgbClr val="0D0D0D"/>
+                </a:solidFill>
+                <a:effectLst/>
+                <a:highlight>
+                  <a:srgbClr val="FFFFFF"/>
+                </a:highlight>
+                <a:latin typeface="Söhne"/>
+              </a:rPr>
+              <a:t> le </a:t>
+            </a:r>
+            <a:r>
+              <a:rPr lang="en-US" b="0" i="0" dirty="0" err="1">
+                <a:solidFill>
+                  <a:srgbClr val="0D0D0D"/>
+                </a:solidFill>
+                <a:effectLst/>
+                <a:highlight>
+                  <a:srgbClr val="FFFFFF"/>
+                </a:highlight>
+                <a:latin typeface="Söhne"/>
+              </a:rPr>
+              <a:t>implicazioni</a:t>
+            </a:r>
+            <a:r>
+              <a:rPr lang="en-US" b="0" i="0" dirty="0">
+                <a:solidFill>
+                  <a:srgbClr val="0D0D0D"/>
+                </a:solidFill>
+                <a:effectLst/>
+                <a:highlight>
+                  <a:srgbClr val="FFFFFF"/>
+                </a:highlight>
+                <a:latin typeface="Söhne"/>
+              </a:rPr>
+              <a:t> </a:t>
+            </a:r>
+            <a:r>
+              <a:rPr lang="en-US" b="0" i="0" dirty="0" err="1">
+                <a:solidFill>
+                  <a:srgbClr val="0D0D0D"/>
+                </a:solidFill>
+                <a:effectLst/>
+                <a:highlight>
+                  <a:srgbClr val="FFFFFF"/>
+                </a:highlight>
+                <a:latin typeface="Söhne"/>
+              </a:rPr>
+              <a:t>sulla</a:t>
+            </a:r>
+            <a:r>
+              <a:rPr lang="en-US" b="0" i="0" dirty="0">
+                <a:solidFill>
+                  <a:srgbClr val="0D0D0D"/>
+                </a:solidFill>
+                <a:effectLst/>
+                <a:highlight>
+                  <a:srgbClr val="FFFFFF"/>
+                </a:highlight>
+                <a:latin typeface="Söhne"/>
+              </a:rPr>
+              <a:t> privacy in </a:t>
+            </a:r>
+            <a:r>
+              <a:rPr lang="en-US" b="0" i="0" dirty="0" err="1">
+                <a:solidFill>
+                  <a:srgbClr val="0D0D0D"/>
+                </a:solidFill>
+                <a:effectLst/>
+                <a:highlight>
+                  <a:srgbClr val="FFFFFF"/>
+                </a:highlight>
+                <a:latin typeface="Söhne"/>
+              </a:rPr>
+              <a:t>ogni</a:t>
+            </a:r>
+            <a:r>
+              <a:rPr lang="en-US" b="0" i="0" dirty="0">
+                <a:solidFill>
+                  <a:srgbClr val="0D0D0D"/>
+                </a:solidFill>
+                <a:effectLst/>
+                <a:highlight>
+                  <a:srgbClr val="FFFFFF"/>
+                </a:highlight>
+                <a:latin typeface="Söhne"/>
+              </a:rPr>
+              <a:t> </a:t>
+            </a:r>
+            <a:r>
+              <a:rPr lang="en-US" b="0" i="0" dirty="0" err="1">
+                <a:solidFill>
+                  <a:srgbClr val="0D0D0D"/>
+                </a:solidFill>
+                <a:effectLst/>
+                <a:highlight>
+                  <a:srgbClr val="FFFFFF"/>
+                </a:highlight>
+                <a:latin typeface="Söhne"/>
+              </a:rPr>
+              <a:t>aspetto</a:t>
+            </a:r>
+            <a:r>
+              <a:rPr lang="en-US" b="0" i="0" dirty="0">
+                <a:solidFill>
+                  <a:srgbClr val="0D0D0D"/>
+                </a:solidFill>
+                <a:effectLst/>
+                <a:highlight>
+                  <a:srgbClr val="FFFFFF"/>
+                </a:highlight>
+                <a:latin typeface="Söhne"/>
+              </a:rPr>
+              <a:t> del design, </a:t>
+            </a:r>
+            <a:r>
+              <a:rPr lang="en-US" b="0" i="0" dirty="0" err="1">
+                <a:solidFill>
+                  <a:srgbClr val="0D0D0D"/>
+                </a:solidFill>
+                <a:effectLst/>
+                <a:highlight>
+                  <a:srgbClr val="FFFFFF"/>
+                </a:highlight>
+                <a:latin typeface="Söhne"/>
+              </a:rPr>
+              <a:t>dall'architettura</a:t>
+            </a:r>
+            <a:r>
+              <a:rPr lang="en-US" b="0" i="0" dirty="0">
+                <a:solidFill>
+                  <a:srgbClr val="0D0D0D"/>
+                </a:solidFill>
+                <a:effectLst/>
+                <a:highlight>
+                  <a:srgbClr val="FFFFFF"/>
+                </a:highlight>
+                <a:latin typeface="Söhne"/>
+              </a:rPr>
+              <a:t> del </a:t>
+            </a:r>
+            <a:r>
+              <a:rPr lang="en-US" b="0" i="0" dirty="0" err="1">
+                <a:solidFill>
+                  <a:srgbClr val="0D0D0D"/>
+                </a:solidFill>
+                <a:effectLst/>
+                <a:highlight>
+                  <a:srgbClr val="FFFFFF"/>
+                </a:highlight>
+                <a:latin typeface="Söhne"/>
+              </a:rPr>
+              <a:t>sistema</a:t>
+            </a:r>
+            <a:r>
+              <a:rPr lang="en-US" b="0" i="0" dirty="0">
+                <a:solidFill>
+                  <a:srgbClr val="0D0D0D"/>
+                </a:solidFill>
+                <a:effectLst/>
+                <a:highlight>
+                  <a:srgbClr val="FFFFFF"/>
+                </a:highlight>
+                <a:latin typeface="Söhne"/>
+              </a:rPr>
+              <a:t> </a:t>
+            </a:r>
+            <a:r>
+              <a:rPr lang="en-US" b="0" i="0" dirty="0" err="1">
+                <a:solidFill>
+                  <a:srgbClr val="0D0D0D"/>
+                </a:solidFill>
+                <a:effectLst/>
+                <a:highlight>
+                  <a:srgbClr val="FFFFFF"/>
+                </a:highlight>
+                <a:latin typeface="Söhne"/>
+              </a:rPr>
+              <a:t>alla</a:t>
+            </a:r>
+            <a:r>
+              <a:rPr lang="en-US" b="0" i="0" dirty="0">
+                <a:solidFill>
+                  <a:srgbClr val="0D0D0D"/>
+                </a:solidFill>
+                <a:effectLst/>
+                <a:highlight>
+                  <a:srgbClr val="FFFFFF"/>
+                </a:highlight>
+                <a:latin typeface="Söhne"/>
+              </a:rPr>
+              <a:t> </a:t>
+            </a:r>
+            <a:r>
+              <a:rPr lang="en-US" b="0" i="0" dirty="0" err="1">
+                <a:solidFill>
+                  <a:srgbClr val="0D0D0D"/>
+                </a:solidFill>
+                <a:effectLst/>
+                <a:highlight>
+                  <a:srgbClr val="FFFFFF"/>
+                </a:highlight>
+                <a:latin typeface="Söhne"/>
+              </a:rPr>
+              <a:t>gestione</a:t>
+            </a:r>
+            <a:r>
+              <a:rPr lang="en-US" b="0" i="0" dirty="0">
+                <a:solidFill>
+                  <a:srgbClr val="0D0D0D"/>
+                </a:solidFill>
+                <a:effectLst/>
+                <a:highlight>
+                  <a:srgbClr val="FFFFFF"/>
+                </a:highlight>
+                <a:latin typeface="Söhne"/>
+              </a:rPr>
+              <a:t> </a:t>
+            </a:r>
+            <a:r>
+              <a:rPr lang="en-US" b="0" i="0" dirty="0" err="1">
+                <a:solidFill>
+                  <a:srgbClr val="0D0D0D"/>
+                </a:solidFill>
+                <a:effectLst/>
+                <a:highlight>
+                  <a:srgbClr val="FFFFFF"/>
+                </a:highlight>
+                <a:latin typeface="Söhne"/>
+              </a:rPr>
+              <a:t>dei</a:t>
+            </a:r>
+            <a:r>
+              <a:rPr lang="en-US" b="0" i="0" dirty="0">
+                <a:solidFill>
+                  <a:srgbClr val="0D0D0D"/>
+                </a:solidFill>
+                <a:effectLst/>
+                <a:highlight>
+                  <a:srgbClr val="FFFFFF"/>
+                </a:highlight>
+                <a:latin typeface="Söhne"/>
+              </a:rPr>
+              <a:t> </a:t>
+            </a:r>
+            <a:r>
+              <a:rPr lang="en-US" b="0" i="0" dirty="0" err="1">
+                <a:solidFill>
+                  <a:srgbClr val="0D0D0D"/>
+                </a:solidFill>
+                <a:effectLst/>
+                <a:highlight>
+                  <a:srgbClr val="FFFFFF"/>
+                </a:highlight>
+                <a:latin typeface="Söhne"/>
+              </a:rPr>
+              <a:t>dati</a:t>
+            </a:r>
+            <a:r>
+              <a:rPr lang="en-US" b="0" i="0" dirty="0">
+                <a:solidFill>
+                  <a:srgbClr val="0D0D0D"/>
+                </a:solidFill>
+                <a:effectLst/>
+                <a:highlight>
+                  <a:srgbClr val="FFFFFF"/>
+                </a:highlight>
+                <a:latin typeface="Söhne"/>
+              </a:rPr>
+              <a:t> e alle </a:t>
+            </a:r>
+            <a:r>
+              <a:rPr lang="en-US" b="0" i="0" dirty="0" err="1">
+                <a:solidFill>
+                  <a:srgbClr val="0D0D0D"/>
+                </a:solidFill>
+                <a:effectLst/>
+                <a:highlight>
+                  <a:srgbClr val="FFFFFF"/>
+                </a:highlight>
+                <a:latin typeface="Söhne"/>
+              </a:rPr>
+              <a:t>interfacce</a:t>
+            </a:r>
+            <a:r>
+              <a:rPr lang="en-US" b="0" i="0" dirty="0">
+                <a:solidFill>
+                  <a:srgbClr val="0D0D0D"/>
+                </a:solidFill>
+                <a:effectLst/>
+                <a:highlight>
+                  <a:srgbClr val="FFFFFF"/>
+                </a:highlight>
+                <a:latin typeface="Söhne"/>
+              </a:rPr>
+              <a:t> </a:t>
+            </a:r>
+            <a:r>
+              <a:rPr lang="en-US" b="0" i="0" dirty="0" err="1">
+                <a:solidFill>
+                  <a:srgbClr val="0D0D0D"/>
+                </a:solidFill>
+                <a:effectLst/>
+                <a:highlight>
+                  <a:srgbClr val="FFFFFF"/>
+                </a:highlight>
+                <a:latin typeface="Söhne"/>
+              </a:rPr>
+              <a:t>utente</a:t>
+            </a:r>
+            <a:r>
+              <a:rPr lang="en-US" b="0" i="0" dirty="0">
+                <a:solidFill>
+                  <a:srgbClr val="0D0D0D"/>
+                </a:solidFill>
+                <a:effectLst/>
+                <a:highlight>
+                  <a:srgbClr val="FFFFFF"/>
+                </a:highlight>
+                <a:latin typeface="Söhne"/>
+              </a:rPr>
+              <a:t>. </a:t>
+            </a:r>
+            <a:r>
+              <a:rPr lang="en-US" b="0" i="0" dirty="0" err="1">
+                <a:solidFill>
+                  <a:srgbClr val="0D0D0D"/>
+                </a:solidFill>
+                <a:effectLst/>
+                <a:highlight>
+                  <a:srgbClr val="FFFFFF"/>
+                </a:highlight>
+                <a:latin typeface="Söhne"/>
+              </a:rPr>
+              <a:t>L'obiettivo</a:t>
+            </a:r>
+            <a:r>
+              <a:rPr lang="en-US" b="0" i="0" dirty="0">
+                <a:solidFill>
+                  <a:srgbClr val="0D0D0D"/>
+                </a:solidFill>
+                <a:effectLst/>
+                <a:highlight>
+                  <a:srgbClr val="FFFFFF"/>
+                </a:highlight>
+                <a:latin typeface="Söhne"/>
+              </a:rPr>
+              <a:t> </a:t>
+            </a:r>
+            <a:r>
+              <a:rPr lang="en-US" b="0" i="0" dirty="0" err="1">
+                <a:solidFill>
+                  <a:srgbClr val="0D0D0D"/>
+                </a:solidFill>
+                <a:effectLst/>
+                <a:highlight>
+                  <a:srgbClr val="FFFFFF"/>
+                </a:highlight>
+                <a:latin typeface="Söhne"/>
+              </a:rPr>
+              <a:t>è</a:t>
+            </a:r>
+            <a:r>
+              <a:rPr lang="en-US" b="0" i="0" dirty="0">
+                <a:solidFill>
+                  <a:srgbClr val="0D0D0D"/>
+                </a:solidFill>
+                <a:effectLst/>
+                <a:highlight>
+                  <a:srgbClr val="FFFFFF"/>
+                </a:highlight>
+                <a:latin typeface="Söhne"/>
+              </a:rPr>
+              <a:t> </a:t>
+            </a:r>
+            <a:r>
+              <a:rPr lang="en-US" b="0" i="0" dirty="0" err="1">
+                <a:solidFill>
+                  <a:srgbClr val="0D0D0D"/>
+                </a:solidFill>
+                <a:effectLst/>
+                <a:highlight>
+                  <a:srgbClr val="FFFFFF"/>
+                </a:highlight>
+                <a:latin typeface="Söhne"/>
+              </a:rPr>
+              <a:t>quello</a:t>
+            </a:r>
+            <a:r>
+              <a:rPr lang="en-US" b="0" i="0" dirty="0">
+                <a:solidFill>
+                  <a:srgbClr val="0D0D0D"/>
+                </a:solidFill>
+                <a:effectLst/>
+                <a:highlight>
+                  <a:srgbClr val="FFFFFF"/>
+                </a:highlight>
+                <a:latin typeface="Söhne"/>
+              </a:rPr>
+              <a:t> di </a:t>
+            </a:r>
+            <a:r>
+              <a:rPr lang="en-US" b="0" i="0" dirty="0" err="1">
+                <a:solidFill>
+                  <a:srgbClr val="0D0D0D"/>
+                </a:solidFill>
+                <a:effectLst/>
+                <a:highlight>
+                  <a:srgbClr val="FFFFFF"/>
+                </a:highlight>
+                <a:latin typeface="Söhne"/>
+              </a:rPr>
+              <a:t>garantire</a:t>
+            </a:r>
+            <a:r>
+              <a:rPr lang="en-US" b="0" i="0" dirty="0">
+                <a:solidFill>
+                  <a:srgbClr val="0D0D0D"/>
+                </a:solidFill>
+                <a:effectLst/>
+                <a:highlight>
+                  <a:srgbClr val="FFFFFF"/>
+                </a:highlight>
+                <a:latin typeface="Söhne"/>
+              </a:rPr>
+              <a:t> </a:t>
+            </a:r>
+            <a:r>
+              <a:rPr lang="en-US" b="0" i="0" dirty="0" err="1">
+                <a:solidFill>
+                  <a:srgbClr val="0D0D0D"/>
+                </a:solidFill>
+                <a:effectLst/>
+                <a:highlight>
+                  <a:srgbClr val="FFFFFF"/>
+                </a:highlight>
+                <a:latin typeface="Söhne"/>
+              </a:rPr>
+              <a:t>che</a:t>
+            </a:r>
+            <a:r>
+              <a:rPr lang="en-US" b="0" i="0" dirty="0">
+                <a:solidFill>
+                  <a:srgbClr val="0D0D0D"/>
+                </a:solidFill>
+                <a:effectLst/>
+                <a:highlight>
+                  <a:srgbClr val="FFFFFF"/>
+                </a:highlight>
+                <a:latin typeface="Söhne"/>
+              </a:rPr>
+              <a:t> </a:t>
+            </a:r>
+            <a:r>
+              <a:rPr lang="en-US" b="0" i="0" dirty="0" err="1">
+                <a:solidFill>
+                  <a:srgbClr val="0D0D0D"/>
+                </a:solidFill>
+                <a:effectLst/>
+                <a:highlight>
+                  <a:srgbClr val="FFFFFF"/>
+                </a:highlight>
+                <a:latin typeface="Söhne"/>
+              </a:rPr>
+              <a:t>i</a:t>
+            </a:r>
+            <a:r>
+              <a:rPr lang="en-US" b="0" i="0" dirty="0">
+                <a:solidFill>
+                  <a:srgbClr val="0D0D0D"/>
+                </a:solidFill>
+                <a:effectLst/>
+                <a:highlight>
+                  <a:srgbClr val="FFFFFF"/>
+                </a:highlight>
+                <a:latin typeface="Söhne"/>
+              </a:rPr>
+              <a:t> </a:t>
+            </a:r>
+            <a:r>
+              <a:rPr lang="en-US" b="0" i="0" dirty="0" err="1">
+                <a:solidFill>
+                  <a:srgbClr val="0D0D0D"/>
+                </a:solidFill>
+                <a:effectLst/>
+                <a:highlight>
+                  <a:srgbClr val="FFFFFF"/>
+                </a:highlight>
+                <a:latin typeface="Söhne"/>
+              </a:rPr>
+              <a:t>dati</a:t>
+            </a:r>
+            <a:r>
+              <a:rPr lang="en-US" b="0" i="0" dirty="0">
+                <a:solidFill>
+                  <a:srgbClr val="0D0D0D"/>
+                </a:solidFill>
+                <a:effectLst/>
+                <a:highlight>
+                  <a:srgbClr val="FFFFFF"/>
+                </a:highlight>
+                <a:latin typeface="Söhne"/>
+              </a:rPr>
+              <a:t> </a:t>
+            </a:r>
+            <a:r>
+              <a:rPr lang="en-US" b="0" i="0" dirty="0" err="1">
+                <a:solidFill>
+                  <a:srgbClr val="0D0D0D"/>
+                </a:solidFill>
+                <a:effectLst/>
+                <a:highlight>
+                  <a:srgbClr val="FFFFFF"/>
+                </a:highlight>
+                <a:latin typeface="Söhne"/>
+              </a:rPr>
+              <a:t>personali</a:t>
+            </a:r>
+            <a:r>
+              <a:rPr lang="en-US" b="0" i="0" dirty="0">
+                <a:solidFill>
+                  <a:srgbClr val="0D0D0D"/>
+                </a:solidFill>
+                <a:effectLst/>
+                <a:highlight>
+                  <a:srgbClr val="FFFFFF"/>
+                </a:highlight>
+                <a:latin typeface="Söhne"/>
+              </a:rPr>
+              <a:t> </a:t>
+            </a:r>
+            <a:r>
+              <a:rPr lang="en-US" b="0" i="0" dirty="0" err="1">
+                <a:solidFill>
+                  <a:srgbClr val="0D0D0D"/>
+                </a:solidFill>
+                <a:effectLst/>
+                <a:highlight>
+                  <a:srgbClr val="FFFFFF"/>
+                </a:highlight>
+                <a:latin typeface="Söhne"/>
+              </a:rPr>
+              <a:t>siano</a:t>
+            </a:r>
+            <a:r>
+              <a:rPr lang="en-US" b="0" i="0" dirty="0">
+                <a:solidFill>
+                  <a:srgbClr val="0D0D0D"/>
+                </a:solidFill>
+                <a:effectLst/>
+                <a:highlight>
+                  <a:srgbClr val="FFFFFF"/>
+                </a:highlight>
+                <a:latin typeface="Söhne"/>
+              </a:rPr>
+              <a:t> </a:t>
+            </a:r>
+            <a:r>
+              <a:rPr lang="en-US" b="0" i="0" dirty="0" err="1">
+                <a:solidFill>
+                  <a:srgbClr val="0D0D0D"/>
+                </a:solidFill>
+                <a:effectLst/>
+                <a:highlight>
+                  <a:srgbClr val="FFFFFF"/>
+                </a:highlight>
+                <a:latin typeface="Söhne"/>
+              </a:rPr>
+              <a:t>trattati</a:t>
+            </a:r>
+            <a:r>
+              <a:rPr lang="en-US" b="0" i="0" dirty="0">
+                <a:solidFill>
+                  <a:srgbClr val="0D0D0D"/>
+                </a:solidFill>
+                <a:effectLst/>
+                <a:highlight>
+                  <a:srgbClr val="FFFFFF"/>
+                </a:highlight>
+                <a:latin typeface="Söhne"/>
+              </a:rPr>
+              <a:t> in modo </a:t>
+            </a:r>
+            <a:r>
+              <a:rPr lang="en-US" b="0" i="0" dirty="0" err="1">
+                <a:solidFill>
+                  <a:srgbClr val="0D0D0D"/>
+                </a:solidFill>
+                <a:effectLst/>
+                <a:highlight>
+                  <a:srgbClr val="FFFFFF"/>
+                </a:highlight>
+                <a:latin typeface="Söhne"/>
+              </a:rPr>
+              <a:t>sicuro</a:t>
+            </a:r>
+            <a:r>
+              <a:rPr lang="en-US" b="0" i="0" dirty="0">
+                <a:solidFill>
+                  <a:srgbClr val="0D0D0D"/>
+                </a:solidFill>
+                <a:effectLst/>
+                <a:highlight>
+                  <a:srgbClr val="FFFFFF"/>
+                </a:highlight>
+                <a:latin typeface="Söhne"/>
+              </a:rPr>
+              <a:t> e </a:t>
+            </a:r>
+            <a:r>
+              <a:rPr lang="en-US" b="0" i="0" dirty="0" err="1">
+                <a:solidFill>
+                  <a:srgbClr val="0D0D0D"/>
+                </a:solidFill>
+                <a:effectLst/>
+                <a:highlight>
+                  <a:srgbClr val="FFFFFF"/>
+                </a:highlight>
+                <a:latin typeface="Söhne"/>
+              </a:rPr>
+              <a:t>trasparente</a:t>
+            </a:r>
+            <a:r>
+              <a:rPr lang="en-US" b="0" i="0" dirty="0">
+                <a:solidFill>
+                  <a:srgbClr val="0D0D0D"/>
+                </a:solidFill>
+                <a:effectLst/>
+                <a:highlight>
+                  <a:srgbClr val="FFFFFF"/>
+                </a:highlight>
+                <a:latin typeface="Söhne"/>
+              </a:rPr>
+              <a:t> fin </a:t>
+            </a:r>
+            <a:r>
+              <a:rPr lang="en-US" b="0" i="0" dirty="0" err="1">
+                <a:solidFill>
+                  <a:srgbClr val="0D0D0D"/>
+                </a:solidFill>
+                <a:effectLst/>
+                <a:highlight>
+                  <a:srgbClr val="FFFFFF"/>
+                </a:highlight>
+                <a:latin typeface="Söhne"/>
+              </a:rPr>
+              <a:t>dall'inizio</a:t>
+            </a:r>
+            <a:r>
+              <a:rPr lang="en-US" b="0" i="0" dirty="0">
+                <a:solidFill>
+                  <a:srgbClr val="0D0D0D"/>
+                </a:solidFill>
+                <a:effectLst/>
+                <a:highlight>
+                  <a:srgbClr val="FFFFFF"/>
+                </a:highlight>
+                <a:latin typeface="Söhne"/>
+              </a:rPr>
+              <a:t>, </a:t>
+            </a:r>
+            <a:r>
+              <a:rPr lang="en-US" b="0" i="0" dirty="0" err="1">
+                <a:solidFill>
+                  <a:srgbClr val="0D0D0D"/>
+                </a:solidFill>
+                <a:effectLst/>
+                <a:highlight>
+                  <a:srgbClr val="FFFFFF"/>
+                </a:highlight>
+                <a:latin typeface="Söhne"/>
+              </a:rPr>
+              <a:t>riducendo</a:t>
+            </a:r>
+            <a:r>
+              <a:rPr lang="en-US" b="0" i="0" dirty="0">
+                <a:solidFill>
+                  <a:srgbClr val="0D0D0D"/>
+                </a:solidFill>
+                <a:effectLst/>
+                <a:highlight>
+                  <a:srgbClr val="FFFFFF"/>
+                </a:highlight>
+                <a:latin typeface="Söhne"/>
+              </a:rPr>
+              <a:t> </a:t>
+            </a:r>
+            <a:r>
+              <a:rPr lang="en-US" b="0" i="0" dirty="0" err="1">
+                <a:solidFill>
+                  <a:srgbClr val="0D0D0D"/>
+                </a:solidFill>
+                <a:effectLst/>
+                <a:highlight>
+                  <a:srgbClr val="FFFFFF"/>
+                </a:highlight>
+                <a:latin typeface="Söhne"/>
+              </a:rPr>
+              <a:t>così</a:t>
+            </a:r>
+            <a:r>
+              <a:rPr lang="en-US" b="0" i="0" dirty="0">
+                <a:solidFill>
+                  <a:srgbClr val="0D0D0D"/>
+                </a:solidFill>
+                <a:effectLst/>
+                <a:highlight>
+                  <a:srgbClr val="FFFFFF"/>
+                </a:highlight>
+                <a:latin typeface="Söhne"/>
+              </a:rPr>
+              <a:t> il </a:t>
+            </a:r>
+            <a:r>
+              <a:rPr lang="en-US" b="0" i="0" dirty="0" err="1">
+                <a:solidFill>
+                  <a:srgbClr val="0D0D0D"/>
+                </a:solidFill>
+                <a:effectLst/>
+                <a:highlight>
+                  <a:srgbClr val="FFFFFF"/>
+                </a:highlight>
+                <a:latin typeface="Söhne"/>
+              </a:rPr>
+              <a:t>rischio</a:t>
+            </a:r>
+            <a:r>
+              <a:rPr lang="en-US" b="0" i="0" dirty="0">
+                <a:solidFill>
+                  <a:srgbClr val="0D0D0D"/>
+                </a:solidFill>
+                <a:effectLst/>
+                <a:highlight>
+                  <a:srgbClr val="FFFFFF"/>
+                </a:highlight>
+                <a:latin typeface="Söhne"/>
+              </a:rPr>
+              <a:t> di </a:t>
+            </a:r>
+            <a:r>
+              <a:rPr lang="en-US" b="0" i="0" dirty="0" err="1">
+                <a:solidFill>
+                  <a:srgbClr val="0D0D0D"/>
+                </a:solidFill>
+                <a:effectLst/>
+                <a:highlight>
+                  <a:srgbClr val="FFFFFF"/>
+                </a:highlight>
+                <a:latin typeface="Söhne"/>
+              </a:rPr>
+              <a:t>violazioni</a:t>
+            </a:r>
+            <a:r>
+              <a:rPr lang="en-US" b="0" i="0" dirty="0">
+                <a:solidFill>
+                  <a:srgbClr val="0D0D0D"/>
+                </a:solidFill>
+                <a:effectLst/>
+                <a:highlight>
+                  <a:srgbClr val="FFFFFF"/>
+                </a:highlight>
+                <a:latin typeface="Söhne"/>
+              </a:rPr>
+              <a:t> </a:t>
+            </a:r>
+            <a:r>
+              <a:rPr lang="en-US" b="0" i="0" dirty="0" err="1">
+                <a:solidFill>
+                  <a:srgbClr val="0D0D0D"/>
+                </a:solidFill>
+                <a:effectLst/>
+                <a:highlight>
+                  <a:srgbClr val="FFFFFF"/>
+                </a:highlight>
+                <a:latin typeface="Söhne"/>
+              </a:rPr>
+              <a:t>della</a:t>
+            </a:r>
+            <a:r>
+              <a:rPr lang="en-US" b="0" i="0" dirty="0">
+                <a:solidFill>
+                  <a:srgbClr val="0D0D0D"/>
+                </a:solidFill>
+                <a:effectLst/>
+                <a:highlight>
+                  <a:srgbClr val="FFFFFF"/>
+                </a:highlight>
+                <a:latin typeface="Söhne"/>
+              </a:rPr>
+              <a:t> privacy in </a:t>
+            </a:r>
+            <a:r>
+              <a:rPr lang="en-US" b="0" i="0" dirty="0" err="1">
+                <a:solidFill>
+                  <a:srgbClr val="0D0D0D"/>
+                </a:solidFill>
+                <a:effectLst/>
+                <a:highlight>
+                  <a:srgbClr val="FFFFFF"/>
+                </a:highlight>
+                <a:latin typeface="Söhne"/>
+              </a:rPr>
+              <a:t>seguito</a:t>
+            </a:r>
+            <a:r>
+              <a:rPr lang="en-US" b="0" i="0" dirty="0">
+                <a:solidFill>
+                  <a:srgbClr val="0D0D0D"/>
+                </a:solidFill>
+                <a:effectLst/>
+                <a:highlight>
+                  <a:srgbClr val="FFFFFF"/>
+                </a:highlight>
+                <a:latin typeface="Söhne"/>
+              </a:rPr>
+              <a:t>.</a:t>
+            </a:r>
+          </a:p>
+          <a:p>
+            <a:pPr algn="l">
+              <a:buFont typeface="+mj-lt"/>
+              <a:buAutoNum type="arabicPeriod"/>
+            </a:pPr>
+            <a:r>
+              <a:rPr lang="en-US" b="1" i="0" dirty="0">
+                <a:solidFill>
+                  <a:srgbClr val="0D0D0D"/>
+                </a:solidFill>
+                <a:effectLst/>
+                <a:highlight>
+                  <a:srgbClr val="FFFFFF"/>
+                </a:highlight>
+                <a:latin typeface="Söhne"/>
+              </a:rPr>
+              <a:t>Privacy by Default</a:t>
+            </a:r>
+            <a:r>
+              <a:rPr lang="en-US" b="0" i="0" dirty="0">
+                <a:solidFill>
+                  <a:srgbClr val="0D0D0D"/>
+                </a:solidFill>
+                <a:effectLst/>
+                <a:highlight>
+                  <a:srgbClr val="FFFFFF"/>
+                </a:highlight>
+                <a:latin typeface="Söhne"/>
+              </a:rPr>
+              <a:t>: </a:t>
+            </a:r>
+            <a:r>
+              <a:rPr lang="en-US" b="0" i="0" dirty="0" err="1">
+                <a:solidFill>
+                  <a:srgbClr val="0D0D0D"/>
+                </a:solidFill>
+                <a:effectLst/>
+                <a:highlight>
+                  <a:srgbClr val="FFFFFF"/>
+                </a:highlight>
+                <a:latin typeface="Söhne"/>
+              </a:rPr>
+              <a:t>Questo</a:t>
+            </a:r>
+            <a:r>
+              <a:rPr lang="en-US" b="0" i="0" dirty="0">
+                <a:solidFill>
+                  <a:srgbClr val="0D0D0D"/>
+                </a:solidFill>
+                <a:effectLst/>
+                <a:highlight>
+                  <a:srgbClr val="FFFFFF"/>
+                </a:highlight>
+                <a:latin typeface="Söhne"/>
+              </a:rPr>
+              <a:t> </a:t>
+            </a:r>
+            <a:r>
+              <a:rPr lang="en-US" b="0" i="0" dirty="0" err="1">
+                <a:solidFill>
+                  <a:srgbClr val="0D0D0D"/>
+                </a:solidFill>
+                <a:effectLst/>
+                <a:highlight>
+                  <a:srgbClr val="FFFFFF"/>
+                </a:highlight>
+                <a:latin typeface="Söhne"/>
+              </a:rPr>
+              <a:t>concetto</a:t>
+            </a:r>
+            <a:r>
+              <a:rPr lang="en-US" b="0" i="0" dirty="0">
+                <a:solidFill>
+                  <a:srgbClr val="0D0D0D"/>
+                </a:solidFill>
+                <a:effectLst/>
+                <a:highlight>
+                  <a:srgbClr val="FFFFFF"/>
+                </a:highlight>
+                <a:latin typeface="Söhne"/>
+              </a:rPr>
+              <a:t> </a:t>
+            </a:r>
+            <a:r>
+              <a:rPr lang="en-US" b="0" i="0" dirty="0" err="1">
+                <a:solidFill>
+                  <a:srgbClr val="0D0D0D"/>
+                </a:solidFill>
+                <a:effectLst/>
+                <a:highlight>
+                  <a:srgbClr val="FFFFFF"/>
+                </a:highlight>
+                <a:latin typeface="Söhne"/>
+              </a:rPr>
+              <a:t>si</a:t>
+            </a:r>
+            <a:r>
+              <a:rPr lang="en-US" b="0" i="0" dirty="0">
+                <a:solidFill>
+                  <a:srgbClr val="0D0D0D"/>
+                </a:solidFill>
+                <a:effectLst/>
+                <a:highlight>
+                  <a:srgbClr val="FFFFFF"/>
+                </a:highlight>
+                <a:latin typeface="Söhne"/>
+              </a:rPr>
+              <a:t> </a:t>
+            </a:r>
+            <a:r>
+              <a:rPr lang="en-US" b="0" i="0" dirty="0" err="1">
+                <a:solidFill>
+                  <a:srgbClr val="0D0D0D"/>
+                </a:solidFill>
+                <a:effectLst/>
+                <a:highlight>
+                  <a:srgbClr val="FFFFFF"/>
+                </a:highlight>
+                <a:latin typeface="Söhne"/>
+              </a:rPr>
+              <a:t>concentra</a:t>
+            </a:r>
+            <a:r>
+              <a:rPr lang="en-US" b="0" i="0" dirty="0">
+                <a:solidFill>
+                  <a:srgbClr val="0D0D0D"/>
+                </a:solidFill>
+                <a:effectLst/>
+                <a:highlight>
+                  <a:srgbClr val="FFFFFF"/>
+                </a:highlight>
+                <a:latin typeface="Söhne"/>
+              </a:rPr>
+              <a:t> </a:t>
+            </a:r>
+            <a:r>
+              <a:rPr lang="en-US" b="0" i="0" dirty="0" err="1">
+                <a:solidFill>
+                  <a:srgbClr val="0D0D0D"/>
+                </a:solidFill>
+                <a:effectLst/>
+                <a:highlight>
+                  <a:srgbClr val="FFFFFF"/>
+                </a:highlight>
+                <a:latin typeface="Söhne"/>
+              </a:rPr>
+              <a:t>sulla</a:t>
+            </a:r>
+            <a:r>
+              <a:rPr lang="en-US" b="0" i="0" dirty="0">
+                <a:solidFill>
+                  <a:srgbClr val="0D0D0D"/>
+                </a:solidFill>
+                <a:effectLst/>
+                <a:highlight>
+                  <a:srgbClr val="FFFFFF"/>
+                </a:highlight>
+                <a:latin typeface="Söhne"/>
+              </a:rPr>
+              <a:t> </a:t>
+            </a:r>
+            <a:r>
+              <a:rPr lang="en-US" b="0" i="0" dirty="0" err="1">
+                <a:solidFill>
+                  <a:srgbClr val="0D0D0D"/>
+                </a:solidFill>
+                <a:effectLst/>
+                <a:highlight>
+                  <a:srgbClr val="FFFFFF"/>
+                </a:highlight>
+                <a:latin typeface="Söhne"/>
+              </a:rPr>
+              <a:t>configurazione</a:t>
+            </a:r>
+            <a:r>
+              <a:rPr lang="en-US" b="0" i="0" dirty="0">
+                <a:solidFill>
+                  <a:srgbClr val="0D0D0D"/>
+                </a:solidFill>
+                <a:effectLst/>
+                <a:highlight>
+                  <a:srgbClr val="FFFFFF"/>
+                </a:highlight>
+                <a:latin typeface="Söhne"/>
+              </a:rPr>
+              <a:t> </a:t>
+            </a:r>
+            <a:r>
+              <a:rPr lang="en-US" b="0" i="0" dirty="0" err="1">
+                <a:solidFill>
+                  <a:srgbClr val="0D0D0D"/>
+                </a:solidFill>
+                <a:effectLst/>
+                <a:highlight>
+                  <a:srgbClr val="FFFFFF"/>
+                </a:highlight>
+                <a:latin typeface="Söhne"/>
+              </a:rPr>
+              <a:t>predefinita</a:t>
+            </a:r>
+            <a:r>
+              <a:rPr lang="en-US" b="0" i="0" dirty="0">
+                <a:solidFill>
+                  <a:srgbClr val="0D0D0D"/>
+                </a:solidFill>
+                <a:effectLst/>
+                <a:highlight>
+                  <a:srgbClr val="FFFFFF"/>
+                </a:highlight>
+                <a:latin typeface="Söhne"/>
+              </a:rPr>
+              <a:t> </a:t>
+            </a:r>
+            <a:r>
+              <a:rPr lang="en-US" b="0" i="0" dirty="0" err="1">
+                <a:solidFill>
+                  <a:srgbClr val="0D0D0D"/>
+                </a:solidFill>
+                <a:effectLst/>
+                <a:highlight>
+                  <a:srgbClr val="FFFFFF"/>
+                </a:highlight>
+                <a:latin typeface="Söhne"/>
+              </a:rPr>
+              <a:t>dei</a:t>
+            </a:r>
+            <a:r>
+              <a:rPr lang="en-US" b="0" i="0" dirty="0">
+                <a:solidFill>
+                  <a:srgbClr val="0D0D0D"/>
+                </a:solidFill>
+                <a:effectLst/>
+                <a:highlight>
+                  <a:srgbClr val="FFFFFF"/>
+                </a:highlight>
+                <a:latin typeface="Söhne"/>
+              </a:rPr>
+              <a:t> </a:t>
+            </a:r>
+            <a:r>
+              <a:rPr lang="en-US" b="0" i="0" dirty="0" err="1">
+                <a:solidFill>
+                  <a:srgbClr val="0D0D0D"/>
+                </a:solidFill>
+                <a:effectLst/>
+                <a:highlight>
+                  <a:srgbClr val="FFFFFF"/>
+                </a:highlight>
+                <a:latin typeface="Söhne"/>
+              </a:rPr>
+              <a:t>sistemi</a:t>
+            </a:r>
+            <a:r>
+              <a:rPr lang="en-US" b="0" i="0" dirty="0">
+                <a:solidFill>
+                  <a:srgbClr val="0D0D0D"/>
+                </a:solidFill>
+                <a:effectLst/>
+                <a:highlight>
+                  <a:srgbClr val="FFFFFF"/>
+                </a:highlight>
+                <a:latin typeface="Söhne"/>
+              </a:rPr>
+              <a:t> e </a:t>
+            </a:r>
+            <a:r>
+              <a:rPr lang="en-US" b="0" i="0" dirty="0" err="1">
+                <a:solidFill>
+                  <a:srgbClr val="0D0D0D"/>
+                </a:solidFill>
+                <a:effectLst/>
+                <a:highlight>
+                  <a:srgbClr val="FFFFFF"/>
+                </a:highlight>
+                <a:latin typeface="Söhne"/>
+              </a:rPr>
+              <a:t>dei</a:t>
+            </a:r>
+            <a:r>
+              <a:rPr lang="en-US" b="0" i="0" dirty="0">
+                <a:solidFill>
+                  <a:srgbClr val="0D0D0D"/>
+                </a:solidFill>
+                <a:effectLst/>
+                <a:highlight>
+                  <a:srgbClr val="FFFFFF"/>
+                </a:highlight>
+                <a:latin typeface="Söhne"/>
+              </a:rPr>
+              <a:t> </a:t>
+            </a:r>
+            <a:r>
+              <a:rPr lang="en-US" b="0" i="0" dirty="0" err="1">
+                <a:solidFill>
+                  <a:srgbClr val="0D0D0D"/>
+                </a:solidFill>
+                <a:effectLst/>
+                <a:highlight>
+                  <a:srgbClr val="FFFFFF"/>
+                </a:highlight>
+                <a:latin typeface="Söhne"/>
+              </a:rPr>
+              <a:t>servizi</a:t>
+            </a:r>
+            <a:r>
+              <a:rPr lang="en-US" b="0" i="0" dirty="0">
+                <a:solidFill>
+                  <a:srgbClr val="0D0D0D"/>
+                </a:solidFill>
+                <a:effectLst/>
+                <a:highlight>
+                  <a:srgbClr val="FFFFFF"/>
+                </a:highlight>
+                <a:latin typeface="Söhne"/>
+              </a:rPr>
+              <a:t> per </a:t>
+            </a:r>
+            <a:r>
+              <a:rPr lang="en-US" b="0" i="0" dirty="0" err="1">
+                <a:solidFill>
+                  <a:srgbClr val="0D0D0D"/>
+                </a:solidFill>
+                <a:effectLst/>
+                <a:highlight>
+                  <a:srgbClr val="FFFFFF"/>
+                </a:highlight>
+                <a:latin typeface="Söhne"/>
+              </a:rPr>
+              <a:t>massimizzare</a:t>
+            </a:r>
+            <a:r>
+              <a:rPr lang="en-US" b="0" i="0" dirty="0">
+                <a:solidFill>
+                  <a:srgbClr val="0D0D0D"/>
+                </a:solidFill>
+                <a:effectLst/>
+                <a:highlight>
+                  <a:srgbClr val="FFFFFF"/>
+                </a:highlight>
+                <a:latin typeface="Söhne"/>
+              </a:rPr>
+              <a:t> la </a:t>
+            </a:r>
+            <a:r>
+              <a:rPr lang="en-US" b="0" i="0" dirty="0" err="1">
+                <a:solidFill>
+                  <a:srgbClr val="0D0D0D"/>
+                </a:solidFill>
+                <a:effectLst/>
+                <a:highlight>
+                  <a:srgbClr val="FFFFFF"/>
+                </a:highlight>
+                <a:latin typeface="Söhne"/>
+              </a:rPr>
+              <a:t>protezione</a:t>
+            </a:r>
+            <a:r>
+              <a:rPr lang="en-US" b="0" i="0" dirty="0">
+                <a:solidFill>
+                  <a:srgbClr val="0D0D0D"/>
+                </a:solidFill>
+                <a:effectLst/>
+                <a:highlight>
+                  <a:srgbClr val="FFFFFF"/>
+                </a:highlight>
+                <a:latin typeface="Söhne"/>
+              </a:rPr>
+              <a:t> </a:t>
+            </a:r>
+            <a:r>
+              <a:rPr lang="en-US" b="0" i="0" dirty="0" err="1">
+                <a:solidFill>
+                  <a:srgbClr val="0D0D0D"/>
+                </a:solidFill>
+                <a:effectLst/>
+                <a:highlight>
+                  <a:srgbClr val="FFFFFF"/>
+                </a:highlight>
+                <a:latin typeface="Söhne"/>
+              </a:rPr>
+              <a:t>della</a:t>
+            </a:r>
+            <a:r>
+              <a:rPr lang="en-US" b="0" i="0" dirty="0">
+                <a:solidFill>
+                  <a:srgbClr val="0D0D0D"/>
+                </a:solidFill>
+                <a:effectLst/>
+                <a:highlight>
+                  <a:srgbClr val="FFFFFF"/>
+                </a:highlight>
+                <a:latin typeface="Söhne"/>
+              </a:rPr>
+              <a:t> privacy </a:t>
+            </a:r>
+            <a:r>
+              <a:rPr lang="en-US" b="0" i="0" dirty="0" err="1">
+                <a:solidFill>
+                  <a:srgbClr val="0D0D0D"/>
+                </a:solidFill>
+                <a:effectLst/>
+                <a:highlight>
+                  <a:srgbClr val="FFFFFF"/>
+                </a:highlight>
+                <a:latin typeface="Söhne"/>
+              </a:rPr>
+              <a:t>degli</a:t>
+            </a:r>
+            <a:r>
+              <a:rPr lang="en-US" b="0" i="0" dirty="0">
+                <a:solidFill>
+                  <a:srgbClr val="0D0D0D"/>
+                </a:solidFill>
+                <a:effectLst/>
+                <a:highlight>
+                  <a:srgbClr val="FFFFFF"/>
+                </a:highlight>
+                <a:latin typeface="Söhne"/>
+              </a:rPr>
+              <a:t> </a:t>
+            </a:r>
+            <a:r>
+              <a:rPr lang="en-US" b="0" i="0" dirty="0" err="1">
+                <a:solidFill>
+                  <a:srgbClr val="0D0D0D"/>
+                </a:solidFill>
+                <a:effectLst/>
+                <a:highlight>
+                  <a:srgbClr val="FFFFFF"/>
+                </a:highlight>
+                <a:latin typeface="Söhne"/>
+              </a:rPr>
+              <a:t>utenti</a:t>
+            </a:r>
+            <a:r>
+              <a:rPr lang="en-US" b="0" i="0" dirty="0">
+                <a:solidFill>
+                  <a:srgbClr val="0D0D0D"/>
+                </a:solidFill>
+                <a:effectLst/>
+                <a:highlight>
+                  <a:srgbClr val="FFFFFF"/>
+                </a:highlight>
+                <a:latin typeface="Söhne"/>
+              </a:rPr>
+              <a:t>. In </a:t>
+            </a:r>
+            <a:r>
+              <a:rPr lang="en-US" b="0" i="0" dirty="0" err="1">
+                <a:solidFill>
+                  <a:srgbClr val="0D0D0D"/>
+                </a:solidFill>
+                <a:effectLst/>
+                <a:highlight>
+                  <a:srgbClr val="FFFFFF"/>
+                </a:highlight>
+                <a:latin typeface="Söhne"/>
+              </a:rPr>
+              <a:t>pratica</a:t>
+            </a:r>
+            <a:r>
+              <a:rPr lang="en-US" b="0" i="0" dirty="0">
+                <a:solidFill>
+                  <a:srgbClr val="0D0D0D"/>
+                </a:solidFill>
+                <a:effectLst/>
+                <a:highlight>
+                  <a:srgbClr val="FFFFFF"/>
+                </a:highlight>
+                <a:latin typeface="Söhne"/>
+              </a:rPr>
+              <a:t>, </a:t>
+            </a:r>
+            <a:r>
+              <a:rPr lang="en-US" b="0" i="0" dirty="0" err="1">
+                <a:solidFill>
+                  <a:srgbClr val="0D0D0D"/>
+                </a:solidFill>
+                <a:effectLst/>
+                <a:highlight>
+                  <a:srgbClr val="FFFFFF"/>
+                </a:highlight>
+                <a:latin typeface="Söhne"/>
+              </a:rPr>
+              <a:t>significa</a:t>
+            </a:r>
+            <a:r>
+              <a:rPr lang="en-US" b="0" i="0" dirty="0">
+                <a:solidFill>
+                  <a:srgbClr val="0D0D0D"/>
+                </a:solidFill>
+                <a:effectLst/>
+                <a:highlight>
+                  <a:srgbClr val="FFFFFF"/>
+                </a:highlight>
+                <a:latin typeface="Söhne"/>
+              </a:rPr>
+              <a:t> </a:t>
+            </a:r>
+            <a:r>
+              <a:rPr lang="en-US" b="0" i="0" dirty="0" err="1">
+                <a:solidFill>
+                  <a:srgbClr val="0D0D0D"/>
+                </a:solidFill>
+                <a:effectLst/>
+                <a:highlight>
+                  <a:srgbClr val="FFFFFF"/>
+                </a:highlight>
+                <a:latin typeface="Söhne"/>
+              </a:rPr>
+              <a:t>che</a:t>
+            </a:r>
+            <a:r>
+              <a:rPr lang="en-US" b="0" i="0" dirty="0">
+                <a:solidFill>
+                  <a:srgbClr val="0D0D0D"/>
+                </a:solidFill>
+                <a:effectLst/>
+                <a:highlight>
+                  <a:srgbClr val="FFFFFF"/>
+                </a:highlight>
+                <a:latin typeface="Söhne"/>
+              </a:rPr>
+              <a:t> le </a:t>
+            </a:r>
+            <a:r>
+              <a:rPr lang="en-US" b="0" i="0" dirty="0" err="1">
+                <a:solidFill>
+                  <a:srgbClr val="0D0D0D"/>
+                </a:solidFill>
+                <a:effectLst/>
+                <a:highlight>
+                  <a:srgbClr val="FFFFFF"/>
+                </a:highlight>
+                <a:latin typeface="Söhne"/>
+              </a:rPr>
+              <a:t>impostazioni</a:t>
+            </a:r>
+            <a:r>
+              <a:rPr lang="en-US" b="0" i="0" dirty="0">
+                <a:solidFill>
+                  <a:srgbClr val="0D0D0D"/>
+                </a:solidFill>
+                <a:effectLst/>
+                <a:highlight>
+                  <a:srgbClr val="FFFFFF"/>
+                </a:highlight>
+                <a:latin typeface="Söhne"/>
+              </a:rPr>
+              <a:t> </a:t>
+            </a:r>
+            <a:r>
+              <a:rPr lang="en-US" b="0" i="0" dirty="0" err="1">
+                <a:solidFill>
+                  <a:srgbClr val="0D0D0D"/>
+                </a:solidFill>
+                <a:effectLst/>
+                <a:highlight>
+                  <a:srgbClr val="FFFFFF"/>
+                </a:highlight>
+                <a:latin typeface="Söhne"/>
+              </a:rPr>
+              <a:t>predefinite</a:t>
+            </a:r>
+            <a:r>
+              <a:rPr lang="en-US" b="0" i="0" dirty="0">
+                <a:solidFill>
+                  <a:srgbClr val="0D0D0D"/>
+                </a:solidFill>
+                <a:effectLst/>
+                <a:highlight>
+                  <a:srgbClr val="FFFFFF"/>
+                </a:highlight>
+                <a:latin typeface="Söhne"/>
+              </a:rPr>
+              <a:t> </a:t>
+            </a:r>
+            <a:r>
+              <a:rPr lang="en-US" b="0" i="0" dirty="0" err="1">
+                <a:solidFill>
+                  <a:srgbClr val="0D0D0D"/>
+                </a:solidFill>
+                <a:effectLst/>
+                <a:highlight>
+                  <a:srgbClr val="FFFFFF"/>
+                </a:highlight>
+                <a:latin typeface="Söhne"/>
+              </a:rPr>
+              <a:t>dovrebbero</a:t>
+            </a:r>
+            <a:r>
+              <a:rPr lang="en-US" b="0" i="0" dirty="0">
+                <a:solidFill>
+                  <a:srgbClr val="0D0D0D"/>
+                </a:solidFill>
+                <a:effectLst/>
+                <a:highlight>
+                  <a:srgbClr val="FFFFFF"/>
+                </a:highlight>
+                <a:latin typeface="Söhne"/>
+              </a:rPr>
+              <a:t> </a:t>
+            </a:r>
+            <a:r>
+              <a:rPr lang="en-US" b="0" i="0" dirty="0" err="1">
+                <a:solidFill>
+                  <a:srgbClr val="0D0D0D"/>
+                </a:solidFill>
+                <a:effectLst/>
+                <a:highlight>
+                  <a:srgbClr val="FFFFFF"/>
+                </a:highlight>
+                <a:latin typeface="Söhne"/>
+              </a:rPr>
+              <a:t>essere</a:t>
+            </a:r>
+            <a:r>
+              <a:rPr lang="en-US" b="0" i="0" dirty="0">
+                <a:solidFill>
+                  <a:srgbClr val="0D0D0D"/>
+                </a:solidFill>
+                <a:effectLst/>
+                <a:highlight>
+                  <a:srgbClr val="FFFFFF"/>
+                </a:highlight>
+                <a:latin typeface="Söhne"/>
+              </a:rPr>
+              <a:t> </a:t>
+            </a:r>
+            <a:r>
+              <a:rPr lang="en-US" b="0" i="0" dirty="0" err="1">
+                <a:solidFill>
+                  <a:srgbClr val="0D0D0D"/>
+                </a:solidFill>
+                <a:effectLst/>
+                <a:highlight>
+                  <a:srgbClr val="FFFFFF"/>
+                </a:highlight>
+                <a:latin typeface="Söhne"/>
+              </a:rPr>
+              <a:t>progettate</a:t>
+            </a:r>
+            <a:r>
+              <a:rPr lang="en-US" b="0" i="0" dirty="0">
+                <a:solidFill>
+                  <a:srgbClr val="0D0D0D"/>
+                </a:solidFill>
+                <a:effectLst/>
+                <a:highlight>
+                  <a:srgbClr val="FFFFFF"/>
+                </a:highlight>
+                <a:latin typeface="Söhne"/>
+              </a:rPr>
+              <a:t> per </a:t>
+            </a:r>
+            <a:r>
+              <a:rPr lang="en-US" b="0" i="0" dirty="0" err="1">
+                <a:solidFill>
+                  <a:srgbClr val="0D0D0D"/>
+                </a:solidFill>
+                <a:effectLst/>
+                <a:highlight>
+                  <a:srgbClr val="FFFFFF"/>
+                </a:highlight>
+                <a:latin typeface="Söhne"/>
+              </a:rPr>
+              <a:t>garantire</a:t>
+            </a:r>
+            <a:r>
+              <a:rPr lang="en-US" b="0" i="0" dirty="0">
+                <a:solidFill>
+                  <a:srgbClr val="0D0D0D"/>
+                </a:solidFill>
+                <a:effectLst/>
+                <a:highlight>
+                  <a:srgbClr val="FFFFFF"/>
+                </a:highlight>
+                <a:latin typeface="Söhne"/>
+              </a:rPr>
+              <a:t> il </a:t>
+            </a:r>
+            <a:r>
+              <a:rPr lang="en-US" b="0" i="0" dirty="0" err="1">
+                <a:solidFill>
+                  <a:srgbClr val="0D0D0D"/>
+                </a:solidFill>
+                <a:effectLst/>
+                <a:highlight>
+                  <a:srgbClr val="FFFFFF"/>
+                </a:highlight>
+                <a:latin typeface="Söhne"/>
+              </a:rPr>
+              <a:t>massimo</a:t>
+            </a:r>
+            <a:r>
+              <a:rPr lang="en-US" b="0" i="0" dirty="0">
+                <a:solidFill>
+                  <a:srgbClr val="0D0D0D"/>
+                </a:solidFill>
+                <a:effectLst/>
+                <a:highlight>
+                  <a:srgbClr val="FFFFFF"/>
+                </a:highlight>
+                <a:latin typeface="Söhne"/>
+              </a:rPr>
+              <a:t> </a:t>
+            </a:r>
+            <a:r>
+              <a:rPr lang="en-US" b="0" i="0" dirty="0" err="1">
+                <a:solidFill>
+                  <a:srgbClr val="0D0D0D"/>
+                </a:solidFill>
+                <a:effectLst/>
+                <a:highlight>
+                  <a:srgbClr val="FFFFFF"/>
+                </a:highlight>
+                <a:latin typeface="Söhne"/>
+              </a:rPr>
+              <a:t>livello</a:t>
+            </a:r>
+            <a:r>
+              <a:rPr lang="en-US" b="0" i="0" dirty="0">
+                <a:solidFill>
+                  <a:srgbClr val="0D0D0D"/>
+                </a:solidFill>
+                <a:effectLst/>
+                <a:highlight>
+                  <a:srgbClr val="FFFFFF"/>
+                </a:highlight>
+                <a:latin typeface="Söhne"/>
+              </a:rPr>
+              <a:t> di privacy </a:t>
+            </a:r>
+            <a:r>
+              <a:rPr lang="en-US" b="0" i="0" dirty="0" err="1">
+                <a:solidFill>
+                  <a:srgbClr val="0D0D0D"/>
+                </a:solidFill>
+                <a:effectLst/>
+                <a:highlight>
+                  <a:srgbClr val="FFFFFF"/>
+                </a:highlight>
+                <a:latin typeface="Söhne"/>
+              </a:rPr>
+              <a:t>possibile</a:t>
+            </a:r>
+            <a:r>
+              <a:rPr lang="en-US" b="0" i="0" dirty="0">
+                <a:solidFill>
+                  <a:srgbClr val="0D0D0D"/>
+                </a:solidFill>
+                <a:effectLst/>
+                <a:highlight>
+                  <a:srgbClr val="FFFFFF"/>
+                </a:highlight>
+                <a:latin typeface="Söhne"/>
+              </a:rPr>
+              <a:t>, senza </a:t>
+            </a:r>
+            <a:r>
+              <a:rPr lang="en-US" b="0" i="0" dirty="0" err="1">
+                <a:solidFill>
+                  <a:srgbClr val="0D0D0D"/>
+                </a:solidFill>
+                <a:effectLst/>
+                <a:highlight>
+                  <a:srgbClr val="FFFFFF"/>
+                </a:highlight>
+                <a:latin typeface="Söhne"/>
+              </a:rPr>
+              <a:t>richiedere</a:t>
+            </a:r>
+            <a:r>
+              <a:rPr lang="en-US" b="0" i="0" dirty="0">
+                <a:solidFill>
+                  <a:srgbClr val="0D0D0D"/>
+                </a:solidFill>
+                <a:effectLst/>
+                <a:highlight>
+                  <a:srgbClr val="FFFFFF"/>
+                </a:highlight>
+                <a:latin typeface="Söhne"/>
+              </a:rPr>
+              <a:t> </a:t>
+            </a:r>
+            <a:r>
+              <a:rPr lang="en-US" b="0" i="0" dirty="0" err="1">
+                <a:solidFill>
+                  <a:srgbClr val="0D0D0D"/>
+                </a:solidFill>
+                <a:effectLst/>
+                <a:highlight>
+                  <a:srgbClr val="FFFFFF"/>
+                </a:highlight>
+                <a:latin typeface="Söhne"/>
+              </a:rPr>
+              <a:t>agli</a:t>
+            </a:r>
+            <a:r>
+              <a:rPr lang="en-US" b="0" i="0" dirty="0">
+                <a:solidFill>
+                  <a:srgbClr val="0D0D0D"/>
+                </a:solidFill>
+                <a:effectLst/>
+                <a:highlight>
+                  <a:srgbClr val="FFFFFF"/>
+                </a:highlight>
+                <a:latin typeface="Söhne"/>
+              </a:rPr>
+              <a:t> </a:t>
+            </a:r>
+            <a:r>
+              <a:rPr lang="en-US" b="0" i="0" dirty="0" err="1">
+                <a:solidFill>
+                  <a:srgbClr val="0D0D0D"/>
+                </a:solidFill>
+                <a:effectLst/>
+                <a:highlight>
+                  <a:srgbClr val="FFFFFF"/>
+                </a:highlight>
+                <a:latin typeface="Söhne"/>
+              </a:rPr>
+              <a:t>utenti</a:t>
+            </a:r>
+            <a:r>
+              <a:rPr lang="en-US" b="0" i="0" dirty="0">
+                <a:solidFill>
+                  <a:srgbClr val="0D0D0D"/>
+                </a:solidFill>
+                <a:effectLst/>
+                <a:highlight>
+                  <a:srgbClr val="FFFFFF"/>
+                </a:highlight>
+                <a:latin typeface="Söhne"/>
+              </a:rPr>
+              <a:t> di </a:t>
+            </a:r>
+            <a:r>
+              <a:rPr lang="en-US" b="0" i="0" dirty="0" err="1">
+                <a:solidFill>
+                  <a:srgbClr val="0D0D0D"/>
+                </a:solidFill>
+                <a:effectLst/>
+                <a:highlight>
+                  <a:srgbClr val="FFFFFF"/>
+                </a:highlight>
+                <a:latin typeface="Söhne"/>
+              </a:rPr>
+              <a:t>apportare</a:t>
+            </a:r>
+            <a:r>
+              <a:rPr lang="en-US" b="0" i="0" dirty="0">
+                <a:solidFill>
+                  <a:srgbClr val="0D0D0D"/>
+                </a:solidFill>
+                <a:effectLst/>
+                <a:highlight>
+                  <a:srgbClr val="FFFFFF"/>
+                </a:highlight>
+                <a:latin typeface="Söhne"/>
+              </a:rPr>
+              <a:t> </a:t>
+            </a:r>
+            <a:r>
+              <a:rPr lang="en-US" b="0" i="0" dirty="0" err="1">
+                <a:solidFill>
+                  <a:srgbClr val="0D0D0D"/>
+                </a:solidFill>
+                <a:effectLst/>
+                <a:highlight>
+                  <a:srgbClr val="FFFFFF"/>
+                </a:highlight>
+                <a:latin typeface="Söhne"/>
+              </a:rPr>
+              <a:t>modifiche</a:t>
+            </a:r>
+            <a:r>
+              <a:rPr lang="en-US" b="0" i="0" dirty="0">
+                <a:solidFill>
+                  <a:srgbClr val="0D0D0D"/>
+                </a:solidFill>
+                <a:effectLst/>
+                <a:highlight>
+                  <a:srgbClr val="FFFFFF"/>
+                </a:highlight>
+                <a:latin typeface="Söhne"/>
+              </a:rPr>
+              <a:t> o </a:t>
+            </a:r>
+            <a:r>
+              <a:rPr lang="en-US" b="0" i="0" dirty="0" err="1">
+                <a:solidFill>
+                  <a:srgbClr val="0D0D0D"/>
+                </a:solidFill>
+                <a:effectLst/>
+                <a:highlight>
+                  <a:srgbClr val="FFFFFF"/>
+                </a:highlight>
+                <a:latin typeface="Söhne"/>
+              </a:rPr>
+              <a:t>regolazioni</a:t>
+            </a:r>
+            <a:r>
+              <a:rPr lang="en-US" b="0" i="0" dirty="0">
+                <a:solidFill>
+                  <a:srgbClr val="0D0D0D"/>
+                </a:solidFill>
+                <a:effectLst/>
+                <a:highlight>
+                  <a:srgbClr val="FFFFFF"/>
+                </a:highlight>
+                <a:latin typeface="Söhne"/>
+              </a:rPr>
+              <a:t> </a:t>
+            </a:r>
+            <a:r>
+              <a:rPr lang="en-US" b="0" i="0" dirty="0" err="1">
+                <a:solidFill>
+                  <a:srgbClr val="0D0D0D"/>
+                </a:solidFill>
+                <a:effectLst/>
+                <a:highlight>
+                  <a:srgbClr val="FFFFFF"/>
+                </a:highlight>
+                <a:latin typeface="Söhne"/>
+              </a:rPr>
+              <a:t>aggiuntive</a:t>
+            </a:r>
+            <a:r>
+              <a:rPr lang="en-US" b="0" i="0" dirty="0">
+                <a:solidFill>
+                  <a:srgbClr val="0D0D0D"/>
+                </a:solidFill>
+                <a:effectLst/>
+                <a:highlight>
+                  <a:srgbClr val="FFFFFF"/>
+                </a:highlight>
+                <a:latin typeface="Söhne"/>
+              </a:rPr>
+              <a:t> per </a:t>
+            </a:r>
+            <a:r>
+              <a:rPr lang="en-US" b="0" i="0" dirty="0" err="1">
+                <a:solidFill>
+                  <a:srgbClr val="0D0D0D"/>
+                </a:solidFill>
+                <a:effectLst/>
+                <a:highlight>
+                  <a:srgbClr val="FFFFFF"/>
+                </a:highlight>
+                <a:latin typeface="Söhne"/>
+              </a:rPr>
+              <a:t>proteggere</a:t>
+            </a:r>
+            <a:r>
+              <a:rPr lang="en-US" b="0" i="0" dirty="0">
+                <a:solidFill>
+                  <a:srgbClr val="0D0D0D"/>
+                </a:solidFill>
+                <a:effectLst/>
+                <a:highlight>
+                  <a:srgbClr val="FFFFFF"/>
+                </a:highlight>
+                <a:latin typeface="Söhne"/>
+              </a:rPr>
+              <a:t> le </a:t>
+            </a:r>
+            <a:r>
+              <a:rPr lang="en-US" b="0" i="0" dirty="0" err="1">
+                <a:solidFill>
+                  <a:srgbClr val="0D0D0D"/>
+                </a:solidFill>
+                <a:effectLst/>
+                <a:highlight>
+                  <a:srgbClr val="FFFFFF"/>
+                </a:highlight>
+                <a:latin typeface="Söhne"/>
+              </a:rPr>
+              <a:t>proprie</a:t>
+            </a:r>
+            <a:r>
+              <a:rPr lang="en-US" b="0" i="0" dirty="0">
+                <a:solidFill>
+                  <a:srgbClr val="0D0D0D"/>
+                </a:solidFill>
+                <a:effectLst/>
+                <a:highlight>
+                  <a:srgbClr val="FFFFFF"/>
+                </a:highlight>
+                <a:latin typeface="Söhne"/>
+              </a:rPr>
+              <a:t> </a:t>
+            </a:r>
+            <a:r>
+              <a:rPr lang="en-US" b="0" i="0" dirty="0" err="1">
+                <a:solidFill>
+                  <a:srgbClr val="0D0D0D"/>
+                </a:solidFill>
+                <a:effectLst/>
+                <a:highlight>
+                  <a:srgbClr val="FFFFFF"/>
+                </a:highlight>
+                <a:latin typeface="Söhne"/>
+              </a:rPr>
+              <a:t>informazioni</a:t>
+            </a:r>
+            <a:r>
+              <a:rPr lang="en-US" b="0" i="0" dirty="0">
+                <a:solidFill>
+                  <a:srgbClr val="0D0D0D"/>
+                </a:solidFill>
+                <a:effectLst/>
+                <a:highlight>
+                  <a:srgbClr val="FFFFFF"/>
+                </a:highlight>
+                <a:latin typeface="Söhne"/>
+              </a:rPr>
+              <a:t> </a:t>
+            </a:r>
+            <a:r>
+              <a:rPr lang="en-US" b="0" i="0" dirty="0" err="1">
+                <a:solidFill>
+                  <a:srgbClr val="0D0D0D"/>
+                </a:solidFill>
+                <a:effectLst/>
+                <a:highlight>
+                  <a:srgbClr val="FFFFFF"/>
+                </a:highlight>
+                <a:latin typeface="Söhne"/>
+              </a:rPr>
+              <a:t>personali</a:t>
+            </a:r>
+            <a:r>
+              <a:rPr lang="en-US" b="0" i="0" dirty="0">
+                <a:solidFill>
+                  <a:srgbClr val="0D0D0D"/>
+                </a:solidFill>
+                <a:effectLst/>
+                <a:highlight>
+                  <a:srgbClr val="FFFFFF"/>
+                </a:highlight>
+                <a:latin typeface="Söhne"/>
+              </a:rPr>
+              <a:t>. Ad </a:t>
+            </a:r>
+            <a:r>
+              <a:rPr lang="en-US" b="0" i="0" dirty="0" err="1">
+                <a:solidFill>
+                  <a:srgbClr val="0D0D0D"/>
+                </a:solidFill>
+                <a:effectLst/>
+                <a:highlight>
+                  <a:srgbClr val="FFFFFF"/>
+                </a:highlight>
+                <a:latin typeface="Söhne"/>
+              </a:rPr>
+              <a:t>esempio</a:t>
+            </a:r>
+            <a:r>
+              <a:rPr lang="en-US" b="0" i="0" dirty="0">
+                <a:solidFill>
+                  <a:srgbClr val="0D0D0D"/>
+                </a:solidFill>
+                <a:effectLst/>
+                <a:highlight>
+                  <a:srgbClr val="FFFFFF"/>
+                </a:highlight>
+                <a:latin typeface="Söhne"/>
+              </a:rPr>
+              <a:t>, </a:t>
+            </a:r>
+            <a:r>
+              <a:rPr lang="en-US" b="0" i="0" dirty="0" err="1">
+                <a:solidFill>
+                  <a:srgbClr val="0D0D0D"/>
+                </a:solidFill>
+                <a:effectLst/>
+                <a:highlight>
+                  <a:srgbClr val="FFFFFF"/>
+                </a:highlight>
+                <a:latin typeface="Söhne"/>
+              </a:rPr>
+              <a:t>un'applicazione</a:t>
+            </a:r>
+            <a:r>
+              <a:rPr lang="en-US" b="0" i="0" dirty="0">
+                <a:solidFill>
+                  <a:srgbClr val="0D0D0D"/>
+                </a:solidFill>
+                <a:effectLst/>
+                <a:highlight>
+                  <a:srgbClr val="FFFFFF"/>
+                </a:highlight>
+                <a:latin typeface="Söhne"/>
+              </a:rPr>
+              <a:t> </a:t>
+            </a:r>
+            <a:r>
+              <a:rPr lang="en-US" b="0" i="0" dirty="0" err="1">
+                <a:solidFill>
+                  <a:srgbClr val="0D0D0D"/>
+                </a:solidFill>
+                <a:effectLst/>
+                <a:highlight>
+                  <a:srgbClr val="FFFFFF"/>
+                </a:highlight>
+                <a:latin typeface="Söhne"/>
+              </a:rPr>
+              <a:t>potrebbe</a:t>
+            </a:r>
+            <a:r>
+              <a:rPr lang="en-US" b="0" i="0" dirty="0">
+                <a:solidFill>
+                  <a:srgbClr val="0D0D0D"/>
+                </a:solidFill>
+                <a:effectLst/>
+                <a:highlight>
+                  <a:srgbClr val="FFFFFF"/>
+                </a:highlight>
+                <a:latin typeface="Söhne"/>
+              </a:rPr>
+              <a:t> </a:t>
+            </a:r>
+            <a:r>
+              <a:rPr lang="en-US" b="0" i="0" dirty="0" err="1">
+                <a:solidFill>
+                  <a:srgbClr val="0D0D0D"/>
+                </a:solidFill>
+                <a:effectLst/>
+                <a:highlight>
+                  <a:srgbClr val="FFFFFF"/>
+                </a:highlight>
+                <a:latin typeface="Söhne"/>
+              </a:rPr>
+              <a:t>essere</a:t>
+            </a:r>
+            <a:r>
+              <a:rPr lang="en-US" b="0" i="0" dirty="0">
+                <a:solidFill>
+                  <a:srgbClr val="0D0D0D"/>
+                </a:solidFill>
+                <a:effectLst/>
+                <a:highlight>
+                  <a:srgbClr val="FFFFFF"/>
+                </a:highlight>
+                <a:latin typeface="Söhne"/>
+              </a:rPr>
+              <a:t> </a:t>
+            </a:r>
+            <a:r>
+              <a:rPr lang="en-US" b="0" i="0" dirty="0" err="1">
+                <a:solidFill>
+                  <a:srgbClr val="0D0D0D"/>
+                </a:solidFill>
+                <a:effectLst/>
+                <a:highlight>
+                  <a:srgbClr val="FFFFFF"/>
+                </a:highlight>
+                <a:latin typeface="Söhne"/>
+              </a:rPr>
+              <a:t>progettata</a:t>
+            </a:r>
+            <a:r>
+              <a:rPr lang="en-US" b="0" i="0" dirty="0">
+                <a:solidFill>
+                  <a:srgbClr val="0D0D0D"/>
+                </a:solidFill>
+                <a:effectLst/>
+                <a:highlight>
+                  <a:srgbClr val="FFFFFF"/>
+                </a:highlight>
+                <a:latin typeface="Söhne"/>
+              </a:rPr>
+              <a:t> in modo tale </a:t>
+            </a:r>
+            <a:r>
+              <a:rPr lang="en-US" b="0" i="0" dirty="0" err="1">
+                <a:solidFill>
+                  <a:srgbClr val="0D0D0D"/>
+                </a:solidFill>
+                <a:effectLst/>
+                <a:highlight>
+                  <a:srgbClr val="FFFFFF"/>
+                </a:highlight>
+                <a:latin typeface="Söhne"/>
+              </a:rPr>
+              <a:t>che</a:t>
+            </a:r>
+            <a:r>
+              <a:rPr lang="en-US" b="0" i="0" dirty="0">
+                <a:solidFill>
+                  <a:srgbClr val="0D0D0D"/>
+                </a:solidFill>
+                <a:effectLst/>
+                <a:highlight>
+                  <a:srgbClr val="FFFFFF"/>
+                </a:highlight>
+                <a:latin typeface="Söhne"/>
+              </a:rPr>
+              <a:t> le </a:t>
+            </a:r>
+            <a:r>
+              <a:rPr lang="en-US" b="0" i="0" dirty="0" err="1">
+                <a:solidFill>
+                  <a:srgbClr val="0D0D0D"/>
+                </a:solidFill>
+                <a:effectLst/>
+                <a:highlight>
+                  <a:srgbClr val="FFFFFF"/>
+                </a:highlight>
+                <a:latin typeface="Söhne"/>
+              </a:rPr>
+              <a:t>impostazioni</a:t>
+            </a:r>
+            <a:r>
+              <a:rPr lang="en-US" b="0" i="0" dirty="0">
+                <a:solidFill>
+                  <a:srgbClr val="0D0D0D"/>
+                </a:solidFill>
+                <a:effectLst/>
+                <a:highlight>
+                  <a:srgbClr val="FFFFFF"/>
+                </a:highlight>
+                <a:latin typeface="Söhne"/>
+              </a:rPr>
+              <a:t> </a:t>
+            </a:r>
+            <a:r>
+              <a:rPr lang="en-US" b="0" i="0" dirty="0" err="1">
+                <a:solidFill>
+                  <a:srgbClr val="0D0D0D"/>
+                </a:solidFill>
+                <a:effectLst/>
+                <a:highlight>
+                  <a:srgbClr val="FFFFFF"/>
+                </a:highlight>
+                <a:latin typeface="Söhne"/>
+              </a:rPr>
+              <a:t>predefinite</a:t>
+            </a:r>
+            <a:r>
+              <a:rPr lang="en-US" b="0" i="0" dirty="0">
+                <a:solidFill>
+                  <a:srgbClr val="0D0D0D"/>
+                </a:solidFill>
+                <a:effectLst/>
+                <a:highlight>
+                  <a:srgbClr val="FFFFFF"/>
+                </a:highlight>
+                <a:latin typeface="Söhne"/>
+              </a:rPr>
+              <a:t> </a:t>
+            </a:r>
+            <a:r>
+              <a:rPr lang="en-US" b="0" i="0" dirty="0" err="1">
+                <a:solidFill>
+                  <a:srgbClr val="0D0D0D"/>
+                </a:solidFill>
+                <a:effectLst/>
+                <a:highlight>
+                  <a:srgbClr val="FFFFFF"/>
+                </a:highlight>
+                <a:latin typeface="Söhne"/>
+              </a:rPr>
+              <a:t>limitino</a:t>
+            </a:r>
+            <a:r>
+              <a:rPr lang="en-US" b="0" i="0" dirty="0">
+                <a:solidFill>
+                  <a:srgbClr val="0D0D0D"/>
+                </a:solidFill>
+                <a:effectLst/>
+                <a:highlight>
+                  <a:srgbClr val="FFFFFF"/>
+                </a:highlight>
+                <a:latin typeface="Söhne"/>
+              </a:rPr>
+              <a:t> la </a:t>
+            </a:r>
+            <a:r>
+              <a:rPr lang="en-US" b="0" i="0" dirty="0" err="1">
+                <a:solidFill>
+                  <a:srgbClr val="0D0D0D"/>
+                </a:solidFill>
+                <a:effectLst/>
+                <a:highlight>
+                  <a:srgbClr val="FFFFFF"/>
+                </a:highlight>
+                <a:latin typeface="Söhne"/>
+              </a:rPr>
+              <a:t>raccolta</a:t>
+            </a:r>
+            <a:r>
+              <a:rPr lang="en-US" b="0" i="0" dirty="0">
+                <a:solidFill>
+                  <a:srgbClr val="0D0D0D"/>
+                </a:solidFill>
+                <a:effectLst/>
+                <a:highlight>
+                  <a:srgbClr val="FFFFFF"/>
+                </a:highlight>
+                <a:latin typeface="Söhne"/>
+              </a:rPr>
+              <a:t> e </a:t>
+            </a:r>
+            <a:r>
+              <a:rPr lang="en-US" b="0" i="0" dirty="0" err="1">
+                <a:solidFill>
+                  <a:srgbClr val="0D0D0D"/>
+                </a:solidFill>
+                <a:effectLst/>
+                <a:highlight>
+                  <a:srgbClr val="FFFFFF"/>
+                </a:highlight>
+                <a:latin typeface="Söhne"/>
+              </a:rPr>
+              <a:t>l'uso</a:t>
+            </a:r>
+            <a:r>
+              <a:rPr lang="en-US" b="0" i="0" dirty="0">
+                <a:solidFill>
+                  <a:srgbClr val="0D0D0D"/>
+                </a:solidFill>
+                <a:effectLst/>
+                <a:highlight>
+                  <a:srgbClr val="FFFFFF"/>
+                </a:highlight>
+                <a:latin typeface="Söhne"/>
+              </a:rPr>
+              <a:t> </a:t>
+            </a:r>
+            <a:r>
+              <a:rPr lang="en-US" b="0" i="0" dirty="0" err="1">
+                <a:solidFill>
+                  <a:srgbClr val="0D0D0D"/>
+                </a:solidFill>
+                <a:effectLst/>
+                <a:highlight>
+                  <a:srgbClr val="FFFFFF"/>
+                </a:highlight>
+                <a:latin typeface="Söhne"/>
+              </a:rPr>
+              <a:t>dei</a:t>
+            </a:r>
+            <a:r>
+              <a:rPr lang="en-US" b="0" i="0" dirty="0">
+                <a:solidFill>
+                  <a:srgbClr val="0D0D0D"/>
+                </a:solidFill>
+                <a:effectLst/>
+                <a:highlight>
+                  <a:srgbClr val="FFFFFF"/>
+                </a:highlight>
+                <a:latin typeface="Söhne"/>
+              </a:rPr>
+              <a:t> </a:t>
+            </a:r>
+            <a:r>
+              <a:rPr lang="en-US" b="0" i="0" dirty="0" err="1">
+                <a:solidFill>
+                  <a:srgbClr val="0D0D0D"/>
+                </a:solidFill>
+                <a:effectLst/>
+                <a:highlight>
+                  <a:srgbClr val="FFFFFF"/>
+                </a:highlight>
+                <a:latin typeface="Söhne"/>
+              </a:rPr>
+              <a:t>dati</a:t>
+            </a:r>
+            <a:r>
+              <a:rPr lang="en-US" b="0" i="0" dirty="0">
+                <a:solidFill>
+                  <a:srgbClr val="0D0D0D"/>
+                </a:solidFill>
+                <a:effectLst/>
+                <a:highlight>
+                  <a:srgbClr val="FFFFFF"/>
+                </a:highlight>
+                <a:latin typeface="Söhne"/>
+              </a:rPr>
+              <a:t> </a:t>
+            </a:r>
+            <a:r>
+              <a:rPr lang="en-US" b="0" i="0" dirty="0" err="1">
+                <a:solidFill>
+                  <a:srgbClr val="0D0D0D"/>
+                </a:solidFill>
+                <a:effectLst/>
+                <a:highlight>
+                  <a:srgbClr val="FFFFFF"/>
+                </a:highlight>
+                <a:latin typeface="Söhne"/>
+              </a:rPr>
+              <a:t>personali</a:t>
+            </a:r>
+            <a:r>
+              <a:rPr lang="en-US" b="0" i="0" dirty="0">
+                <a:solidFill>
+                  <a:srgbClr val="0D0D0D"/>
+                </a:solidFill>
+                <a:effectLst/>
+                <a:highlight>
+                  <a:srgbClr val="FFFFFF"/>
+                </a:highlight>
+                <a:latin typeface="Söhne"/>
+              </a:rPr>
+              <a:t> solo al </a:t>
+            </a:r>
+            <a:r>
+              <a:rPr lang="en-US" b="0" i="0" dirty="0" err="1">
+                <a:solidFill>
+                  <a:srgbClr val="0D0D0D"/>
+                </a:solidFill>
+                <a:effectLst/>
+                <a:highlight>
+                  <a:srgbClr val="FFFFFF"/>
+                </a:highlight>
+                <a:latin typeface="Söhne"/>
+              </a:rPr>
+              <a:t>minimo</a:t>
+            </a:r>
+            <a:r>
+              <a:rPr lang="en-US" b="0" i="0" dirty="0">
+                <a:solidFill>
+                  <a:srgbClr val="0D0D0D"/>
+                </a:solidFill>
+                <a:effectLst/>
+                <a:highlight>
+                  <a:srgbClr val="FFFFFF"/>
+                </a:highlight>
+                <a:latin typeface="Söhne"/>
+              </a:rPr>
+              <a:t> </a:t>
+            </a:r>
+            <a:r>
+              <a:rPr lang="en-US" b="0" i="0" dirty="0" err="1">
+                <a:solidFill>
+                  <a:srgbClr val="0D0D0D"/>
+                </a:solidFill>
+                <a:effectLst/>
+                <a:highlight>
+                  <a:srgbClr val="FFFFFF"/>
+                </a:highlight>
+                <a:latin typeface="Söhne"/>
+              </a:rPr>
+              <a:t>necessario</a:t>
+            </a:r>
+            <a:r>
+              <a:rPr lang="en-US" b="0" i="0" dirty="0">
+                <a:solidFill>
+                  <a:srgbClr val="0D0D0D"/>
+                </a:solidFill>
+                <a:effectLst/>
+                <a:highlight>
+                  <a:srgbClr val="FFFFFF"/>
+                </a:highlight>
+                <a:latin typeface="Söhne"/>
+              </a:rPr>
+              <a:t> per il </a:t>
+            </a:r>
+            <a:r>
+              <a:rPr lang="en-US" b="0" i="0" dirty="0" err="1">
+                <a:solidFill>
+                  <a:srgbClr val="0D0D0D"/>
+                </a:solidFill>
+                <a:effectLst/>
+                <a:highlight>
+                  <a:srgbClr val="FFFFFF"/>
+                </a:highlight>
+                <a:latin typeface="Söhne"/>
+              </a:rPr>
+              <a:t>funzionamento</a:t>
+            </a:r>
+            <a:r>
+              <a:rPr lang="en-US" b="0" i="0" dirty="0">
+                <a:solidFill>
+                  <a:srgbClr val="0D0D0D"/>
+                </a:solidFill>
+                <a:effectLst/>
+                <a:highlight>
+                  <a:srgbClr val="FFFFFF"/>
+                </a:highlight>
+                <a:latin typeface="Söhne"/>
+              </a:rPr>
+              <a:t> </a:t>
+            </a:r>
+            <a:r>
+              <a:rPr lang="en-US" b="0" i="0" dirty="0" err="1">
+                <a:solidFill>
+                  <a:srgbClr val="0D0D0D"/>
+                </a:solidFill>
+                <a:effectLst/>
+                <a:highlight>
+                  <a:srgbClr val="FFFFFF"/>
+                </a:highlight>
+                <a:latin typeface="Söhne"/>
+              </a:rPr>
+              <a:t>dell'applicazione</a:t>
+            </a:r>
+            <a:r>
+              <a:rPr lang="en-US" b="0" i="0" dirty="0">
+                <a:solidFill>
+                  <a:srgbClr val="0D0D0D"/>
+                </a:solidFill>
+                <a:effectLst/>
+                <a:highlight>
+                  <a:srgbClr val="FFFFFF"/>
+                </a:highlight>
+                <a:latin typeface="Söhne"/>
+              </a:rPr>
+              <a:t> </a:t>
+            </a:r>
+            <a:r>
+              <a:rPr lang="en-US" b="0" i="0" dirty="0" err="1">
+                <a:solidFill>
+                  <a:srgbClr val="0D0D0D"/>
+                </a:solidFill>
+                <a:effectLst/>
+                <a:highlight>
+                  <a:srgbClr val="FFFFFF"/>
+                </a:highlight>
+                <a:latin typeface="Söhne"/>
+              </a:rPr>
+              <a:t>stessa</a:t>
+            </a:r>
+            <a:r>
+              <a:rPr lang="en-US" b="0" i="0" dirty="0">
+                <a:solidFill>
+                  <a:srgbClr val="0D0D0D"/>
+                </a:solidFill>
+                <a:effectLst/>
+                <a:highlight>
+                  <a:srgbClr val="FFFFFF"/>
+                </a:highlight>
+                <a:latin typeface="Söhne"/>
+              </a:rPr>
+              <a:t>, con </a:t>
+            </a:r>
+            <a:r>
+              <a:rPr lang="en-US" b="0" i="0" dirty="0" err="1">
+                <a:solidFill>
+                  <a:srgbClr val="0D0D0D"/>
+                </a:solidFill>
+                <a:effectLst/>
+                <a:highlight>
+                  <a:srgbClr val="FFFFFF"/>
+                </a:highlight>
+                <a:latin typeface="Söhne"/>
+              </a:rPr>
+              <a:t>opzioni</a:t>
+            </a:r>
+            <a:r>
+              <a:rPr lang="en-US" b="0" i="0" dirty="0">
+                <a:solidFill>
+                  <a:srgbClr val="0D0D0D"/>
+                </a:solidFill>
+                <a:effectLst/>
+                <a:highlight>
+                  <a:srgbClr val="FFFFFF"/>
+                </a:highlight>
+                <a:latin typeface="Söhne"/>
+              </a:rPr>
+              <a:t> per </a:t>
+            </a:r>
+            <a:r>
+              <a:rPr lang="en-US" b="0" i="0" dirty="0" err="1">
+                <a:solidFill>
+                  <a:srgbClr val="0D0D0D"/>
+                </a:solidFill>
+                <a:effectLst/>
+                <a:highlight>
+                  <a:srgbClr val="FFFFFF"/>
+                </a:highlight>
+                <a:latin typeface="Söhne"/>
+              </a:rPr>
+              <a:t>gli</a:t>
+            </a:r>
+            <a:r>
+              <a:rPr lang="en-US" b="0" i="0" dirty="0">
+                <a:solidFill>
+                  <a:srgbClr val="0D0D0D"/>
+                </a:solidFill>
+                <a:effectLst/>
+                <a:highlight>
+                  <a:srgbClr val="FFFFFF"/>
+                </a:highlight>
+                <a:latin typeface="Söhne"/>
+              </a:rPr>
+              <a:t> </a:t>
+            </a:r>
+            <a:r>
+              <a:rPr lang="en-US" b="0" i="0" dirty="0" err="1">
+                <a:solidFill>
+                  <a:srgbClr val="0D0D0D"/>
+                </a:solidFill>
+                <a:effectLst/>
+                <a:highlight>
+                  <a:srgbClr val="FFFFFF"/>
+                </a:highlight>
+                <a:latin typeface="Söhne"/>
+              </a:rPr>
+              <a:t>utenti</a:t>
+            </a:r>
+            <a:r>
+              <a:rPr lang="en-US" b="0" i="0" dirty="0">
+                <a:solidFill>
+                  <a:srgbClr val="0D0D0D"/>
+                </a:solidFill>
+                <a:effectLst/>
+                <a:highlight>
+                  <a:srgbClr val="FFFFFF"/>
+                </a:highlight>
+                <a:latin typeface="Söhne"/>
+              </a:rPr>
+              <a:t> di </a:t>
+            </a:r>
+            <a:r>
+              <a:rPr lang="en-US" b="0" i="0" dirty="0" err="1">
+                <a:solidFill>
+                  <a:srgbClr val="0D0D0D"/>
+                </a:solidFill>
+                <a:effectLst/>
+                <a:highlight>
+                  <a:srgbClr val="FFFFFF"/>
+                </a:highlight>
+                <a:latin typeface="Söhne"/>
+              </a:rPr>
+              <a:t>concedere</a:t>
+            </a:r>
+            <a:r>
+              <a:rPr lang="en-US" b="0" i="0" dirty="0">
+                <a:solidFill>
+                  <a:srgbClr val="0D0D0D"/>
+                </a:solidFill>
+                <a:effectLst/>
+                <a:highlight>
+                  <a:srgbClr val="FFFFFF"/>
+                </a:highlight>
+                <a:latin typeface="Söhne"/>
+              </a:rPr>
+              <a:t> </a:t>
+            </a:r>
+            <a:r>
+              <a:rPr lang="en-US" b="0" i="0" dirty="0" err="1">
+                <a:solidFill>
+                  <a:srgbClr val="0D0D0D"/>
+                </a:solidFill>
+                <a:effectLst/>
+                <a:highlight>
+                  <a:srgbClr val="FFFFFF"/>
+                </a:highlight>
+                <a:latin typeface="Söhne"/>
+              </a:rPr>
+              <a:t>consensi</a:t>
+            </a:r>
+            <a:r>
+              <a:rPr lang="en-US" b="0" i="0" dirty="0">
+                <a:solidFill>
+                  <a:srgbClr val="0D0D0D"/>
+                </a:solidFill>
+                <a:effectLst/>
+                <a:highlight>
+                  <a:srgbClr val="FFFFFF"/>
+                </a:highlight>
+                <a:latin typeface="Söhne"/>
+              </a:rPr>
+              <a:t> </a:t>
+            </a:r>
+            <a:r>
+              <a:rPr lang="en-US" b="0" i="0" dirty="0" err="1">
+                <a:solidFill>
+                  <a:srgbClr val="0D0D0D"/>
+                </a:solidFill>
+                <a:effectLst/>
+                <a:highlight>
+                  <a:srgbClr val="FFFFFF"/>
+                </a:highlight>
+                <a:latin typeface="Söhne"/>
+              </a:rPr>
+              <a:t>espliciti</a:t>
+            </a:r>
+            <a:r>
+              <a:rPr lang="en-US" b="0" i="0" dirty="0">
+                <a:solidFill>
+                  <a:srgbClr val="0D0D0D"/>
+                </a:solidFill>
+                <a:effectLst/>
+                <a:highlight>
+                  <a:srgbClr val="FFFFFF"/>
+                </a:highlight>
+                <a:latin typeface="Söhne"/>
+              </a:rPr>
+              <a:t> per </a:t>
+            </a:r>
+            <a:r>
+              <a:rPr lang="en-US" b="0" i="0" dirty="0" err="1">
+                <a:solidFill>
+                  <a:srgbClr val="0D0D0D"/>
+                </a:solidFill>
+                <a:effectLst/>
+                <a:highlight>
+                  <a:srgbClr val="FFFFFF"/>
+                </a:highlight>
+                <a:latin typeface="Söhne"/>
+              </a:rPr>
+              <a:t>finalità</a:t>
+            </a:r>
+            <a:r>
+              <a:rPr lang="en-US" b="0" i="0" dirty="0">
+                <a:solidFill>
+                  <a:srgbClr val="0D0D0D"/>
+                </a:solidFill>
+                <a:effectLst/>
+                <a:highlight>
+                  <a:srgbClr val="FFFFFF"/>
+                </a:highlight>
+                <a:latin typeface="Söhne"/>
+              </a:rPr>
+              <a:t> </a:t>
+            </a:r>
+            <a:r>
+              <a:rPr lang="en-US" b="0" i="0" dirty="0" err="1">
+                <a:solidFill>
+                  <a:srgbClr val="0D0D0D"/>
+                </a:solidFill>
+                <a:effectLst/>
+                <a:highlight>
+                  <a:srgbClr val="FFFFFF"/>
+                </a:highlight>
+                <a:latin typeface="Söhne"/>
+              </a:rPr>
+              <a:t>aggiuntive</a:t>
+            </a:r>
+            <a:r>
+              <a:rPr lang="en-US" b="0" i="0" dirty="0">
+                <a:solidFill>
+                  <a:srgbClr val="0D0D0D"/>
+                </a:solidFill>
+                <a:effectLst/>
+                <a:highlight>
+                  <a:srgbClr val="FFFFFF"/>
+                </a:highlight>
+                <a:latin typeface="Söhne"/>
+              </a:rPr>
+              <a:t>.</a:t>
+            </a:r>
+          </a:p>
+          <a:p>
+            <a:endParaRPr lang="en-US" dirty="0"/>
+          </a:p>
+        </p:txBody>
+      </p:sp>
+      <p:sp>
+        <p:nvSpPr>
+          <p:cNvPr id="4" name="Slide Number Placeholder 3"/>
+          <p:cNvSpPr>
+            <a:spLocks noGrp="1"/>
+          </p:cNvSpPr>
+          <p:nvPr>
+            <p:ph type="sldNum" sz="quarter" idx="5"/>
+          </p:nvPr>
+        </p:nvSpPr>
+        <p:spPr/>
+        <p:txBody>
+          <a:bodyPr/>
+          <a:lstStyle/>
+          <a:p>
+            <a:fld id="{5669C82F-DE94-4CA4-8B4D-F0EAC95D82AA}" type="slidenum">
+              <a:rPr lang="en-GB" smtClean="0"/>
+              <a:t>17</a:t>
+            </a:fld>
+            <a:endParaRPr lang="en-GB"/>
+          </a:p>
+        </p:txBody>
+      </p:sp>
+    </p:spTree>
+    <p:extLst>
+      <p:ext uri="{BB962C8B-B14F-4D97-AF65-F5344CB8AC3E}">
+        <p14:creationId xmlns:p14="http://schemas.microsoft.com/office/powerpoint/2010/main" val="1737589689"/>
+      </p:ext>
+    </p:extLst>
+  </p:cSld>
+  <p:clrMapOvr>
+    <a:masterClrMapping/>
+  </p:clrMapOvr>
+</p:notes>
 </file>
 
 <file path=ppt/slideLayouts/slideLayout1.xml><?xml version="1.0" encoding="utf-8"?>
@@ -3126,196 +6706,6 @@
   <p:clrMapOvr>
     <a:masterClrMapping/>
   </p:clrMapOvr>
-  <p:timing>
-    <p:tnLst>
-      <p:par>
-        <p:cTn id="1" dur="indefinite" restart="never" nodeType="tmRoot">
-          <p:childTnLst>
-            <p:seq concurrent="1" nextAc="seek">
-              <p:cTn id="2" dur="indefinite" nodeType="mainSeq">
-                <p:childTnLst>
-                  <p:par>
-                    <p:cTn id="3" fill="hold">
-                      <p:stCondLst>
-                        <p:cond delay="indefinite"/>
-                      </p:stCondLst>
-                      <p:childTnLst>
-                        <p:par>
-                          <p:cTn id="4" fill="hold">
-                            <p:stCondLst>
-                              <p:cond delay="0"/>
-                            </p:stCondLst>
-                            <p:childTnLst>
-                              <p:par>
-                                <p:cTn id="5" presetID="1" presetClass="entr" presetSubtype="0" fill="hold" nodeType="clickEffect">
-                                  <p:stCondLst>
-                                    <p:cond delay="0"/>
-                                  </p:stCondLst>
-                                  <p:childTnLst>
-                                    <p:set>
-                                      <p:cBhvr>
-                                        <p:cTn id="6" dur="1" fill="hold">
-                                          <p:stCondLst>
-                                            <p:cond delay="0"/>
-                                          </p:stCondLst>
-                                        </p:cTn>
-                                        <p:tgtEl>
-                                          <p:spTgt spid="3">
-                                            <p:txEl>
-                                              <p:pRg st="2" end="2"/>
-                                            </p:txEl>
-                                          </p:spTgt>
-                                        </p:tgtEl>
-                                        <p:attrNameLst>
-                                          <p:attrName>style.visibility</p:attrName>
-                                        </p:attrNameLst>
-                                      </p:cBhvr>
-                                      <p:to>
-                                        <p:strVal val="visible"/>
-                                      </p:to>
-                                    </p:set>
-                                  </p:childTnLst>
-                                </p:cTn>
-                              </p:par>
-                            </p:childTnLst>
-                          </p:cTn>
-                        </p:par>
-                      </p:childTnLst>
-                    </p:cTn>
-                  </p:par>
-                  <p:par>
-                    <p:cTn id="7" fill="hold">
-                      <p:stCondLst>
-                        <p:cond delay="indefinite"/>
-                      </p:stCondLst>
-                      <p:childTnLst>
-                        <p:par>
-                          <p:cTn id="8" fill="hold">
-                            <p:stCondLst>
-                              <p:cond delay="0"/>
-                            </p:stCondLst>
-                            <p:childTnLst>
-                              <p:par>
-                                <p:cTn id="9" presetID="1" presetClass="entr" presetSubtype="0" fill="hold" nodeType="clickEffect">
-                                  <p:stCondLst>
-                                    <p:cond delay="0"/>
-                                  </p:stCondLst>
-                                  <p:childTnLst>
-                                    <p:set>
-                                      <p:cBhvr>
-                                        <p:cTn id="10" dur="1" fill="hold">
-                                          <p:stCondLst>
-                                            <p:cond delay="0"/>
-                                          </p:stCondLst>
-                                        </p:cTn>
-                                        <p:tgtEl>
-                                          <p:spTgt spid="3">
-                                            <p:txEl>
-                                              <p:pRg st="0" end="0"/>
-                                            </p:txEl>
-                                          </p:spTgt>
-                                        </p:tgtEl>
-                                        <p:attrNameLst>
-                                          <p:attrName>style.visibility</p:attrName>
-                                        </p:attrNameLst>
-                                      </p:cBhvr>
-                                      <p:to>
-                                        <p:strVal val="visible"/>
-                                      </p:to>
-                                    </p:set>
-                                  </p:childTnLst>
-                                </p:cTn>
-                              </p:par>
-                              <p:par>
-                                <p:cTn id="11" presetID="1" presetClass="entr" presetSubtype="0" fill="hold" nodeType="withEffect">
-                                  <p:stCondLst>
-                                    <p:cond delay="0"/>
-                                  </p:stCondLst>
-                                  <p:childTnLst>
-                                    <p:set>
-                                      <p:cBhvr>
-                                        <p:cTn id="12" dur="1" fill="hold">
-                                          <p:stCondLst>
-                                            <p:cond delay="0"/>
-                                          </p:stCondLst>
-                                        </p:cTn>
-                                        <p:tgtEl>
-                                          <p:spTgt spid="3">
-                                            <p:txEl>
-                                              <p:pRg st="4" end="4"/>
-                                            </p:txEl>
-                                          </p:spTgt>
-                                        </p:tgtEl>
-                                        <p:attrNameLst>
-                                          <p:attrName>style.visibility</p:attrName>
-                                        </p:attrNameLst>
-                                      </p:cBhvr>
-                                      <p:to>
-                                        <p:strVal val="visible"/>
-                                      </p:to>
-                                    </p:set>
-                                  </p:childTnLst>
-                                </p:cTn>
-                              </p:par>
-                              <p:par>
-                                <p:cTn id="13" presetID="1" presetClass="entr" presetSubtype="0" fill="hold" nodeType="withEffect">
-                                  <p:stCondLst>
-                                    <p:cond delay="0"/>
-                                  </p:stCondLst>
-                                  <p:childTnLst>
-                                    <p:set>
-                                      <p:cBhvr>
-                                        <p:cTn id="14" dur="1" fill="hold">
-                                          <p:stCondLst>
-                                            <p:cond delay="0"/>
-                                          </p:stCondLst>
-                                        </p:cTn>
-                                        <p:tgtEl>
-                                          <p:spTgt spid="3">
-                                            <p:txEl>
-                                              <p:pRg st="6" end="6"/>
-                                            </p:txEl>
-                                          </p:spTgt>
-                                        </p:tgtEl>
-                                        <p:attrNameLst>
-                                          <p:attrName>style.visibility</p:attrName>
-                                        </p:attrNameLst>
-                                      </p:cBhvr>
-                                      <p:to>
-                                        <p:strVal val="visible"/>
-                                      </p:to>
-                                    </p:set>
-                                  </p:childTnLst>
-                                </p:cTn>
-                              </p:par>
-                            </p:childTnLst>
-                          </p:cTn>
-                        </p:par>
-                      </p:childTnLst>
-                    </p:cTn>
-                  </p:par>
-                </p:childTnLst>
-              </p:cTn>
-              <p:prevCondLst>
-                <p:cond evt="onPrev" delay="0">
-                  <p:tgtEl>
-                    <p:sldTgt/>
-                  </p:tgtEl>
-                </p:cond>
-              </p:prevCondLst>
-              <p:nextCondLst>
-                <p:cond evt="onNext" delay="0">
-                  <p:tgtEl>
-                    <p:sldTgt/>
-                  </p:tgtEl>
-                </p:cond>
-              </p:nextCondLst>
-            </p:seq>
-          </p:childTnLst>
-        </p:cTn>
-      </p:par>
-    </p:tnLst>
-  </p:timing>
 </p:sld>
 </file>
 
@@ -6257,7 +9647,7 @@
           <p:nvPr/>
         </p:nvPicPr>
         <p:blipFill>
-          <a:blip r:embed="rId2">
+          <a:blip r:embed="rId3">
             <a:extLst>
               <a:ext uri="{28A0092B-C50C-407E-A947-70E740481C1C}">
                 <a14:useLocalDpi xmlns:a14="http://schemas.microsoft.com/office/drawing/2010/main" val="0"/>

</xml_diff>